<commit_message>
fix: outline for presentation
</commit_message>
<xml_diff>
--- a/Slides.pptx
+++ b/Slides.pptx
@@ -2,23 +2,28 @@
 <file path=ppt/presentation.xml><?xml version="1.0" encoding="utf-8"?>
 <p:presentation xmlns:a="http://schemas.openxmlformats.org/drawingml/2006/main" xmlns:r="http://schemas.openxmlformats.org/officeDocument/2006/relationships" xmlns:p="http://schemas.openxmlformats.org/presentationml/2006/main" saveSubsetFonts="1" autoCompressPictures="0">
   <p:sldMasterIdLst>
-    <p:sldMasterId id="2147483648" r:id="rId1"/>
+    <p:sldMasterId id="2147483720" r:id="rId1"/>
   </p:sldMasterIdLst>
   <p:notesMasterIdLst>
-    <p:notesMasterId r:id="rId13"/>
+    <p:notesMasterId r:id="rId18"/>
   </p:notesMasterIdLst>
   <p:sldIdLst>
     <p:sldId id="256" r:id="rId2"/>
-    <p:sldId id="257" r:id="rId3"/>
-    <p:sldId id="258" r:id="rId4"/>
-    <p:sldId id="259" r:id="rId5"/>
-    <p:sldId id="260" r:id="rId6"/>
-    <p:sldId id="261" r:id="rId7"/>
-    <p:sldId id="262" r:id="rId8"/>
-    <p:sldId id="263" r:id="rId9"/>
-    <p:sldId id="264" r:id="rId10"/>
-    <p:sldId id="265" r:id="rId11"/>
-    <p:sldId id="266" r:id="rId12"/>
+    <p:sldId id="271" r:id="rId3"/>
+    <p:sldId id="270" r:id="rId4"/>
+    <p:sldId id="267" r:id="rId5"/>
+    <p:sldId id="257" r:id="rId6"/>
+    <p:sldId id="258" r:id="rId7"/>
+    <p:sldId id="268" r:id="rId8"/>
+    <p:sldId id="259" r:id="rId9"/>
+    <p:sldId id="269" r:id="rId10"/>
+    <p:sldId id="260" r:id="rId11"/>
+    <p:sldId id="261" r:id="rId12"/>
+    <p:sldId id="262" r:id="rId13"/>
+    <p:sldId id="263" r:id="rId14"/>
+    <p:sldId id="264" r:id="rId15"/>
+    <p:sldId id="265" r:id="rId16"/>
+    <p:sldId id="266" r:id="rId17"/>
   </p:sldIdLst>
   <p:sldSz cx="12192000" cy="6858000"/>
   <p:notesSz cx="6858000" cy="9144000"/>
@@ -26,7 +31,7 @@
     <a:defPPr>
       <a:defRPr lang="en-US"/>
     </a:defPPr>
-    <a:lvl1pPr marL="0" algn="l" defTabSz="914400" rtl="0" eaLnBrk="1" latinLnBrk="0" hangingPunct="1">
+    <a:lvl1pPr marL="0" algn="l" defTabSz="457200" rtl="0" eaLnBrk="1" latinLnBrk="0" hangingPunct="1">
       <a:defRPr sz="1800" kern="1200">
         <a:solidFill>
           <a:schemeClr val="tx1"/>
@@ -36,7 +41,7 @@
         <a:cs typeface="+mn-cs"/>
       </a:defRPr>
     </a:lvl1pPr>
-    <a:lvl2pPr marL="457200" algn="l" defTabSz="914400" rtl="0" eaLnBrk="1" latinLnBrk="0" hangingPunct="1">
+    <a:lvl2pPr marL="457200" algn="l" defTabSz="457200" rtl="0" eaLnBrk="1" latinLnBrk="0" hangingPunct="1">
       <a:defRPr sz="1800" kern="1200">
         <a:solidFill>
           <a:schemeClr val="tx1"/>
@@ -46,7 +51,7 @@
         <a:cs typeface="+mn-cs"/>
       </a:defRPr>
     </a:lvl2pPr>
-    <a:lvl3pPr marL="914400" algn="l" defTabSz="914400" rtl="0" eaLnBrk="1" latinLnBrk="0" hangingPunct="1">
+    <a:lvl3pPr marL="914400" algn="l" defTabSz="457200" rtl="0" eaLnBrk="1" latinLnBrk="0" hangingPunct="1">
       <a:defRPr sz="1800" kern="1200">
         <a:solidFill>
           <a:schemeClr val="tx1"/>
@@ -56,7 +61,7 @@
         <a:cs typeface="+mn-cs"/>
       </a:defRPr>
     </a:lvl3pPr>
-    <a:lvl4pPr marL="1371600" algn="l" defTabSz="914400" rtl="0" eaLnBrk="1" latinLnBrk="0" hangingPunct="1">
+    <a:lvl4pPr marL="1371600" algn="l" defTabSz="457200" rtl="0" eaLnBrk="1" latinLnBrk="0" hangingPunct="1">
       <a:defRPr sz="1800" kern="1200">
         <a:solidFill>
           <a:schemeClr val="tx1"/>
@@ -66,7 +71,7 @@
         <a:cs typeface="+mn-cs"/>
       </a:defRPr>
     </a:lvl4pPr>
-    <a:lvl5pPr marL="1828800" algn="l" defTabSz="914400" rtl="0" eaLnBrk="1" latinLnBrk="0" hangingPunct="1">
+    <a:lvl5pPr marL="1828800" algn="l" defTabSz="457200" rtl="0" eaLnBrk="1" latinLnBrk="0" hangingPunct="1">
       <a:defRPr sz="1800" kern="1200">
         <a:solidFill>
           <a:schemeClr val="tx1"/>
@@ -76,7 +81,7 @@
         <a:cs typeface="+mn-cs"/>
       </a:defRPr>
     </a:lvl5pPr>
-    <a:lvl6pPr marL="2286000" algn="l" defTabSz="914400" rtl="0" eaLnBrk="1" latinLnBrk="0" hangingPunct="1">
+    <a:lvl6pPr marL="2286000" algn="l" defTabSz="457200" rtl="0" eaLnBrk="1" latinLnBrk="0" hangingPunct="1">
       <a:defRPr sz="1800" kern="1200">
         <a:solidFill>
           <a:schemeClr val="tx1"/>
@@ -86,7 +91,7 @@
         <a:cs typeface="+mn-cs"/>
       </a:defRPr>
     </a:lvl6pPr>
-    <a:lvl7pPr marL="2743200" algn="l" defTabSz="914400" rtl="0" eaLnBrk="1" latinLnBrk="0" hangingPunct="1">
+    <a:lvl7pPr marL="2743200" algn="l" defTabSz="457200" rtl="0" eaLnBrk="1" latinLnBrk="0" hangingPunct="1">
       <a:defRPr sz="1800" kern="1200">
         <a:solidFill>
           <a:schemeClr val="tx1"/>
@@ -96,7 +101,7 @@
         <a:cs typeface="+mn-cs"/>
       </a:defRPr>
     </a:lvl7pPr>
-    <a:lvl8pPr marL="3200400" algn="l" defTabSz="914400" rtl="0" eaLnBrk="1" latinLnBrk="0" hangingPunct="1">
+    <a:lvl8pPr marL="3200400" algn="l" defTabSz="457200" rtl="0" eaLnBrk="1" latinLnBrk="0" hangingPunct="1">
       <a:defRPr sz="1800" kern="1200">
         <a:solidFill>
           <a:schemeClr val="tx1"/>
@@ -106,7 +111,7 @@
         <a:cs typeface="+mn-cs"/>
       </a:defRPr>
     </a:lvl8pPr>
-    <a:lvl9pPr marL="3657600" algn="l" defTabSz="914400" rtl="0" eaLnBrk="1" latinLnBrk="0" hangingPunct="1">
+    <a:lvl9pPr marL="3657600" algn="l" defTabSz="457200" rtl="0" eaLnBrk="1" latinLnBrk="0" hangingPunct="1">
       <a:defRPr sz="1800" kern="1200">
         <a:solidFill>
           <a:schemeClr val="tx1"/>
@@ -117,6 +122,11 @@
       </a:defRPr>
     </a:lvl9pPr>
   </p:defaultTextStyle>
+  <p:extLst>
+    <p:ext uri="{EFAFB233-063F-42B5-8137-9DF3F51BA10A}">
+      <p15:sldGuideLst xmlns:p15="http://schemas.microsoft.com/office/powerpoint/2012/main"/>
+    </p:ext>
+  </p:extLst>
 </p:presentation>
 </file>
 
@@ -201,7 +211,7 @@
           </a:lstStyle>
           <a:p>
             <a:fld id="{E211B9FA-8CB0-9347-9780-F0C7613563D5}" type="datetimeFigureOut">
-              <a:t>1/2/25</a:t>
+              <a:t>1/4/25</a:t>
             </a:fld>
             <a:endParaRPr lang="en-US"/>
           </a:p>
@@ -511,7 +521,10 @@
           <a:bodyPr/>
           <a:lstStyle/>
           <a:p>
-            <a:endParaRPr lang="en-US"/>
+            <a:r>
+              <a:rPr lang="en-US"/>
+              <a:t>https://www.unmannedsystemstechnology.com/company/sense-aeronautics/automatic-target-recognition/</a:t>
+            </a:r>
           </a:p>
         </p:txBody>
       </p:sp>
@@ -614,7 +627,7 @@
           <a:lstStyle/>
           <a:p>
             <a:fld id="{57FAE2F2-15A5-7946-8E81-C5B8DDF8F3A5}" type="slidenum">
-              <a:t>10</a:t>
+              <a:t>13</a:t>
             </a:fld>
             <a:endParaRPr lang="en-US"/>
           </a:p>
@@ -623,7 +636,7 @@
     </p:spTree>
     <p:extLst>
       <p:ext uri="{BB962C8B-B14F-4D97-AF65-F5344CB8AC3E}">
-        <p14:creationId xmlns:p14="http://schemas.microsoft.com/office/powerpoint/2010/main" val="3201831742"/>
+        <p14:creationId xmlns:p14="http://schemas.microsoft.com/office/powerpoint/2010/main" val="2634273261"/>
       </p:ext>
     </p:extLst>
   </p:cSld>
@@ -697,7 +710,173 @@
           <a:lstStyle/>
           <a:p>
             <a:fld id="{57FAE2F2-15A5-7946-8E81-C5B8DDF8F3A5}" type="slidenum">
-              <a:t>11</a:t>
+              <a:t>14</a:t>
+            </a:fld>
+            <a:endParaRPr lang="en-US"/>
+          </a:p>
+        </p:txBody>
+      </p:sp>
+    </p:spTree>
+    <p:extLst>
+      <p:ext uri="{BB962C8B-B14F-4D97-AF65-F5344CB8AC3E}">
+        <p14:creationId xmlns:p14="http://schemas.microsoft.com/office/powerpoint/2010/main" val="1433416517"/>
+      </p:ext>
+    </p:extLst>
+  </p:cSld>
+  <p:clrMapOvr>
+    <a:masterClrMapping/>
+  </p:clrMapOvr>
+</p:notes>
+</file>
+
+<file path=ppt/notesSlides/notesSlide12.xml><?xml version="1.0" encoding="utf-8"?>
+<p:notes xmlns:a="http://schemas.openxmlformats.org/drawingml/2006/main" xmlns:r="http://schemas.openxmlformats.org/officeDocument/2006/relationships" xmlns:p="http://schemas.openxmlformats.org/presentationml/2006/main">
+  <p:cSld>
+    <p:spTree>
+      <p:nvGrpSpPr>
+        <p:cNvPr id="1" name=""/>
+        <p:cNvGrpSpPr/>
+        <p:nvPr/>
+      </p:nvGrpSpPr>
+      <p:grpSpPr>
+        <a:xfrm>
+          <a:off x="0" y="0"/>
+          <a:ext cx="0" cy="0"/>
+          <a:chOff x="0" y="0"/>
+          <a:chExt cx="0" cy="0"/>
+        </a:xfrm>
+      </p:grpSpPr>
+      <p:sp>
+        <p:nvSpPr>
+          <p:cNvPr id="2" name="Slide Image Placeholder 1"/>
+          <p:cNvSpPr>
+            <a:spLocks noGrp="1" noRot="1" noChangeAspect="1"/>
+          </p:cNvSpPr>
+          <p:nvPr>
+            <p:ph type="sldImg"/>
+          </p:nvPr>
+        </p:nvSpPr>
+        <p:spPr/>
+      </p:sp>
+      <p:sp>
+        <p:nvSpPr>
+          <p:cNvPr id="3" name="Notes Placeholder 2"/>
+          <p:cNvSpPr>
+            <a:spLocks noGrp="1"/>
+          </p:cNvSpPr>
+          <p:nvPr>
+            <p:ph type="body" idx="1"/>
+          </p:nvPr>
+        </p:nvSpPr>
+        <p:spPr/>
+        <p:txBody>
+          <a:bodyPr/>
+          <a:lstStyle/>
+          <a:p>
+            <a:endParaRPr lang="en-US"/>
+          </a:p>
+        </p:txBody>
+      </p:sp>
+      <p:sp>
+        <p:nvSpPr>
+          <p:cNvPr id="4" name="Slide Number Placeholder 3"/>
+          <p:cNvSpPr>
+            <a:spLocks noGrp="1"/>
+          </p:cNvSpPr>
+          <p:nvPr>
+            <p:ph type="sldNum" sz="quarter" idx="5"/>
+          </p:nvPr>
+        </p:nvSpPr>
+        <p:spPr/>
+        <p:txBody>
+          <a:bodyPr/>
+          <a:lstStyle/>
+          <a:p>
+            <a:fld id="{57FAE2F2-15A5-7946-8E81-C5B8DDF8F3A5}" type="slidenum">
+              <a:t>15</a:t>
+            </a:fld>
+            <a:endParaRPr lang="en-US"/>
+          </a:p>
+        </p:txBody>
+      </p:sp>
+    </p:spTree>
+    <p:extLst>
+      <p:ext uri="{BB962C8B-B14F-4D97-AF65-F5344CB8AC3E}">
+        <p14:creationId xmlns:p14="http://schemas.microsoft.com/office/powerpoint/2010/main" val="3201831742"/>
+      </p:ext>
+    </p:extLst>
+  </p:cSld>
+  <p:clrMapOvr>
+    <a:masterClrMapping/>
+  </p:clrMapOvr>
+</p:notes>
+</file>
+
+<file path=ppt/notesSlides/notesSlide13.xml><?xml version="1.0" encoding="utf-8"?>
+<p:notes xmlns:a="http://schemas.openxmlformats.org/drawingml/2006/main" xmlns:r="http://schemas.openxmlformats.org/officeDocument/2006/relationships" xmlns:p="http://schemas.openxmlformats.org/presentationml/2006/main">
+  <p:cSld>
+    <p:spTree>
+      <p:nvGrpSpPr>
+        <p:cNvPr id="1" name=""/>
+        <p:cNvGrpSpPr/>
+        <p:nvPr/>
+      </p:nvGrpSpPr>
+      <p:grpSpPr>
+        <a:xfrm>
+          <a:off x="0" y="0"/>
+          <a:ext cx="0" cy="0"/>
+          <a:chOff x="0" y="0"/>
+          <a:chExt cx="0" cy="0"/>
+        </a:xfrm>
+      </p:grpSpPr>
+      <p:sp>
+        <p:nvSpPr>
+          <p:cNvPr id="2" name="Slide Image Placeholder 1"/>
+          <p:cNvSpPr>
+            <a:spLocks noGrp="1" noRot="1" noChangeAspect="1"/>
+          </p:cNvSpPr>
+          <p:nvPr>
+            <p:ph type="sldImg"/>
+          </p:nvPr>
+        </p:nvSpPr>
+        <p:spPr/>
+      </p:sp>
+      <p:sp>
+        <p:nvSpPr>
+          <p:cNvPr id="3" name="Notes Placeholder 2"/>
+          <p:cNvSpPr>
+            <a:spLocks noGrp="1"/>
+          </p:cNvSpPr>
+          <p:nvPr>
+            <p:ph type="body" idx="1"/>
+          </p:nvPr>
+        </p:nvSpPr>
+        <p:spPr/>
+        <p:txBody>
+          <a:bodyPr/>
+          <a:lstStyle/>
+          <a:p>
+            <a:endParaRPr lang="en-US"/>
+          </a:p>
+        </p:txBody>
+      </p:sp>
+      <p:sp>
+        <p:nvSpPr>
+          <p:cNvPr id="4" name="Slide Number Placeholder 3"/>
+          <p:cNvSpPr>
+            <a:spLocks noGrp="1"/>
+          </p:cNvSpPr>
+          <p:nvPr>
+            <p:ph type="sldNum" sz="quarter" idx="5"/>
+          </p:nvPr>
+        </p:nvSpPr>
+        <p:spPr/>
+        <p:txBody>
+          <a:bodyPr/>
+          <a:lstStyle/>
+          <a:p>
+            <a:fld id="{57FAE2F2-15A5-7946-8E81-C5B8DDF8F3A5}" type="slidenum">
+              <a:t>16</a:t>
             </a:fld>
             <a:endParaRPr lang="en-US"/>
           </a:p>
@@ -760,7 +939,10 @@
           <a:bodyPr/>
           <a:lstStyle/>
           <a:p>
-            <a:endParaRPr lang="en-US"/>
+            <a:r>
+              <a:rPr lang="en-US"/>
+              <a:t>https://www.anduril.com/mission-autonomy/</a:t>
+            </a:r>
           </a:p>
         </p:txBody>
       </p:sp>
@@ -780,6 +962,7 @@
           <a:lstStyle/>
           <a:p>
             <a:fld id="{57FAE2F2-15A5-7946-8E81-C5B8DDF8F3A5}" type="slidenum">
+              <a:rPr lang="en-US"/>
               <a:t>2</a:t>
             </a:fld>
             <a:endParaRPr lang="en-US"/>
@@ -789,7 +972,7 @@
     </p:spTree>
     <p:extLst>
       <p:ext uri="{BB962C8B-B14F-4D97-AF65-F5344CB8AC3E}">
-        <p14:creationId xmlns:p14="http://schemas.microsoft.com/office/powerpoint/2010/main" val="2076568155"/>
+        <p14:creationId xmlns:p14="http://schemas.microsoft.com/office/powerpoint/2010/main" val="4263515271"/>
       </p:ext>
     </p:extLst>
   </p:cSld>
@@ -863,6 +1046,7 @@
           <a:lstStyle/>
           <a:p>
             <a:fld id="{57FAE2F2-15A5-7946-8E81-C5B8DDF8F3A5}" type="slidenum">
+              <a:rPr lang="en-US"/>
               <a:t>3</a:t>
             </a:fld>
             <a:endParaRPr lang="en-US"/>
@@ -872,7 +1056,7 @@
     </p:spTree>
     <p:extLst>
       <p:ext uri="{BB962C8B-B14F-4D97-AF65-F5344CB8AC3E}">
-        <p14:creationId xmlns:p14="http://schemas.microsoft.com/office/powerpoint/2010/main" val="3870637215"/>
+        <p14:creationId xmlns:p14="http://schemas.microsoft.com/office/powerpoint/2010/main" val="1513555924"/>
       </p:ext>
     </p:extLst>
   </p:cSld>
@@ -946,7 +1130,7 @@
           <a:lstStyle/>
           <a:p>
             <a:fld id="{57FAE2F2-15A5-7946-8E81-C5B8DDF8F3A5}" type="slidenum">
-              <a:t>4</a:t>
+              <a:t>5</a:t>
             </a:fld>
             <a:endParaRPr lang="en-US"/>
           </a:p>
@@ -955,7 +1139,7 @@
     </p:spTree>
     <p:extLst>
       <p:ext uri="{BB962C8B-B14F-4D97-AF65-F5344CB8AC3E}">
-        <p14:creationId xmlns:p14="http://schemas.microsoft.com/office/powerpoint/2010/main" val="4040090847"/>
+        <p14:creationId xmlns:p14="http://schemas.microsoft.com/office/powerpoint/2010/main" val="2076568155"/>
       </p:ext>
     </p:extLst>
   </p:cSld>
@@ -1029,7 +1213,7 @@
           <a:lstStyle/>
           <a:p>
             <a:fld id="{57FAE2F2-15A5-7946-8E81-C5B8DDF8F3A5}" type="slidenum">
-              <a:t>5</a:t>
+              <a:t>6</a:t>
             </a:fld>
             <a:endParaRPr lang="en-US"/>
           </a:p>
@@ -1038,7 +1222,7 @@
     </p:spTree>
     <p:extLst>
       <p:ext uri="{BB962C8B-B14F-4D97-AF65-F5344CB8AC3E}">
-        <p14:creationId xmlns:p14="http://schemas.microsoft.com/office/powerpoint/2010/main" val="1276190430"/>
+        <p14:creationId xmlns:p14="http://schemas.microsoft.com/office/powerpoint/2010/main" val="3870637215"/>
       </p:ext>
     </p:extLst>
   </p:cSld>
@@ -1112,7 +1296,7 @@
           <a:lstStyle/>
           <a:p>
             <a:fld id="{57FAE2F2-15A5-7946-8E81-C5B8DDF8F3A5}" type="slidenum">
-              <a:t>6</a:t>
+              <a:t>8</a:t>
             </a:fld>
             <a:endParaRPr lang="en-US"/>
           </a:p>
@@ -1121,7 +1305,7 @@
     </p:spTree>
     <p:extLst>
       <p:ext uri="{BB962C8B-B14F-4D97-AF65-F5344CB8AC3E}">
-        <p14:creationId xmlns:p14="http://schemas.microsoft.com/office/powerpoint/2010/main" val="1265794021"/>
+        <p14:creationId xmlns:p14="http://schemas.microsoft.com/office/powerpoint/2010/main" val="4040090847"/>
       </p:ext>
     </p:extLst>
   </p:cSld>
@@ -1195,7 +1379,7 @@
           <a:lstStyle/>
           <a:p>
             <a:fld id="{57FAE2F2-15A5-7946-8E81-C5B8DDF8F3A5}" type="slidenum">
-              <a:t>7</a:t>
+              <a:t>10</a:t>
             </a:fld>
             <a:endParaRPr lang="en-US"/>
           </a:p>
@@ -1204,7 +1388,7 @@
     </p:spTree>
     <p:extLst>
       <p:ext uri="{BB962C8B-B14F-4D97-AF65-F5344CB8AC3E}">
-        <p14:creationId xmlns:p14="http://schemas.microsoft.com/office/powerpoint/2010/main" val="3183568284"/>
+        <p14:creationId xmlns:p14="http://schemas.microsoft.com/office/powerpoint/2010/main" val="1276190430"/>
       </p:ext>
     </p:extLst>
   </p:cSld>
@@ -1278,7 +1462,7 @@
           <a:lstStyle/>
           <a:p>
             <a:fld id="{57FAE2F2-15A5-7946-8E81-C5B8DDF8F3A5}" type="slidenum">
-              <a:t>8</a:t>
+              <a:t>11</a:t>
             </a:fld>
             <a:endParaRPr lang="en-US"/>
           </a:p>
@@ -1287,7 +1471,7 @@
     </p:spTree>
     <p:extLst>
       <p:ext uri="{BB962C8B-B14F-4D97-AF65-F5344CB8AC3E}">
-        <p14:creationId xmlns:p14="http://schemas.microsoft.com/office/powerpoint/2010/main" val="2634273261"/>
+        <p14:creationId xmlns:p14="http://schemas.microsoft.com/office/powerpoint/2010/main" val="1265794021"/>
       </p:ext>
     </p:extLst>
   </p:cSld>
@@ -1361,7 +1545,7 @@
           <a:lstStyle/>
           <a:p>
             <a:fld id="{57FAE2F2-15A5-7946-8E81-C5B8DDF8F3A5}" type="slidenum">
-              <a:t>9</a:t>
+              <a:t>12</a:t>
             </a:fld>
             <a:endParaRPr lang="en-US"/>
           </a:p>
@@ -1370,7 +1554,7 @@
     </p:spTree>
     <p:extLst>
       <p:ext uri="{BB962C8B-B14F-4D97-AF65-F5344CB8AC3E}">
-        <p14:creationId xmlns:p14="http://schemas.microsoft.com/office/powerpoint/2010/main" val="1433416517"/>
+        <p14:creationId xmlns:p14="http://schemas.microsoft.com/office/powerpoint/2010/main" val="3183568284"/>
       </p:ext>
     </p:extLst>
   </p:cSld>
@@ -1399,13 +1583,7 @@
       </p:grpSpPr>
       <p:sp>
         <p:nvSpPr>
-          <p:cNvPr id="2" name="Title 1">
-            <a:extLst>
-              <a:ext uri="{FF2B5EF4-FFF2-40B4-BE49-F238E27FC236}">
-                <a16:creationId xmlns:a16="http://schemas.microsoft.com/office/drawing/2014/main" id="{51BFA4D5-DD7A-758D-48C8-947F1B16FEFE}"/>
-              </a:ext>
-            </a:extLst>
-          </p:cNvPr>
+          <p:cNvPr id="2" name="Title 1"/>
           <p:cNvSpPr>
             <a:spLocks noGrp="1"/>
           </p:cNvSpPr>
@@ -1428,7 +1606,7 @@
           </a:lstStyle>
           <a:p>
             <a:r>
-              <a:rPr lang="en-US"/>
+              <a:rPr lang="en-US" dirty="0"/>
               <a:t>Click to edit Master title style</a:t>
             </a:r>
           </a:p>
@@ -1436,13 +1614,7 @@
       </p:sp>
       <p:sp>
         <p:nvSpPr>
-          <p:cNvPr id="3" name="Subtitle 2">
-            <a:extLst>
-              <a:ext uri="{FF2B5EF4-FFF2-40B4-BE49-F238E27FC236}">
-                <a16:creationId xmlns:a16="http://schemas.microsoft.com/office/drawing/2014/main" id="{FE50FDBB-3BBB-E7AB-C5C4-C0904950AC90}"/>
-              </a:ext>
-            </a:extLst>
-          </p:cNvPr>
+          <p:cNvPr id="3" name="Subtitle 2"/>
           <p:cNvSpPr>
             <a:spLocks noGrp="1"/>
           </p:cNvSpPr>
@@ -1498,7 +1670,7 @@
           </a:lstStyle>
           <a:p>
             <a:r>
-              <a:rPr lang="en-US"/>
+              <a:rPr lang="en-US" dirty="0"/>
               <a:t>Click to edit Master subtitle style</a:t>
             </a:r>
           </a:p>
@@ -1506,13 +1678,7 @@
       </p:sp>
       <p:sp>
         <p:nvSpPr>
-          <p:cNvPr id="4" name="Date Placeholder 3">
-            <a:extLst>
-              <a:ext uri="{FF2B5EF4-FFF2-40B4-BE49-F238E27FC236}">
-                <a16:creationId xmlns:a16="http://schemas.microsoft.com/office/drawing/2014/main" id="{FC164260-FE8B-E1C1-1CB9-22B690DBF70D}"/>
-              </a:ext>
-            </a:extLst>
-          </p:cNvPr>
+          <p:cNvPr id="4" name="Date Placeholder 3"/>
           <p:cNvSpPr>
             <a:spLocks noGrp="1"/>
           </p:cNvSpPr>
@@ -1526,7 +1692,8 @@
           <a:lstStyle/>
           <a:p>
             <a:fld id="{0CE49D37-DE82-A944-A799-DA76EC8094F2}" type="datetimeFigureOut">
-              <a:t>1/2/25</a:t>
+              <a:rPr lang="en-US"/>
+              <a:t>1/4/25</a:t>
             </a:fld>
             <a:endParaRPr lang="en-US"/>
           </a:p>
@@ -1534,13 +1701,7 @@
       </p:sp>
       <p:sp>
         <p:nvSpPr>
-          <p:cNvPr id="5" name="Footer Placeholder 4">
-            <a:extLst>
-              <a:ext uri="{FF2B5EF4-FFF2-40B4-BE49-F238E27FC236}">
-                <a16:creationId xmlns:a16="http://schemas.microsoft.com/office/drawing/2014/main" id="{F265339C-44CF-C4C1-BBDA-F8631CF75701}"/>
-              </a:ext>
-            </a:extLst>
-          </p:cNvPr>
+          <p:cNvPr id="5" name="Footer Placeholder 4"/>
           <p:cNvSpPr>
             <a:spLocks noGrp="1"/>
           </p:cNvSpPr>
@@ -1559,13 +1720,7 @@
       </p:sp>
       <p:sp>
         <p:nvSpPr>
-          <p:cNvPr id="6" name="Slide Number Placeholder 5">
-            <a:extLst>
-              <a:ext uri="{FF2B5EF4-FFF2-40B4-BE49-F238E27FC236}">
-                <a16:creationId xmlns:a16="http://schemas.microsoft.com/office/drawing/2014/main" id="{8F6FD621-22C4-0528-F798-8EE7C12434A9}"/>
-              </a:ext>
-            </a:extLst>
-          </p:cNvPr>
+          <p:cNvPr id="6" name="Slide Number Placeholder 5"/>
           <p:cNvSpPr>
             <a:spLocks noGrp="1"/>
           </p:cNvSpPr>
@@ -1579,6 +1734,7 @@
           <a:lstStyle/>
           <a:p>
             <a:fld id="{B9E7304B-7719-154A-8737-3D00501421C3}" type="slidenum">
+              <a:rPr lang="en-US"/>
               <a:t>‹#›</a:t>
             </a:fld>
             <a:endParaRPr lang="en-US"/>
@@ -1588,7 +1744,7 @@
     </p:spTree>
     <p:extLst>
       <p:ext uri="{BB962C8B-B14F-4D97-AF65-F5344CB8AC3E}">
-        <p14:creationId xmlns:p14="http://schemas.microsoft.com/office/powerpoint/2010/main" val="2612777690"/>
+        <p14:creationId xmlns:p14="http://schemas.microsoft.com/office/powerpoint/2010/main" val="3378495462"/>
       </p:ext>
     </p:extLst>
   </p:cSld>
@@ -1617,13 +1773,7 @@
       </p:grpSpPr>
       <p:sp>
         <p:nvSpPr>
-          <p:cNvPr id="2" name="Title 1">
-            <a:extLst>
-              <a:ext uri="{FF2B5EF4-FFF2-40B4-BE49-F238E27FC236}">
-                <a16:creationId xmlns:a16="http://schemas.microsoft.com/office/drawing/2014/main" id="{05C3FB61-506B-A199-4418-3400352ABC05}"/>
-              </a:ext>
-            </a:extLst>
-          </p:cNvPr>
+          <p:cNvPr id="2" name="Title 1"/>
           <p:cNvSpPr>
             <a:spLocks noGrp="1"/>
           </p:cNvSpPr>
@@ -1637,7 +1787,7 @@
           <a:lstStyle/>
           <a:p>
             <a:r>
-              <a:rPr lang="en-US"/>
+              <a:rPr lang="en-US" dirty="0"/>
               <a:t>Click to edit Master title style</a:t>
             </a:r>
           </a:p>
@@ -1645,13 +1795,7 @@
       </p:sp>
       <p:sp>
         <p:nvSpPr>
-          <p:cNvPr id="3" name="Vertical Text Placeholder 2">
-            <a:extLst>
-              <a:ext uri="{FF2B5EF4-FFF2-40B4-BE49-F238E27FC236}">
-                <a16:creationId xmlns:a16="http://schemas.microsoft.com/office/drawing/2014/main" id="{FF01C400-729D-C5B7-F297-6D1732658CE3}"/>
-              </a:ext>
-            </a:extLst>
-          </p:cNvPr>
+          <p:cNvPr id="3" name="Vertical Text Placeholder 2"/>
           <p:cNvSpPr>
             <a:spLocks noGrp="1"/>
           </p:cNvSpPr>
@@ -1666,35 +1810,35 @@
           <a:p>
             <a:pPr lvl="0"/>
             <a:r>
-              <a:rPr lang="en-US"/>
+              <a:rPr lang="en-US" dirty="0"/>
               <a:t>Click to edit Master text styles</a:t>
             </a:r>
           </a:p>
           <a:p>
             <a:pPr lvl="1"/>
             <a:r>
-              <a:rPr lang="en-US"/>
+              <a:rPr lang="en-US" dirty="0"/>
               <a:t>Second level</a:t>
             </a:r>
           </a:p>
           <a:p>
             <a:pPr lvl="2"/>
             <a:r>
-              <a:rPr lang="en-US"/>
+              <a:rPr lang="en-US" dirty="0"/>
               <a:t>Third level</a:t>
             </a:r>
           </a:p>
           <a:p>
             <a:pPr lvl="3"/>
             <a:r>
-              <a:rPr lang="en-US"/>
+              <a:rPr lang="en-US" dirty="0"/>
               <a:t>Fourth level</a:t>
             </a:r>
           </a:p>
           <a:p>
             <a:pPr lvl="4"/>
             <a:r>
-              <a:rPr lang="en-US"/>
+              <a:rPr lang="en-US" dirty="0"/>
               <a:t>Fifth level</a:t>
             </a:r>
           </a:p>
@@ -1702,13 +1846,7 @@
       </p:sp>
       <p:sp>
         <p:nvSpPr>
-          <p:cNvPr id="4" name="Date Placeholder 3">
-            <a:extLst>
-              <a:ext uri="{FF2B5EF4-FFF2-40B4-BE49-F238E27FC236}">
-                <a16:creationId xmlns:a16="http://schemas.microsoft.com/office/drawing/2014/main" id="{C628E3C3-F370-9F84-0E88-42DE868016E9}"/>
-              </a:ext>
-            </a:extLst>
-          </p:cNvPr>
+          <p:cNvPr id="4" name="Date Placeholder 3"/>
           <p:cNvSpPr>
             <a:spLocks noGrp="1"/>
           </p:cNvSpPr>
@@ -1722,7 +1860,8 @@
           <a:lstStyle/>
           <a:p>
             <a:fld id="{0CE49D37-DE82-A944-A799-DA76EC8094F2}" type="datetimeFigureOut">
-              <a:t>1/2/25</a:t>
+              <a:rPr lang="en-US"/>
+              <a:t>1/4/25</a:t>
             </a:fld>
             <a:endParaRPr lang="en-US"/>
           </a:p>
@@ -1730,13 +1869,7 @@
       </p:sp>
       <p:sp>
         <p:nvSpPr>
-          <p:cNvPr id="5" name="Footer Placeholder 4">
-            <a:extLst>
-              <a:ext uri="{FF2B5EF4-FFF2-40B4-BE49-F238E27FC236}">
-                <a16:creationId xmlns:a16="http://schemas.microsoft.com/office/drawing/2014/main" id="{2D58D1ED-0AF4-ED5B-144B-5618FD0E5DBD}"/>
-              </a:ext>
-            </a:extLst>
-          </p:cNvPr>
+          <p:cNvPr id="5" name="Footer Placeholder 4"/>
           <p:cNvSpPr>
             <a:spLocks noGrp="1"/>
           </p:cNvSpPr>
@@ -1755,13 +1888,7 @@
       </p:sp>
       <p:sp>
         <p:nvSpPr>
-          <p:cNvPr id="6" name="Slide Number Placeholder 5">
-            <a:extLst>
-              <a:ext uri="{FF2B5EF4-FFF2-40B4-BE49-F238E27FC236}">
-                <a16:creationId xmlns:a16="http://schemas.microsoft.com/office/drawing/2014/main" id="{811D0F2D-19E7-FCBB-4F1E-060E00FD313A}"/>
-              </a:ext>
-            </a:extLst>
-          </p:cNvPr>
+          <p:cNvPr id="6" name="Slide Number Placeholder 5"/>
           <p:cNvSpPr>
             <a:spLocks noGrp="1"/>
           </p:cNvSpPr>
@@ -1775,6 +1902,7 @@
           <a:lstStyle/>
           <a:p>
             <a:fld id="{B9E7304B-7719-154A-8737-3D00501421C3}" type="slidenum">
+              <a:rPr lang="en-US"/>
               <a:t>‹#›</a:t>
             </a:fld>
             <a:endParaRPr lang="en-US"/>
@@ -1784,7 +1912,7 @@
     </p:spTree>
     <p:extLst>
       <p:ext uri="{BB962C8B-B14F-4D97-AF65-F5344CB8AC3E}">
-        <p14:creationId xmlns:p14="http://schemas.microsoft.com/office/powerpoint/2010/main" val="672958039"/>
+        <p14:creationId xmlns:p14="http://schemas.microsoft.com/office/powerpoint/2010/main" val="3956066455"/>
       </p:ext>
     </p:extLst>
   </p:cSld>
@@ -1813,13 +1941,7 @@
       </p:grpSpPr>
       <p:sp>
         <p:nvSpPr>
-          <p:cNvPr id="2" name="Vertical Title 1">
-            <a:extLst>
-              <a:ext uri="{FF2B5EF4-FFF2-40B4-BE49-F238E27FC236}">
-                <a16:creationId xmlns:a16="http://schemas.microsoft.com/office/drawing/2014/main" id="{B97A1D20-472A-EA5D-C38A-A53E32C68FCA}"/>
-              </a:ext>
-            </a:extLst>
-          </p:cNvPr>
+          <p:cNvPr id="2" name="Vertical Title 1"/>
           <p:cNvSpPr>
             <a:spLocks noGrp="1"/>
           </p:cNvSpPr>
@@ -1838,7 +1960,7 @@
           <a:lstStyle/>
           <a:p>
             <a:r>
-              <a:rPr lang="en-US"/>
+              <a:rPr lang="en-US" dirty="0"/>
               <a:t>Click to edit Master title style</a:t>
             </a:r>
           </a:p>
@@ -1846,13 +1968,7 @@
       </p:sp>
       <p:sp>
         <p:nvSpPr>
-          <p:cNvPr id="3" name="Vertical Text Placeholder 2">
-            <a:extLst>
-              <a:ext uri="{FF2B5EF4-FFF2-40B4-BE49-F238E27FC236}">
-                <a16:creationId xmlns:a16="http://schemas.microsoft.com/office/drawing/2014/main" id="{42132EDC-7AA9-432B-DD29-0B6938D8AA79}"/>
-              </a:ext>
-            </a:extLst>
-          </p:cNvPr>
+          <p:cNvPr id="3" name="Vertical Text Placeholder 2"/>
           <p:cNvSpPr>
             <a:spLocks noGrp="1"/>
           </p:cNvSpPr>
@@ -1872,35 +1988,35 @@
           <a:p>
             <a:pPr lvl="0"/>
             <a:r>
-              <a:rPr lang="en-US"/>
+              <a:rPr lang="en-US" dirty="0"/>
               <a:t>Click to edit Master text styles</a:t>
             </a:r>
           </a:p>
           <a:p>
             <a:pPr lvl="1"/>
             <a:r>
-              <a:rPr lang="en-US"/>
+              <a:rPr lang="en-US" dirty="0"/>
               <a:t>Second level</a:t>
             </a:r>
           </a:p>
           <a:p>
             <a:pPr lvl="2"/>
             <a:r>
-              <a:rPr lang="en-US"/>
+              <a:rPr lang="en-US" dirty="0"/>
               <a:t>Third level</a:t>
             </a:r>
           </a:p>
           <a:p>
             <a:pPr lvl="3"/>
             <a:r>
-              <a:rPr lang="en-US"/>
+              <a:rPr lang="en-US" dirty="0"/>
               <a:t>Fourth level</a:t>
             </a:r>
           </a:p>
           <a:p>
             <a:pPr lvl="4"/>
             <a:r>
-              <a:rPr lang="en-US"/>
+              <a:rPr lang="en-US" dirty="0"/>
               <a:t>Fifth level</a:t>
             </a:r>
           </a:p>
@@ -1908,13 +2024,7 @@
       </p:sp>
       <p:sp>
         <p:nvSpPr>
-          <p:cNvPr id="4" name="Date Placeholder 3">
-            <a:extLst>
-              <a:ext uri="{FF2B5EF4-FFF2-40B4-BE49-F238E27FC236}">
-                <a16:creationId xmlns:a16="http://schemas.microsoft.com/office/drawing/2014/main" id="{C3AFADEC-11AF-7B79-7932-D23B24FE93E0}"/>
-              </a:ext>
-            </a:extLst>
-          </p:cNvPr>
+          <p:cNvPr id="4" name="Date Placeholder 3"/>
           <p:cNvSpPr>
             <a:spLocks noGrp="1"/>
           </p:cNvSpPr>
@@ -1928,7 +2038,8 @@
           <a:lstStyle/>
           <a:p>
             <a:fld id="{0CE49D37-DE82-A944-A799-DA76EC8094F2}" type="datetimeFigureOut">
-              <a:t>1/2/25</a:t>
+              <a:rPr lang="en-US"/>
+              <a:t>1/4/25</a:t>
             </a:fld>
             <a:endParaRPr lang="en-US"/>
           </a:p>
@@ -1936,13 +2047,7 @@
       </p:sp>
       <p:sp>
         <p:nvSpPr>
-          <p:cNvPr id="5" name="Footer Placeholder 4">
-            <a:extLst>
-              <a:ext uri="{FF2B5EF4-FFF2-40B4-BE49-F238E27FC236}">
-                <a16:creationId xmlns:a16="http://schemas.microsoft.com/office/drawing/2014/main" id="{47910593-CDBF-CC32-C976-C36D36452215}"/>
-              </a:ext>
-            </a:extLst>
-          </p:cNvPr>
+          <p:cNvPr id="5" name="Footer Placeholder 4"/>
           <p:cNvSpPr>
             <a:spLocks noGrp="1"/>
           </p:cNvSpPr>
@@ -1961,13 +2066,7 @@
       </p:sp>
       <p:sp>
         <p:nvSpPr>
-          <p:cNvPr id="6" name="Slide Number Placeholder 5">
-            <a:extLst>
-              <a:ext uri="{FF2B5EF4-FFF2-40B4-BE49-F238E27FC236}">
-                <a16:creationId xmlns:a16="http://schemas.microsoft.com/office/drawing/2014/main" id="{75708491-397B-DF8F-EBD2-C82E290E2FEB}"/>
-              </a:ext>
-            </a:extLst>
-          </p:cNvPr>
+          <p:cNvPr id="6" name="Slide Number Placeholder 5"/>
           <p:cNvSpPr>
             <a:spLocks noGrp="1"/>
           </p:cNvSpPr>
@@ -1981,6 +2080,7 @@
           <a:lstStyle/>
           <a:p>
             <a:fld id="{B9E7304B-7719-154A-8737-3D00501421C3}" type="slidenum">
+              <a:rPr lang="en-US"/>
               <a:t>‹#›</a:t>
             </a:fld>
             <a:endParaRPr lang="en-US"/>
@@ -1990,7 +2090,7 @@
     </p:spTree>
     <p:extLst>
       <p:ext uri="{BB962C8B-B14F-4D97-AF65-F5344CB8AC3E}">
-        <p14:creationId xmlns:p14="http://schemas.microsoft.com/office/powerpoint/2010/main" val="4147070998"/>
+        <p14:creationId xmlns:p14="http://schemas.microsoft.com/office/powerpoint/2010/main" val="32386254"/>
       </p:ext>
     </p:extLst>
   </p:cSld>
@@ -2019,13 +2119,7 @@
       </p:grpSpPr>
       <p:sp>
         <p:nvSpPr>
-          <p:cNvPr id="2" name="Title 1">
-            <a:extLst>
-              <a:ext uri="{FF2B5EF4-FFF2-40B4-BE49-F238E27FC236}">
-                <a16:creationId xmlns:a16="http://schemas.microsoft.com/office/drawing/2014/main" id="{D759DEFD-4DF7-C650-E0C3-8BFDDA35E8B8}"/>
-              </a:ext>
-            </a:extLst>
-          </p:cNvPr>
+          <p:cNvPr id="2" name="Title 1"/>
           <p:cNvSpPr>
             <a:spLocks noGrp="1"/>
           </p:cNvSpPr>
@@ -2039,7 +2133,7 @@
           <a:lstStyle/>
           <a:p>
             <a:r>
-              <a:rPr lang="en-US"/>
+              <a:rPr lang="en-US" dirty="0"/>
               <a:t>Click to edit Master title style</a:t>
             </a:r>
           </a:p>
@@ -2047,13 +2141,7 @@
       </p:sp>
       <p:sp>
         <p:nvSpPr>
-          <p:cNvPr id="3" name="Content Placeholder 2">
-            <a:extLst>
-              <a:ext uri="{FF2B5EF4-FFF2-40B4-BE49-F238E27FC236}">
-                <a16:creationId xmlns:a16="http://schemas.microsoft.com/office/drawing/2014/main" id="{C7D660FF-50DE-6EF5-D663-1C5E73B925A0}"/>
-              </a:ext>
-            </a:extLst>
-          </p:cNvPr>
+          <p:cNvPr id="3" name="Content Placeholder 2"/>
           <p:cNvSpPr>
             <a:spLocks noGrp="1"/>
           </p:cNvSpPr>
@@ -2068,35 +2156,35 @@
           <a:p>
             <a:pPr lvl="0"/>
             <a:r>
-              <a:rPr lang="en-US"/>
+              <a:rPr lang="en-US" dirty="0"/>
               <a:t>Click to edit Master text styles</a:t>
             </a:r>
           </a:p>
           <a:p>
             <a:pPr lvl="1"/>
             <a:r>
-              <a:rPr lang="en-US"/>
+              <a:rPr lang="en-US" dirty="0"/>
               <a:t>Second level</a:t>
             </a:r>
           </a:p>
           <a:p>
             <a:pPr lvl="2"/>
             <a:r>
-              <a:rPr lang="en-US"/>
+              <a:rPr lang="en-US" dirty="0"/>
               <a:t>Third level</a:t>
             </a:r>
           </a:p>
           <a:p>
             <a:pPr lvl="3"/>
             <a:r>
-              <a:rPr lang="en-US"/>
+              <a:rPr lang="en-US" dirty="0"/>
               <a:t>Fourth level</a:t>
             </a:r>
           </a:p>
           <a:p>
             <a:pPr lvl="4"/>
             <a:r>
-              <a:rPr lang="en-US"/>
+              <a:rPr lang="en-US" dirty="0"/>
               <a:t>Fifth level</a:t>
             </a:r>
           </a:p>
@@ -2104,13 +2192,7 @@
       </p:sp>
       <p:sp>
         <p:nvSpPr>
-          <p:cNvPr id="4" name="Date Placeholder 3">
-            <a:extLst>
-              <a:ext uri="{FF2B5EF4-FFF2-40B4-BE49-F238E27FC236}">
-                <a16:creationId xmlns:a16="http://schemas.microsoft.com/office/drawing/2014/main" id="{A4E92A69-2164-95F2-2923-BC092034298B}"/>
-              </a:ext>
-            </a:extLst>
-          </p:cNvPr>
+          <p:cNvPr id="4" name="Date Placeholder 3"/>
           <p:cNvSpPr>
             <a:spLocks noGrp="1"/>
           </p:cNvSpPr>
@@ -2124,7 +2206,8 @@
           <a:lstStyle/>
           <a:p>
             <a:fld id="{0CE49D37-DE82-A944-A799-DA76EC8094F2}" type="datetimeFigureOut">
-              <a:t>1/2/25</a:t>
+              <a:rPr lang="en-US"/>
+              <a:t>1/4/25</a:t>
             </a:fld>
             <a:endParaRPr lang="en-US"/>
           </a:p>
@@ -2132,13 +2215,7 @@
       </p:sp>
       <p:sp>
         <p:nvSpPr>
-          <p:cNvPr id="5" name="Footer Placeholder 4">
-            <a:extLst>
-              <a:ext uri="{FF2B5EF4-FFF2-40B4-BE49-F238E27FC236}">
-                <a16:creationId xmlns:a16="http://schemas.microsoft.com/office/drawing/2014/main" id="{C2FCC822-99B8-C8BB-AFF6-1099FA25CC96}"/>
-              </a:ext>
-            </a:extLst>
-          </p:cNvPr>
+          <p:cNvPr id="5" name="Footer Placeholder 4"/>
           <p:cNvSpPr>
             <a:spLocks noGrp="1"/>
           </p:cNvSpPr>
@@ -2157,13 +2234,7 @@
       </p:sp>
       <p:sp>
         <p:nvSpPr>
-          <p:cNvPr id="6" name="Slide Number Placeholder 5">
-            <a:extLst>
-              <a:ext uri="{FF2B5EF4-FFF2-40B4-BE49-F238E27FC236}">
-                <a16:creationId xmlns:a16="http://schemas.microsoft.com/office/drawing/2014/main" id="{D163AD5B-3BB6-7418-9127-F84D00DF271C}"/>
-              </a:ext>
-            </a:extLst>
-          </p:cNvPr>
+          <p:cNvPr id="6" name="Slide Number Placeholder 5"/>
           <p:cNvSpPr>
             <a:spLocks noGrp="1"/>
           </p:cNvSpPr>
@@ -2177,6 +2248,7 @@
           <a:lstStyle/>
           <a:p>
             <a:fld id="{B9E7304B-7719-154A-8737-3D00501421C3}" type="slidenum">
+              <a:rPr lang="en-US"/>
               <a:t>‹#›</a:t>
             </a:fld>
             <a:endParaRPr lang="en-US"/>
@@ -2186,7 +2258,7 @@
     </p:spTree>
     <p:extLst>
       <p:ext uri="{BB962C8B-B14F-4D97-AF65-F5344CB8AC3E}">
-        <p14:creationId xmlns:p14="http://schemas.microsoft.com/office/powerpoint/2010/main" val="1673321920"/>
+        <p14:creationId xmlns:p14="http://schemas.microsoft.com/office/powerpoint/2010/main" val="4047448605"/>
       </p:ext>
     </p:extLst>
   </p:cSld>
@@ -2215,13 +2287,7 @@
       </p:grpSpPr>
       <p:sp>
         <p:nvSpPr>
-          <p:cNvPr id="2" name="Title 1">
-            <a:extLst>
-              <a:ext uri="{FF2B5EF4-FFF2-40B4-BE49-F238E27FC236}">
-                <a16:creationId xmlns:a16="http://schemas.microsoft.com/office/drawing/2014/main" id="{92BB3D86-07D3-F975-D49C-3CCCCFE9FC0D}"/>
-              </a:ext>
-            </a:extLst>
-          </p:cNvPr>
+          <p:cNvPr id="2" name="Title 1"/>
           <p:cNvSpPr>
             <a:spLocks noGrp="1"/>
           </p:cNvSpPr>
@@ -2244,7 +2310,7 @@
           </a:lstStyle>
           <a:p>
             <a:r>
-              <a:rPr lang="en-US"/>
+              <a:rPr lang="en-US" dirty="0"/>
               <a:t>Click to edit Master title style</a:t>
             </a:r>
           </a:p>
@@ -2252,13 +2318,7 @@
       </p:sp>
       <p:sp>
         <p:nvSpPr>
-          <p:cNvPr id="3" name="Text Placeholder 2">
-            <a:extLst>
-              <a:ext uri="{FF2B5EF4-FFF2-40B4-BE49-F238E27FC236}">
-                <a16:creationId xmlns:a16="http://schemas.microsoft.com/office/drawing/2014/main" id="{6006F25E-5394-2B0F-BEB3-F438EAD4169A}"/>
-              </a:ext>
-            </a:extLst>
-          </p:cNvPr>
+          <p:cNvPr id="3" name="Text Placeholder 2"/>
           <p:cNvSpPr>
             <a:spLocks noGrp="1"/>
           </p:cNvSpPr>
@@ -2369,7 +2429,7 @@
           <a:p>
             <a:pPr lvl="0"/>
             <a:r>
-              <a:rPr lang="en-US"/>
+              <a:rPr lang="en-US" dirty="0"/>
               <a:t>Click to edit Master text styles</a:t>
             </a:r>
           </a:p>
@@ -2377,13 +2437,7 @@
       </p:sp>
       <p:sp>
         <p:nvSpPr>
-          <p:cNvPr id="4" name="Date Placeholder 3">
-            <a:extLst>
-              <a:ext uri="{FF2B5EF4-FFF2-40B4-BE49-F238E27FC236}">
-                <a16:creationId xmlns:a16="http://schemas.microsoft.com/office/drawing/2014/main" id="{1968AC65-475A-F875-CF75-79B6757D04F9}"/>
-              </a:ext>
-            </a:extLst>
-          </p:cNvPr>
+          <p:cNvPr id="4" name="Date Placeholder 3"/>
           <p:cNvSpPr>
             <a:spLocks noGrp="1"/>
           </p:cNvSpPr>
@@ -2397,7 +2451,8 @@
           <a:lstStyle/>
           <a:p>
             <a:fld id="{0CE49D37-DE82-A944-A799-DA76EC8094F2}" type="datetimeFigureOut">
-              <a:t>1/2/25</a:t>
+              <a:rPr lang="en-US"/>
+              <a:t>1/4/25</a:t>
             </a:fld>
             <a:endParaRPr lang="en-US"/>
           </a:p>
@@ -2405,13 +2460,7 @@
       </p:sp>
       <p:sp>
         <p:nvSpPr>
-          <p:cNvPr id="5" name="Footer Placeholder 4">
-            <a:extLst>
-              <a:ext uri="{FF2B5EF4-FFF2-40B4-BE49-F238E27FC236}">
-                <a16:creationId xmlns:a16="http://schemas.microsoft.com/office/drawing/2014/main" id="{02872AB5-591C-FD90-FA9C-1BE7A64267EC}"/>
-              </a:ext>
-            </a:extLst>
-          </p:cNvPr>
+          <p:cNvPr id="5" name="Footer Placeholder 4"/>
           <p:cNvSpPr>
             <a:spLocks noGrp="1"/>
           </p:cNvSpPr>
@@ -2430,13 +2479,7 @@
       </p:sp>
       <p:sp>
         <p:nvSpPr>
-          <p:cNvPr id="6" name="Slide Number Placeholder 5">
-            <a:extLst>
-              <a:ext uri="{FF2B5EF4-FFF2-40B4-BE49-F238E27FC236}">
-                <a16:creationId xmlns:a16="http://schemas.microsoft.com/office/drawing/2014/main" id="{A684048E-EED7-96A8-967A-29CB01A7427D}"/>
-              </a:ext>
-            </a:extLst>
-          </p:cNvPr>
+          <p:cNvPr id="6" name="Slide Number Placeholder 5"/>
           <p:cNvSpPr>
             <a:spLocks noGrp="1"/>
           </p:cNvSpPr>
@@ -2450,6 +2493,7 @@
           <a:lstStyle/>
           <a:p>
             <a:fld id="{B9E7304B-7719-154A-8737-3D00501421C3}" type="slidenum">
+              <a:rPr lang="en-US"/>
               <a:t>‹#›</a:t>
             </a:fld>
             <a:endParaRPr lang="en-US"/>
@@ -2459,7 +2503,7 @@
     </p:spTree>
     <p:extLst>
       <p:ext uri="{BB962C8B-B14F-4D97-AF65-F5344CB8AC3E}">
-        <p14:creationId xmlns:p14="http://schemas.microsoft.com/office/powerpoint/2010/main" val="2189228242"/>
+        <p14:creationId xmlns:p14="http://schemas.microsoft.com/office/powerpoint/2010/main" val="2470748768"/>
       </p:ext>
     </p:extLst>
   </p:cSld>
@@ -2488,13 +2532,7 @@
       </p:grpSpPr>
       <p:sp>
         <p:nvSpPr>
-          <p:cNvPr id="2" name="Title 1">
-            <a:extLst>
-              <a:ext uri="{FF2B5EF4-FFF2-40B4-BE49-F238E27FC236}">
-                <a16:creationId xmlns:a16="http://schemas.microsoft.com/office/drawing/2014/main" id="{A53EEA80-131B-73C2-8E2E-CF9E98429801}"/>
-              </a:ext>
-            </a:extLst>
-          </p:cNvPr>
+          <p:cNvPr id="2" name="Title 1"/>
           <p:cNvSpPr>
             <a:spLocks noGrp="1"/>
           </p:cNvSpPr>
@@ -2508,7 +2546,7 @@
           <a:lstStyle/>
           <a:p>
             <a:r>
-              <a:rPr lang="en-US"/>
+              <a:rPr lang="en-US" dirty="0"/>
               <a:t>Click to edit Master title style</a:t>
             </a:r>
           </a:p>
@@ -2516,13 +2554,7 @@
       </p:sp>
       <p:sp>
         <p:nvSpPr>
-          <p:cNvPr id="3" name="Content Placeholder 2">
-            <a:extLst>
-              <a:ext uri="{FF2B5EF4-FFF2-40B4-BE49-F238E27FC236}">
-                <a16:creationId xmlns:a16="http://schemas.microsoft.com/office/drawing/2014/main" id="{C7C6C536-D316-9839-A33A-C0A48AC6E89B}"/>
-              </a:ext>
-            </a:extLst>
-          </p:cNvPr>
+          <p:cNvPr id="3" name="Content Placeholder 2"/>
           <p:cNvSpPr>
             <a:spLocks noGrp="1"/>
           </p:cNvSpPr>
@@ -2542,35 +2574,35 @@
           <a:p>
             <a:pPr lvl="0"/>
             <a:r>
-              <a:rPr lang="en-US"/>
+              <a:rPr lang="en-US" dirty="0"/>
               <a:t>Click to edit Master text styles</a:t>
             </a:r>
           </a:p>
           <a:p>
             <a:pPr lvl="1"/>
             <a:r>
-              <a:rPr lang="en-US"/>
+              <a:rPr lang="en-US" dirty="0"/>
               <a:t>Second level</a:t>
             </a:r>
           </a:p>
           <a:p>
             <a:pPr lvl="2"/>
             <a:r>
-              <a:rPr lang="en-US"/>
+              <a:rPr lang="en-US" dirty="0"/>
               <a:t>Third level</a:t>
             </a:r>
           </a:p>
           <a:p>
             <a:pPr lvl="3"/>
             <a:r>
-              <a:rPr lang="en-US"/>
+              <a:rPr lang="en-US" dirty="0"/>
               <a:t>Fourth level</a:t>
             </a:r>
           </a:p>
           <a:p>
             <a:pPr lvl="4"/>
             <a:r>
-              <a:rPr lang="en-US"/>
+              <a:rPr lang="en-US" dirty="0"/>
               <a:t>Fifth level</a:t>
             </a:r>
           </a:p>
@@ -2578,13 +2610,7 @@
       </p:sp>
       <p:sp>
         <p:nvSpPr>
-          <p:cNvPr id="4" name="Content Placeholder 3">
-            <a:extLst>
-              <a:ext uri="{FF2B5EF4-FFF2-40B4-BE49-F238E27FC236}">
-                <a16:creationId xmlns:a16="http://schemas.microsoft.com/office/drawing/2014/main" id="{BDAAC23F-558C-CF32-C0E0-26F5B6B50139}"/>
-              </a:ext>
-            </a:extLst>
-          </p:cNvPr>
+          <p:cNvPr id="4" name="Content Placeholder 3"/>
           <p:cNvSpPr>
             <a:spLocks noGrp="1"/>
           </p:cNvSpPr>
@@ -2604,35 +2630,35 @@
           <a:p>
             <a:pPr lvl="0"/>
             <a:r>
-              <a:rPr lang="en-US"/>
+              <a:rPr lang="en-US" dirty="0"/>
               <a:t>Click to edit Master text styles</a:t>
             </a:r>
           </a:p>
           <a:p>
             <a:pPr lvl="1"/>
             <a:r>
-              <a:rPr lang="en-US"/>
+              <a:rPr lang="en-US" dirty="0"/>
               <a:t>Second level</a:t>
             </a:r>
           </a:p>
           <a:p>
             <a:pPr lvl="2"/>
             <a:r>
-              <a:rPr lang="en-US"/>
+              <a:rPr lang="en-US" dirty="0"/>
               <a:t>Third level</a:t>
             </a:r>
           </a:p>
           <a:p>
             <a:pPr lvl="3"/>
             <a:r>
-              <a:rPr lang="en-US"/>
+              <a:rPr lang="en-US" dirty="0"/>
               <a:t>Fourth level</a:t>
             </a:r>
           </a:p>
           <a:p>
             <a:pPr lvl="4"/>
             <a:r>
-              <a:rPr lang="en-US"/>
+              <a:rPr lang="en-US" dirty="0"/>
               <a:t>Fifth level</a:t>
             </a:r>
           </a:p>
@@ -2640,13 +2666,7 @@
       </p:sp>
       <p:sp>
         <p:nvSpPr>
-          <p:cNvPr id="5" name="Date Placeholder 4">
-            <a:extLst>
-              <a:ext uri="{FF2B5EF4-FFF2-40B4-BE49-F238E27FC236}">
-                <a16:creationId xmlns:a16="http://schemas.microsoft.com/office/drawing/2014/main" id="{20210AB5-F4DD-AC2C-7DDD-3F30A263776A}"/>
-              </a:ext>
-            </a:extLst>
-          </p:cNvPr>
+          <p:cNvPr id="5" name="Date Placeholder 4"/>
           <p:cNvSpPr>
             <a:spLocks noGrp="1"/>
           </p:cNvSpPr>
@@ -2660,7 +2680,8 @@
           <a:lstStyle/>
           <a:p>
             <a:fld id="{0CE49D37-DE82-A944-A799-DA76EC8094F2}" type="datetimeFigureOut">
-              <a:t>1/2/25</a:t>
+              <a:rPr lang="en-US"/>
+              <a:t>1/4/25</a:t>
             </a:fld>
             <a:endParaRPr lang="en-US"/>
           </a:p>
@@ -2668,13 +2689,7 @@
       </p:sp>
       <p:sp>
         <p:nvSpPr>
-          <p:cNvPr id="6" name="Footer Placeholder 5">
-            <a:extLst>
-              <a:ext uri="{FF2B5EF4-FFF2-40B4-BE49-F238E27FC236}">
-                <a16:creationId xmlns:a16="http://schemas.microsoft.com/office/drawing/2014/main" id="{C10D3730-B2C1-6360-8278-579C88D17C19}"/>
-              </a:ext>
-            </a:extLst>
-          </p:cNvPr>
+          <p:cNvPr id="6" name="Footer Placeholder 5"/>
           <p:cNvSpPr>
             <a:spLocks noGrp="1"/>
           </p:cNvSpPr>
@@ -2693,13 +2708,7 @@
       </p:sp>
       <p:sp>
         <p:nvSpPr>
-          <p:cNvPr id="7" name="Slide Number Placeholder 6">
-            <a:extLst>
-              <a:ext uri="{FF2B5EF4-FFF2-40B4-BE49-F238E27FC236}">
-                <a16:creationId xmlns:a16="http://schemas.microsoft.com/office/drawing/2014/main" id="{5DD1BDAA-0C20-346C-C935-BE92E21813A9}"/>
-              </a:ext>
-            </a:extLst>
-          </p:cNvPr>
+          <p:cNvPr id="7" name="Slide Number Placeholder 6"/>
           <p:cNvSpPr>
             <a:spLocks noGrp="1"/>
           </p:cNvSpPr>
@@ -2713,6 +2722,7 @@
           <a:lstStyle/>
           <a:p>
             <a:fld id="{B9E7304B-7719-154A-8737-3D00501421C3}" type="slidenum">
+              <a:rPr lang="en-US"/>
               <a:t>‹#›</a:t>
             </a:fld>
             <a:endParaRPr lang="en-US"/>
@@ -2722,7 +2732,7 @@
     </p:spTree>
     <p:extLst>
       <p:ext uri="{BB962C8B-B14F-4D97-AF65-F5344CB8AC3E}">
-        <p14:creationId xmlns:p14="http://schemas.microsoft.com/office/powerpoint/2010/main" val="3271118928"/>
+        <p14:creationId xmlns:p14="http://schemas.microsoft.com/office/powerpoint/2010/main" val="3260728094"/>
       </p:ext>
     </p:extLst>
   </p:cSld>
@@ -2751,13 +2761,7 @@
       </p:grpSpPr>
       <p:sp>
         <p:nvSpPr>
-          <p:cNvPr id="2" name="Title 1">
-            <a:extLst>
-              <a:ext uri="{FF2B5EF4-FFF2-40B4-BE49-F238E27FC236}">
-                <a16:creationId xmlns:a16="http://schemas.microsoft.com/office/drawing/2014/main" id="{4C121DF3-1913-C3A8-C3B6-9093A41DF81F}"/>
-              </a:ext>
-            </a:extLst>
-          </p:cNvPr>
+          <p:cNvPr id="2" name="Title 1"/>
           <p:cNvSpPr>
             <a:spLocks noGrp="1"/>
           </p:cNvSpPr>
@@ -2776,7 +2780,7 @@
           <a:lstStyle/>
           <a:p>
             <a:r>
-              <a:rPr lang="en-US"/>
+              <a:rPr lang="en-US" dirty="0"/>
               <a:t>Click to edit Master title style</a:t>
             </a:r>
           </a:p>
@@ -2784,13 +2788,7 @@
       </p:sp>
       <p:sp>
         <p:nvSpPr>
-          <p:cNvPr id="3" name="Text Placeholder 2">
-            <a:extLst>
-              <a:ext uri="{FF2B5EF4-FFF2-40B4-BE49-F238E27FC236}">
-                <a16:creationId xmlns:a16="http://schemas.microsoft.com/office/drawing/2014/main" id="{85D23349-A07C-652B-1DF6-BB48BF7C6E8B}"/>
-              </a:ext>
-            </a:extLst>
-          </p:cNvPr>
+          <p:cNvPr id="3" name="Text Placeholder 2"/>
           <p:cNvSpPr>
             <a:spLocks noGrp="1"/>
           </p:cNvSpPr>
@@ -2847,7 +2845,7 @@
           <a:p>
             <a:pPr lvl="0"/>
             <a:r>
-              <a:rPr lang="en-US"/>
+              <a:rPr lang="en-US" dirty="0"/>
               <a:t>Click to edit Master text styles</a:t>
             </a:r>
           </a:p>
@@ -2855,13 +2853,7 @@
       </p:sp>
       <p:sp>
         <p:nvSpPr>
-          <p:cNvPr id="4" name="Content Placeholder 3">
-            <a:extLst>
-              <a:ext uri="{FF2B5EF4-FFF2-40B4-BE49-F238E27FC236}">
-                <a16:creationId xmlns:a16="http://schemas.microsoft.com/office/drawing/2014/main" id="{3237A263-887C-71AC-AE02-8B4EC1A25F41}"/>
-              </a:ext>
-            </a:extLst>
-          </p:cNvPr>
+          <p:cNvPr id="4" name="Content Placeholder 3"/>
           <p:cNvSpPr>
             <a:spLocks noGrp="1"/>
           </p:cNvSpPr>
@@ -2881,35 +2873,35 @@
           <a:p>
             <a:pPr lvl="0"/>
             <a:r>
-              <a:rPr lang="en-US"/>
+              <a:rPr lang="en-US" dirty="0"/>
               <a:t>Click to edit Master text styles</a:t>
             </a:r>
           </a:p>
           <a:p>
             <a:pPr lvl="1"/>
             <a:r>
-              <a:rPr lang="en-US"/>
+              <a:rPr lang="en-US" dirty="0"/>
               <a:t>Second level</a:t>
             </a:r>
           </a:p>
           <a:p>
             <a:pPr lvl="2"/>
             <a:r>
-              <a:rPr lang="en-US"/>
+              <a:rPr lang="en-US" dirty="0"/>
               <a:t>Third level</a:t>
             </a:r>
           </a:p>
           <a:p>
             <a:pPr lvl="3"/>
             <a:r>
-              <a:rPr lang="en-US"/>
+              <a:rPr lang="en-US" dirty="0"/>
               <a:t>Fourth level</a:t>
             </a:r>
           </a:p>
           <a:p>
             <a:pPr lvl="4"/>
             <a:r>
-              <a:rPr lang="en-US"/>
+              <a:rPr lang="en-US" dirty="0"/>
               <a:t>Fifth level</a:t>
             </a:r>
           </a:p>
@@ -2917,13 +2909,7 @@
       </p:sp>
       <p:sp>
         <p:nvSpPr>
-          <p:cNvPr id="5" name="Text Placeholder 4">
-            <a:extLst>
-              <a:ext uri="{FF2B5EF4-FFF2-40B4-BE49-F238E27FC236}">
-                <a16:creationId xmlns:a16="http://schemas.microsoft.com/office/drawing/2014/main" id="{7875C5F6-B847-DF2A-1A0C-2B1139CD8979}"/>
-              </a:ext>
-            </a:extLst>
-          </p:cNvPr>
+          <p:cNvPr id="5" name="Text Placeholder 4"/>
           <p:cNvSpPr>
             <a:spLocks noGrp="1"/>
           </p:cNvSpPr>
@@ -2980,7 +2966,7 @@
           <a:p>
             <a:pPr lvl="0"/>
             <a:r>
-              <a:rPr lang="en-US"/>
+              <a:rPr lang="en-US" dirty="0"/>
               <a:t>Click to edit Master text styles</a:t>
             </a:r>
           </a:p>
@@ -2988,13 +2974,7 @@
       </p:sp>
       <p:sp>
         <p:nvSpPr>
-          <p:cNvPr id="6" name="Content Placeholder 5">
-            <a:extLst>
-              <a:ext uri="{FF2B5EF4-FFF2-40B4-BE49-F238E27FC236}">
-                <a16:creationId xmlns:a16="http://schemas.microsoft.com/office/drawing/2014/main" id="{4F2495FF-FDDC-51E1-4384-1D2B62840D0A}"/>
-              </a:ext>
-            </a:extLst>
-          </p:cNvPr>
+          <p:cNvPr id="6" name="Content Placeholder 5"/>
           <p:cNvSpPr>
             <a:spLocks noGrp="1"/>
           </p:cNvSpPr>
@@ -3014,35 +2994,35 @@
           <a:p>
             <a:pPr lvl="0"/>
             <a:r>
-              <a:rPr lang="en-US"/>
+              <a:rPr lang="en-US" dirty="0"/>
               <a:t>Click to edit Master text styles</a:t>
             </a:r>
           </a:p>
           <a:p>
             <a:pPr lvl="1"/>
             <a:r>
-              <a:rPr lang="en-US"/>
+              <a:rPr lang="en-US" dirty="0"/>
               <a:t>Second level</a:t>
             </a:r>
           </a:p>
           <a:p>
             <a:pPr lvl="2"/>
             <a:r>
-              <a:rPr lang="en-US"/>
+              <a:rPr lang="en-US" dirty="0"/>
               <a:t>Third level</a:t>
             </a:r>
           </a:p>
           <a:p>
             <a:pPr lvl="3"/>
             <a:r>
-              <a:rPr lang="en-US"/>
+              <a:rPr lang="en-US" dirty="0"/>
               <a:t>Fourth level</a:t>
             </a:r>
           </a:p>
           <a:p>
             <a:pPr lvl="4"/>
             <a:r>
-              <a:rPr lang="en-US"/>
+              <a:rPr lang="en-US" dirty="0"/>
               <a:t>Fifth level</a:t>
             </a:r>
           </a:p>
@@ -3050,13 +3030,7 @@
       </p:sp>
       <p:sp>
         <p:nvSpPr>
-          <p:cNvPr id="7" name="Date Placeholder 6">
-            <a:extLst>
-              <a:ext uri="{FF2B5EF4-FFF2-40B4-BE49-F238E27FC236}">
-                <a16:creationId xmlns:a16="http://schemas.microsoft.com/office/drawing/2014/main" id="{E51F3C79-CC24-BB4A-82CA-873C1B8D52B1}"/>
-              </a:ext>
-            </a:extLst>
-          </p:cNvPr>
+          <p:cNvPr id="7" name="Date Placeholder 6"/>
           <p:cNvSpPr>
             <a:spLocks noGrp="1"/>
           </p:cNvSpPr>
@@ -3070,7 +3044,8 @@
           <a:lstStyle/>
           <a:p>
             <a:fld id="{0CE49D37-DE82-A944-A799-DA76EC8094F2}" type="datetimeFigureOut">
-              <a:t>1/2/25</a:t>
+              <a:rPr lang="en-US"/>
+              <a:t>1/4/25</a:t>
             </a:fld>
             <a:endParaRPr lang="en-US"/>
           </a:p>
@@ -3078,13 +3053,7 @@
       </p:sp>
       <p:sp>
         <p:nvSpPr>
-          <p:cNvPr id="8" name="Footer Placeholder 7">
-            <a:extLst>
-              <a:ext uri="{FF2B5EF4-FFF2-40B4-BE49-F238E27FC236}">
-                <a16:creationId xmlns:a16="http://schemas.microsoft.com/office/drawing/2014/main" id="{42DCC6B8-C2CA-F197-76E1-C83CE3550D0B}"/>
-              </a:ext>
-            </a:extLst>
-          </p:cNvPr>
+          <p:cNvPr id="8" name="Footer Placeholder 7"/>
           <p:cNvSpPr>
             <a:spLocks noGrp="1"/>
           </p:cNvSpPr>
@@ -3103,13 +3072,7 @@
       </p:sp>
       <p:sp>
         <p:nvSpPr>
-          <p:cNvPr id="9" name="Slide Number Placeholder 8">
-            <a:extLst>
-              <a:ext uri="{FF2B5EF4-FFF2-40B4-BE49-F238E27FC236}">
-                <a16:creationId xmlns:a16="http://schemas.microsoft.com/office/drawing/2014/main" id="{239E16BE-A35F-B110-E1AD-F052F764821E}"/>
-              </a:ext>
-            </a:extLst>
-          </p:cNvPr>
+          <p:cNvPr id="9" name="Slide Number Placeholder 8"/>
           <p:cNvSpPr>
             <a:spLocks noGrp="1"/>
           </p:cNvSpPr>
@@ -3123,6 +3086,7 @@
           <a:lstStyle/>
           <a:p>
             <a:fld id="{B9E7304B-7719-154A-8737-3D00501421C3}" type="slidenum">
+              <a:rPr lang="en-US"/>
               <a:t>‹#›</a:t>
             </a:fld>
             <a:endParaRPr lang="en-US"/>
@@ -3132,7 +3096,7 @@
     </p:spTree>
     <p:extLst>
       <p:ext uri="{BB962C8B-B14F-4D97-AF65-F5344CB8AC3E}">
-        <p14:creationId xmlns:p14="http://schemas.microsoft.com/office/powerpoint/2010/main" val="2398537223"/>
+        <p14:creationId xmlns:p14="http://schemas.microsoft.com/office/powerpoint/2010/main" val="2720547223"/>
       </p:ext>
     </p:extLst>
   </p:cSld>
@@ -3161,13 +3125,7 @@
       </p:grpSpPr>
       <p:sp>
         <p:nvSpPr>
-          <p:cNvPr id="2" name="Title 1">
-            <a:extLst>
-              <a:ext uri="{FF2B5EF4-FFF2-40B4-BE49-F238E27FC236}">
-                <a16:creationId xmlns:a16="http://schemas.microsoft.com/office/drawing/2014/main" id="{394E5903-2965-BF12-71E3-A1948303C6A0}"/>
-              </a:ext>
-            </a:extLst>
-          </p:cNvPr>
+          <p:cNvPr id="2" name="Title 1"/>
           <p:cNvSpPr>
             <a:spLocks noGrp="1"/>
           </p:cNvSpPr>
@@ -3181,7 +3139,7 @@
           <a:lstStyle/>
           <a:p>
             <a:r>
-              <a:rPr lang="en-US"/>
+              <a:rPr lang="en-US" dirty="0"/>
               <a:t>Click to edit Master title style</a:t>
             </a:r>
           </a:p>
@@ -3189,13 +3147,7 @@
       </p:sp>
       <p:sp>
         <p:nvSpPr>
-          <p:cNvPr id="3" name="Date Placeholder 2">
-            <a:extLst>
-              <a:ext uri="{FF2B5EF4-FFF2-40B4-BE49-F238E27FC236}">
-                <a16:creationId xmlns:a16="http://schemas.microsoft.com/office/drawing/2014/main" id="{683DD632-EFCD-A8DA-ACE0-DD1B9900357C}"/>
-              </a:ext>
-            </a:extLst>
-          </p:cNvPr>
+          <p:cNvPr id="3" name="Date Placeholder 2"/>
           <p:cNvSpPr>
             <a:spLocks noGrp="1"/>
           </p:cNvSpPr>
@@ -3209,7 +3161,8 @@
           <a:lstStyle/>
           <a:p>
             <a:fld id="{0CE49D37-DE82-A944-A799-DA76EC8094F2}" type="datetimeFigureOut">
-              <a:t>1/2/25</a:t>
+              <a:rPr lang="en-US"/>
+              <a:t>1/4/25</a:t>
             </a:fld>
             <a:endParaRPr lang="en-US"/>
           </a:p>
@@ -3217,13 +3170,7 @@
       </p:sp>
       <p:sp>
         <p:nvSpPr>
-          <p:cNvPr id="4" name="Footer Placeholder 3">
-            <a:extLst>
-              <a:ext uri="{FF2B5EF4-FFF2-40B4-BE49-F238E27FC236}">
-                <a16:creationId xmlns:a16="http://schemas.microsoft.com/office/drawing/2014/main" id="{749704CE-08A6-4BF4-0AF2-B2DA5EB56713}"/>
-              </a:ext>
-            </a:extLst>
-          </p:cNvPr>
+          <p:cNvPr id="4" name="Footer Placeholder 3"/>
           <p:cNvSpPr>
             <a:spLocks noGrp="1"/>
           </p:cNvSpPr>
@@ -3242,13 +3189,7 @@
       </p:sp>
       <p:sp>
         <p:nvSpPr>
-          <p:cNvPr id="5" name="Slide Number Placeholder 4">
-            <a:extLst>
-              <a:ext uri="{FF2B5EF4-FFF2-40B4-BE49-F238E27FC236}">
-                <a16:creationId xmlns:a16="http://schemas.microsoft.com/office/drawing/2014/main" id="{E63614FF-911D-2454-0ABC-11EF9FF2C048}"/>
-              </a:ext>
-            </a:extLst>
-          </p:cNvPr>
+          <p:cNvPr id="5" name="Slide Number Placeholder 4"/>
           <p:cNvSpPr>
             <a:spLocks noGrp="1"/>
           </p:cNvSpPr>
@@ -3262,6 +3203,7 @@
           <a:lstStyle/>
           <a:p>
             <a:fld id="{B9E7304B-7719-154A-8737-3D00501421C3}" type="slidenum">
+              <a:rPr lang="en-US"/>
               <a:t>‹#›</a:t>
             </a:fld>
             <a:endParaRPr lang="en-US"/>
@@ -3271,7 +3213,7 @@
     </p:spTree>
     <p:extLst>
       <p:ext uri="{BB962C8B-B14F-4D97-AF65-F5344CB8AC3E}">
-        <p14:creationId xmlns:p14="http://schemas.microsoft.com/office/powerpoint/2010/main" val="2421098928"/>
+        <p14:creationId xmlns:p14="http://schemas.microsoft.com/office/powerpoint/2010/main" val="1319646140"/>
       </p:ext>
     </p:extLst>
   </p:cSld>
@@ -3300,13 +3242,7 @@
       </p:grpSpPr>
       <p:sp>
         <p:nvSpPr>
-          <p:cNvPr id="2" name="Date Placeholder 1">
-            <a:extLst>
-              <a:ext uri="{FF2B5EF4-FFF2-40B4-BE49-F238E27FC236}">
-                <a16:creationId xmlns:a16="http://schemas.microsoft.com/office/drawing/2014/main" id="{832C2CA1-23B5-9FA8-5400-8B2F32B1B74E}"/>
-              </a:ext>
-            </a:extLst>
-          </p:cNvPr>
+          <p:cNvPr id="2" name="Date Placeholder 1"/>
           <p:cNvSpPr>
             <a:spLocks noGrp="1"/>
           </p:cNvSpPr>
@@ -3320,7 +3256,8 @@
           <a:lstStyle/>
           <a:p>
             <a:fld id="{0CE49D37-DE82-A944-A799-DA76EC8094F2}" type="datetimeFigureOut">
-              <a:t>1/2/25</a:t>
+              <a:rPr lang="en-US"/>
+              <a:t>1/4/25</a:t>
             </a:fld>
             <a:endParaRPr lang="en-US"/>
           </a:p>
@@ -3328,13 +3265,7 @@
       </p:sp>
       <p:sp>
         <p:nvSpPr>
-          <p:cNvPr id="3" name="Footer Placeholder 2">
-            <a:extLst>
-              <a:ext uri="{FF2B5EF4-FFF2-40B4-BE49-F238E27FC236}">
-                <a16:creationId xmlns:a16="http://schemas.microsoft.com/office/drawing/2014/main" id="{76394249-44BD-BD52-7D2F-9619EDD2DFDB}"/>
-              </a:ext>
-            </a:extLst>
-          </p:cNvPr>
+          <p:cNvPr id="3" name="Footer Placeholder 2"/>
           <p:cNvSpPr>
             <a:spLocks noGrp="1"/>
           </p:cNvSpPr>
@@ -3353,13 +3284,7 @@
       </p:sp>
       <p:sp>
         <p:nvSpPr>
-          <p:cNvPr id="4" name="Slide Number Placeholder 3">
-            <a:extLst>
-              <a:ext uri="{FF2B5EF4-FFF2-40B4-BE49-F238E27FC236}">
-                <a16:creationId xmlns:a16="http://schemas.microsoft.com/office/drawing/2014/main" id="{C0980C2B-EAD8-174F-C105-DDD976CCE088}"/>
-              </a:ext>
-            </a:extLst>
-          </p:cNvPr>
+          <p:cNvPr id="4" name="Slide Number Placeholder 3"/>
           <p:cNvSpPr>
             <a:spLocks noGrp="1"/>
           </p:cNvSpPr>
@@ -3373,6 +3298,7 @@
           <a:lstStyle/>
           <a:p>
             <a:fld id="{B9E7304B-7719-154A-8737-3D00501421C3}" type="slidenum">
+              <a:rPr lang="en-US"/>
               <a:t>‹#›</a:t>
             </a:fld>
             <a:endParaRPr lang="en-US"/>
@@ -3382,7 +3308,7 @@
     </p:spTree>
     <p:extLst>
       <p:ext uri="{BB962C8B-B14F-4D97-AF65-F5344CB8AC3E}">
-        <p14:creationId xmlns:p14="http://schemas.microsoft.com/office/powerpoint/2010/main" val="684542673"/>
+        <p14:creationId xmlns:p14="http://schemas.microsoft.com/office/powerpoint/2010/main" val="2624080144"/>
       </p:ext>
     </p:extLst>
   </p:cSld>
@@ -3411,13 +3337,7 @@
       </p:grpSpPr>
       <p:sp>
         <p:nvSpPr>
-          <p:cNvPr id="2" name="Title 1">
-            <a:extLst>
-              <a:ext uri="{FF2B5EF4-FFF2-40B4-BE49-F238E27FC236}">
-                <a16:creationId xmlns:a16="http://schemas.microsoft.com/office/drawing/2014/main" id="{29A914C6-814E-96C7-6D11-A4CB76066FD7}"/>
-              </a:ext>
-            </a:extLst>
-          </p:cNvPr>
+          <p:cNvPr id="2" name="Title 1"/>
           <p:cNvSpPr>
             <a:spLocks noGrp="1"/>
           </p:cNvSpPr>
@@ -3440,7 +3360,7 @@
           </a:lstStyle>
           <a:p>
             <a:r>
-              <a:rPr lang="en-US"/>
+              <a:rPr lang="en-US" dirty="0"/>
               <a:t>Click to edit Master title style</a:t>
             </a:r>
           </a:p>
@@ -3448,13 +3368,7 @@
       </p:sp>
       <p:sp>
         <p:nvSpPr>
-          <p:cNvPr id="3" name="Content Placeholder 2">
-            <a:extLst>
-              <a:ext uri="{FF2B5EF4-FFF2-40B4-BE49-F238E27FC236}">
-                <a16:creationId xmlns:a16="http://schemas.microsoft.com/office/drawing/2014/main" id="{66941F77-8B70-0620-08CA-930B0F4CDC6D}"/>
-              </a:ext>
-            </a:extLst>
-          </p:cNvPr>
+          <p:cNvPr id="3" name="Content Placeholder 2"/>
           <p:cNvSpPr>
             <a:spLocks noGrp="1"/>
           </p:cNvSpPr>
@@ -3502,35 +3416,35 @@
           <a:p>
             <a:pPr lvl="0"/>
             <a:r>
-              <a:rPr lang="en-US"/>
+              <a:rPr lang="en-US" dirty="0"/>
               <a:t>Click to edit Master text styles</a:t>
             </a:r>
           </a:p>
           <a:p>
             <a:pPr lvl="1"/>
             <a:r>
-              <a:rPr lang="en-US"/>
+              <a:rPr lang="en-US" dirty="0"/>
               <a:t>Second level</a:t>
             </a:r>
           </a:p>
           <a:p>
             <a:pPr lvl="2"/>
             <a:r>
-              <a:rPr lang="en-US"/>
+              <a:rPr lang="en-US" dirty="0"/>
               <a:t>Third level</a:t>
             </a:r>
           </a:p>
           <a:p>
             <a:pPr lvl="3"/>
             <a:r>
-              <a:rPr lang="en-US"/>
+              <a:rPr lang="en-US" dirty="0"/>
               <a:t>Fourth level</a:t>
             </a:r>
           </a:p>
           <a:p>
             <a:pPr lvl="4"/>
             <a:r>
-              <a:rPr lang="en-US"/>
+              <a:rPr lang="en-US" dirty="0"/>
               <a:t>Fifth level</a:t>
             </a:r>
           </a:p>
@@ -3538,13 +3452,7 @@
       </p:sp>
       <p:sp>
         <p:nvSpPr>
-          <p:cNvPr id="4" name="Text Placeholder 3">
-            <a:extLst>
-              <a:ext uri="{FF2B5EF4-FFF2-40B4-BE49-F238E27FC236}">
-                <a16:creationId xmlns:a16="http://schemas.microsoft.com/office/drawing/2014/main" id="{C592541A-DCC9-24C0-0B27-9C4D2086D54F}"/>
-              </a:ext>
-            </a:extLst>
-          </p:cNvPr>
+          <p:cNvPr id="4" name="Text Placeholder 3"/>
           <p:cNvSpPr>
             <a:spLocks noGrp="1"/>
           </p:cNvSpPr>
@@ -3601,7 +3509,7 @@
           <a:p>
             <a:pPr lvl="0"/>
             <a:r>
-              <a:rPr lang="en-US"/>
+              <a:rPr lang="en-US" dirty="0"/>
               <a:t>Click to edit Master text styles</a:t>
             </a:r>
           </a:p>
@@ -3609,13 +3517,7 @@
       </p:sp>
       <p:sp>
         <p:nvSpPr>
-          <p:cNvPr id="5" name="Date Placeholder 4">
-            <a:extLst>
-              <a:ext uri="{FF2B5EF4-FFF2-40B4-BE49-F238E27FC236}">
-                <a16:creationId xmlns:a16="http://schemas.microsoft.com/office/drawing/2014/main" id="{4768B612-AA10-B06C-4B0A-769C38EB3290}"/>
-              </a:ext>
-            </a:extLst>
-          </p:cNvPr>
+          <p:cNvPr id="5" name="Date Placeholder 4"/>
           <p:cNvSpPr>
             <a:spLocks noGrp="1"/>
           </p:cNvSpPr>
@@ -3629,7 +3531,8 @@
           <a:lstStyle/>
           <a:p>
             <a:fld id="{0CE49D37-DE82-A944-A799-DA76EC8094F2}" type="datetimeFigureOut">
-              <a:t>1/2/25</a:t>
+              <a:rPr lang="en-US"/>
+              <a:t>1/4/25</a:t>
             </a:fld>
             <a:endParaRPr lang="en-US"/>
           </a:p>
@@ -3637,13 +3540,7 @@
       </p:sp>
       <p:sp>
         <p:nvSpPr>
-          <p:cNvPr id="6" name="Footer Placeholder 5">
-            <a:extLst>
-              <a:ext uri="{FF2B5EF4-FFF2-40B4-BE49-F238E27FC236}">
-                <a16:creationId xmlns:a16="http://schemas.microsoft.com/office/drawing/2014/main" id="{7CD9CB40-5D4B-3FCE-5BF4-9132F4EA045B}"/>
-              </a:ext>
-            </a:extLst>
-          </p:cNvPr>
+          <p:cNvPr id="6" name="Footer Placeholder 5"/>
           <p:cNvSpPr>
             <a:spLocks noGrp="1"/>
           </p:cNvSpPr>
@@ -3662,13 +3559,7 @@
       </p:sp>
       <p:sp>
         <p:nvSpPr>
-          <p:cNvPr id="7" name="Slide Number Placeholder 6">
-            <a:extLst>
-              <a:ext uri="{FF2B5EF4-FFF2-40B4-BE49-F238E27FC236}">
-                <a16:creationId xmlns:a16="http://schemas.microsoft.com/office/drawing/2014/main" id="{6140514C-7E4F-3949-A4BE-0E44E2DFB3BB}"/>
-              </a:ext>
-            </a:extLst>
-          </p:cNvPr>
+          <p:cNvPr id="7" name="Slide Number Placeholder 6"/>
           <p:cNvSpPr>
             <a:spLocks noGrp="1"/>
           </p:cNvSpPr>
@@ -3682,6 +3573,7 @@
           <a:lstStyle/>
           <a:p>
             <a:fld id="{B9E7304B-7719-154A-8737-3D00501421C3}" type="slidenum">
+              <a:rPr lang="en-US"/>
               <a:t>‹#›</a:t>
             </a:fld>
             <a:endParaRPr lang="en-US"/>
@@ -3691,7 +3583,7 @@
     </p:spTree>
     <p:extLst>
       <p:ext uri="{BB962C8B-B14F-4D97-AF65-F5344CB8AC3E}">
-        <p14:creationId xmlns:p14="http://schemas.microsoft.com/office/powerpoint/2010/main" val="1250681177"/>
+        <p14:creationId xmlns:p14="http://schemas.microsoft.com/office/powerpoint/2010/main" val="3198689321"/>
       </p:ext>
     </p:extLst>
   </p:cSld>
@@ -3720,13 +3612,7 @@
       </p:grpSpPr>
       <p:sp>
         <p:nvSpPr>
-          <p:cNvPr id="2" name="Title 1">
-            <a:extLst>
-              <a:ext uri="{FF2B5EF4-FFF2-40B4-BE49-F238E27FC236}">
-                <a16:creationId xmlns:a16="http://schemas.microsoft.com/office/drawing/2014/main" id="{D7A4CE58-0425-BF4C-8FCB-84F1E39EAF9D}"/>
-              </a:ext>
-            </a:extLst>
-          </p:cNvPr>
+          <p:cNvPr id="2" name="Title 1"/>
           <p:cNvSpPr>
             <a:spLocks noGrp="1"/>
           </p:cNvSpPr>
@@ -3749,7 +3635,7 @@
           </a:lstStyle>
           <a:p>
             <a:r>
-              <a:rPr lang="en-US"/>
+              <a:rPr lang="en-US" dirty="0"/>
               <a:t>Click to edit Master title style</a:t>
             </a:r>
           </a:p>
@@ -3757,15 +3643,9 @@
       </p:sp>
       <p:sp>
         <p:nvSpPr>
-          <p:cNvPr id="3" name="Picture Placeholder 2">
-            <a:extLst>
-              <a:ext uri="{FF2B5EF4-FFF2-40B4-BE49-F238E27FC236}">
-                <a16:creationId xmlns:a16="http://schemas.microsoft.com/office/drawing/2014/main" id="{369BFD79-923F-162C-2113-05FFB7FEB04E}"/>
-              </a:ext>
-            </a:extLst>
-          </p:cNvPr>
-          <p:cNvSpPr>
-            <a:spLocks noGrp="1"/>
+          <p:cNvPr id="3" name="Picture Placeholder 2"/>
+          <p:cNvSpPr>
+            <a:spLocks noGrp="1" noChangeAspect="1"/>
           </p:cNvSpPr>
           <p:nvPr>
             <p:ph type="pic" idx="1"/>
@@ -3778,7 +3658,7 @@
           </a:xfrm>
         </p:spPr>
         <p:txBody>
-          <a:bodyPr/>
+          <a:bodyPr anchor="t"/>
           <a:lstStyle>
             <a:lvl1pPr marL="0" indent="0">
               <a:buNone/>
@@ -3818,19 +3698,16 @@
             </a:lvl9pPr>
           </a:lstStyle>
           <a:p>
-            <a:endParaRPr lang="en-US"/>
-          </a:p>
-        </p:txBody>
-      </p:sp>
-      <p:sp>
-        <p:nvSpPr>
-          <p:cNvPr id="4" name="Text Placeholder 3">
-            <a:extLst>
-              <a:ext uri="{FF2B5EF4-FFF2-40B4-BE49-F238E27FC236}">
-                <a16:creationId xmlns:a16="http://schemas.microsoft.com/office/drawing/2014/main" id="{0D137FA9-F42A-AD40-3A50-AD9E482444EA}"/>
-              </a:ext>
-            </a:extLst>
-          </p:cNvPr>
+            <a:r>
+              <a:rPr lang="en-US" dirty="0"/>
+              <a:t>Click icon to add picture</a:t>
+            </a:r>
+          </a:p>
+        </p:txBody>
+      </p:sp>
+      <p:sp>
+        <p:nvSpPr>
+          <p:cNvPr id="4" name="Text Placeholder 3"/>
           <p:cNvSpPr>
             <a:spLocks noGrp="1"/>
           </p:cNvSpPr>
@@ -3887,7 +3764,7 @@
           <a:p>
             <a:pPr lvl="0"/>
             <a:r>
-              <a:rPr lang="en-US"/>
+              <a:rPr lang="en-US" dirty="0"/>
               <a:t>Click to edit Master text styles</a:t>
             </a:r>
           </a:p>
@@ -3895,13 +3772,7 @@
       </p:sp>
       <p:sp>
         <p:nvSpPr>
-          <p:cNvPr id="5" name="Date Placeholder 4">
-            <a:extLst>
-              <a:ext uri="{FF2B5EF4-FFF2-40B4-BE49-F238E27FC236}">
-                <a16:creationId xmlns:a16="http://schemas.microsoft.com/office/drawing/2014/main" id="{1F704877-1DE3-11A1-A029-E9BDDB4C65F5}"/>
-              </a:ext>
-            </a:extLst>
-          </p:cNvPr>
+          <p:cNvPr id="5" name="Date Placeholder 4"/>
           <p:cNvSpPr>
             <a:spLocks noGrp="1"/>
           </p:cNvSpPr>
@@ -3915,7 +3786,8 @@
           <a:lstStyle/>
           <a:p>
             <a:fld id="{0CE49D37-DE82-A944-A799-DA76EC8094F2}" type="datetimeFigureOut">
-              <a:t>1/2/25</a:t>
+              <a:rPr lang="en-US"/>
+              <a:t>1/4/25</a:t>
             </a:fld>
             <a:endParaRPr lang="en-US"/>
           </a:p>
@@ -3923,13 +3795,7 @@
       </p:sp>
       <p:sp>
         <p:nvSpPr>
-          <p:cNvPr id="6" name="Footer Placeholder 5">
-            <a:extLst>
-              <a:ext uri="{FF2B5EF4-FFF2-40B4-BE49-F238E27FC236}">
-                <a16:creationId xmlns:a16="http://schemas.microsoft.com/office/drawing/2014/main" id="{6E14EC64-CAD6-B70E-2F15-7962AD0B05FC}"/>
-              </a:ext>
-            </a:extLst>
-          </p:cNvPr>
+          <p:cNvPr id="6" name="Footer Placeholder 5"/>
           <p:cNvSpPr>
             <a:spLocks noGrp="1"/>
           </p:cNvSpPr>
@@ -3948,13 +3814,7 @@
       </p:sp>
       <p:sp>
         <p:nvSpPr>
-          <p:cNvPr id="7" name="Slide Number Placeholder 6">
-            <a:extLst>
-              <a:ext uri="{FF2B5EF4-FFF2-40B4-BE49-F238E27FC236}">
-                <a16:creationId xmlns:a16="http://schemas.microsoft.com/office/drawing/2014/main" id="{4A11D891-1097-283C-48C3-CC01F68FA9BF}"/>
-              </a:ext>
-            </a:extLst>
-          </p:cNvPr>
+          <p:cNvPr id="7" name="Slide Number Placeholder 6"/>
           <p:cNvSpPr>
             <a:spLocks noGrp="1"/>
           </p:cNvSpPr>
@@ -3968,6 +3828,7 @@
           <a:lstStyle/>
           <a:p>
             <a:fld id="{B9E7304B-7719-154A-8737-3D00501421C3}" type="slidenum">
+              <a:rPr lang="en-US"/>
               <a:t>‹#›</a:t>
             </a:fld>
             <a:endParaRPr lang="en-US"/>
@@ -3977,7 +3838,7 @@
     </p:spTree>
     <p:extLst>
       <p:ext uri="{BB962C8B-B14F-4D97-AF65-F5344CB8AC3E}">
-        <p14:creationId xmlns:p14="http://schemas.microsoft.com/office/powerpoint/2010/main" val="263616056"/>
+        <p14:creationId xmlns:p14="http://schemas.microsoft.com/office/powerpoint/2010/main" val="2163163891"/>
       </p:ext>
     </p:extLst>
   </p:cSld>
@@ -4011,13 +3872,7 @@
       </p:grpSpPr>
       <p:sp>
         <p:nvSpPr>
-          <p:cNvPr id="2" name="Title Placeholder 1">
-            <a:extLst>
-              <a:ext uri="{FF2B5EF4-FFF2-40B4-BE49-F238E27FC236}">
-                <a16:creationId xmlns:a16="http://schemas.microsoft.com/office/drawing/2014/main" id="{07086E15-6F9C-7838-58FB-FDA2FC2C3D00}"/>
-              </a:ext>
-            </a:extLst>
-          </p:cNvPr>
+          <p:cNvPr id="2" name="Title Placeholder 1"/>
           <p:cNvSpPr>
             <a:spLocks noGrp="1"/>
           </p:cNvSpPr>
@@ -4041,7 +3896,7 @@
           <a:lstStyle/>
           <a:p>
             <a:r>
-              <a:rPr lang="en-US"/>
+              <a:rPr lang="en-US" dirty="0"/>
               <a:t>Click to edit Master title style</a:t>
             </a:r>
           </a:p>
@@ -4049,13 +3904,7 @@
       </p:sp>
       <p:sp>
         <p:nvSpPr>
-          <p:cNvPr id="3" name="Text Placeholder 2">
-            <a:extLst>
-              <a:ext uri="{FF2B5EF4-FFF2-40B4-BE49-F238E27FC236}">
-                <a16:creationId xmlns:a16="http://schemas.microsoft.com/office/drawing/2014/main" id="{A038EB8D-2A6F-24B9-695D-8138AE7FFFC2}"/>
-              </a:ext>
-            </a:extLst>
-          </p:cNvPr>
+          <p:cNvPr id="3" name="Text Placeholder 2"/>
           <p:cNvSpPr>
             <a:spLocks noGrp="1"/>
           </p:cNvSpPr>
@@ -4080,35 +3929,35 @@
           <a:p>
             <a:pPr lvl="0"/>
             <a:r>
-              <a:rPr lang="en-US"/>
+              <a:rPr lang="en-US" dirty="0"/>
               <a:t>Click to edit Master text styles</a:t>
             </a:r>
           </a:p>
           <a:p>
             <a:pPr lvl="1"/>
             <a:r>
-              <a:rPr lang="en-US"/>
+              <a:rPr lang="en-US" dirty="0"/>
               <a:t>Second level</a:t>
             </a:r>
           </a:p>
           <a:p>
             <a:pPr lvl="2"/>
             <a:r>
-              <a:rPr lang="en-US"/>
+              <a:rPr lang="en-US" dirty="0"/>
               <a:t>Third level</a:t>
             </a:r>
           </a:p>
           <a:p>
             <a:pPr lvl="3"/>
             <a:r>
-              <a:rPr lang="en-US"/>
+              <a:rPr lang="en-US" dirty="0"/>
               <a:t>Fourth level</a:t>
             </a:r>
           </a:p>
           <a:p>
             <a:pPr lvl="4"/>
             <a:r>
-              <a:rPr lang="en-US"/>
+              <a:rPr lang="en-US" dirty="0"/>
               <a:t>Fifth level</a:t>
             </a:r>
           </a:p>
@@ -4116,13 +3965,7 @@
       </p:sp>
       <p:sp>
         <p:nvSpPr>
-          <p:cNvPr id="4" name="Date Placeholder 3">
-            <a:extLst>
-              <a:ext uri="{FF2B5EF4-FFF2-40B4-BE49-F238E27FC236}">
-                <a16:creationId xmlns:a16="http://schemas.microsoft.com/office/drawing/2014/main" id="{13BF04DD-1E14-3B98-0ECD-70578881B762}"/>
-              </a:ext>
-            </a:extLst>
-          </p:cNvPr>
+          <p:cNvPr id="4" name="Date Placeholder 3"/>
           <p:cNvSpPr>
             <a:spLocks noGrp="1"/>
           </p:cNvSpPr>
@@ -4154,7 +3997,8 @@
           </a:lstStyle>
           <a:p>
             <a:fld id="{0CE49D37-DE82-A944-A799-DA76EC8094F2}" type="datetimeFigureOut">
-              <a:t>1/2/25</a:t>
+              <a:rPr lang="en-US"/>
+              <a:t>1/4/25</a:t>
             </a:fld>
             <a:endParaRPr lang="en-US"/>
           </a:p>
@@ -4162,13 +4006,7 @@
       </p:sp>
       <p:sp>
         <p:nvSpPr>
-          <p:cNvPr id="5" name="Footer Placeholder 4">
-            <a:extLst>
-              <a:ext uri="{FF2B5EF4-FFF2-40B4-BE49-F238E27FC236}">
-                <a16:creationId xmlns:a16="http://schemas.microsoft.com/office/drawing/2014/main" id="{7C7E2513-1231-9201-EF6D-A1BF3910B2F9}"/>
-              </a:ext>
-            </a:extLst>
-          </p:cNvPr>
+          <p:cNvPr id="5" name="Footer Placeholder 4"/>
           <p:cNvSpPr>
             <a:spLocks noGrp="1"/>
           </p:cNvSpPr>
@@ -4205,13 +4043,7 @@
       </p:sp>
       <p:sp>
         <p:nvSpPr>
-          <p:cNvPr id="6" name="Slide Number Placeholder 5">
-            <a:extLst>
-              <a:ext uri="{FF2B5EF4-FFF2-40B4-BE49-F238E27FC236}">
-                <a16:creationId xmlns:a16="http://schemas.microsoft.com/office/drawing/2014/main" id="{9C9C00B9-650A-46EA-74AA-161D609EC6BA}"/>
-              </a:ext>
-            </a:extLst>
-          </p:cNvPr>
+          <p:cNvPr id="6" name="Slide Number Placeholder 5"/>
           <p:cNvSpPr>
             <a:spLocks noGrp="1"/>
           </p:cNvSpPr>
@@ -4243,6 +4075,7 @@
           </a:lstStyle>
           <a:p>
             <a:fld id="{B9E7304B-7719-154A-8737-3D00501421C3}" type="slidenum">
+              <a:rPr lang="en-US"/>
               <a:t>‹#›</a:t>
             </a:fld>
             <a:endParaRPr lang="en-US"/>
@@ -4252,23 +4085,23 @@
     </p:spTree>
     <p:extLst>
       <p:ext uri="{BB962C8B-B14F-4D97-AF65-F5344CB8AC3E}">
-        <p14:creationId xmlns:p14="http://schemas.microsoft.com/office/powerpoint/2010/main" val="119117970"/>
+        <p14:creationId xmlns:p14="http://schemas.microsoft.com/office/powerpoint/2010/main" val="2896259396"/>
       </p:ext>
     </p:extLst>
   </p:cSld>
   <p:clrMap bg1="lt1" tx1="dk1" bg2="lt2" tx2="dk2" accent1="accent1" accent2="accent2" accent3="accent3" accent4="accent4" accent5="accent5" accent6="accent6" hlink="hlink" folHlink="folHlink"/>
   <p:sldLayoutIdLst>
-    <p:sldLayoutId id="2147483649" r:id="rId1"/>
-    <p:sldLayoutId id="2147483650" r:id="rId2"/>
-    <p:sldLayoutId id="2147483651" r:id="rId3"/>
-    <p:sldLayoutId id="2147483652" r:id="rId4"/>
-    <p:sldLayoutId id="2147483653" r:id="rId5"/>
-    <p:sldLayoutId id="2147483654" r:id="rId6"/>
-    <p:sldLayoutId id="2147483655" r:id="rId7"/>
-    <p:sldLayoutId id="2147483656" r:id="rId8"/>
-    <p:sldLayoutId id="2147483657" r:id="rId9"/>
-    <p:sldLayoutId id="2147483658" r:id="rId10"/>
-    <p:sldLayoutId id="2147483659" r:id="rId11"/>
+    <p:sldLayoutId id="2147483721" r:id="rId1"/>
+    <p:sldLayoutId id="2147483722" r:id="rId2"/>
+    <p:sldLayoutId id="2147483723" r:id="rId3"/>
+    <p:sldLayoutId id="2147483724" r:id="rId4"/>
+    <p:sldLayoutId id="2147483725" r:id="rId5"/>
+    <p:sldLayoutId id="2147483726" r:id="rId6"/>
+    <p:sldLayoutId id="2147483727" r:id="rId7"/>
+    <p:sldLayoutId id="2147483728" r:id="rId8"/>
+    <p:sldLayoutId id="2147483729" r:id="rId9"/>
+    <p:sldLayoutId id="2147483730" r:id="rId10"/>
+    <p:sldLayoutId id="2147483731" r:id="rId11"/>
   </p:sldLayoutIdLst>
   <p:txStyles>
     <p:titleStyle>
@@ -4556,6 +4389,14 @@
 <file path=ppt/slides/slide1.xml><?xml version="1.0" encoding="utf-8"?>
 <p:sld xmlns:a="http://schemas.openxmlformats.org/drawingml/2006/main" xmlns:r="http://schemas.openxmlformats.org/officeDocument/2006/relationships" xmlns:p="http://schemas.openxmlformats.org/presentationml/2006/main">
   <p:cSld>
+    <p:bg>
+      <p:bgPr>
+        <a:solidFill>
+          <a:schemeClr val="bg1"/>
+        </a:solidFill>
+        <a:effectLst/>
+      </p:bgPr>
+    </p:bg>
     <p:spTree>
       <p:nvGrpSpPr>
         <p:cNvPr id="1" name=""/>
@@ -4586,42 +4427,36 @@
             <p:ph type="ctrTitle"/>
           </p:nvPr>
         </p:nvSpPr>
-        <p:spPr/>
-        <p:txBody>
-          <a:bodyPr/>
-          <a:lstStyle/>
-          <a:p>
-            <a:r>
-              <a:rPr lang="en-US"/>
-              <a:t>Neurons needed to play Flappy Bird</a:t>
-            </a:r>
-          </a:p>
-        </p:txBody>
-      </p:sp>
-      <p:sp>
-        <p:nvSpPr>
-          <p:cNvPr id="3" name="Subtitle 2">
-            <a:extLst>
-              <a:ext uri="{FF2B5EF4-FFF2-40B4-BE49-F238E27FC236}">
-                <a16:creationId xmlns:a16="http://schemas.microsoft.com/office/drawing/2014/main" id="{323E01F2-43D1-2552-C40B-5A06F1BA636F}"/>
-              </a:ext>
-            </a:extLst>
-          </p:cNvPr>
-          <p:cNvSpPr>
-            <a:spLocks noGrp="1"/>
-          </p:cNvSpPr>
-          <p:nvPr>
-            <p:ph type="subTitle" idx="1"/>
-          </p:nvPr>
-        </p:nvSpPr>
-        <p:spPr/>
-        <p:txBody>
-          <a:bodyPr/>
-          <a:lstStyle/>
-          <a:p>
-            <a:r>
-              <a:rPr lang="en-US"/>
-              <a:t>Akshay Gulabrao</a:t>
+        <p:spPr>
+          <a:xfrm>
+            <a:off x="2182376" y="213360"/>
+            <a:ext cx="7022584" cy="1078027"/>
+          </a:xfrm>
+        </p:spPr>
+        <p:txBody>
+          <a:bodyPr>
+            <a:normAutofit/>
+          </a:bodyPr>
+          <a:lstStyle/>
+          <a:p>
+            <a:pPr algn="l"/>
+            <a:r>
+              <a:rPr lang="en-US">
+                <a:latin typeface="Calibri" panose="020F0502020204030204" pitchFamily="34" charset="0"/>
+                <a:cs typeface="Calibri" panose="020F0502020204030204" pitchFamily="34" charset="0"/>
+              </a:rPr>
+              <a:t>Catching</a:t>
+            </a:r>
+            <a:r>
+              <a:rPr lang="en-US"/>
+              <a:t> up to </a:t>
+            </a:r>
+            <a:r>
+              <a:rPr lang="en-US">
+                <a:latin typeface="Gautami" panose="020B0502040204020203" pitchFamily="34" charset="0"/>
+                <a:cs typeface="Gautami" panose="020B0502040204020203" pitchFamily="34" charset="0"/>
+              </a:rPr>
+              <a:t>Anduril</a:t>
             </a:r>
           </a:p>
         </p:txBody>
@@ -4636,6 +4471,98 @@
   <p:clrMapOvr>
     <a:masterClrMapping/>
   </p:clrMapOvr>
+  <p:timing>
+    <p:tnLst>
+      <p:par>
+        <p:cTn id="1" dur="indefinite" restart="never" nodeType="tmRoot">
+          <p:childTnLst>
+            <p:seq concurrent="1" nextAc="seek">
+              <p:cTn id="2" dur="indefinite" nodeType="mainSeq">
+                <p:childTnLst>
+                  <p:par>
+                    <p:cTn id="3" fill="hold">
+                      <p:stCondLst>
+                        <p:cond delay="indefinite"/>
+                        <p:cond evt="onBegin" delay="0">
+                          <p:tn val="2"/>
+                        </p:cond>
+                      </p:stCondLst>
+                      <p:childTnLst>
+                        <p:par>
+                          <p:cTn id="4" fill="hold">
+                            <p:stCondLst>
+                              <p:cond delay="0"/>
+                            </p:stCondLst>
+                            <p:childTnLst>
+                              <p:par>
+                                <p:cTn id="5" presetID="10" presetClass="entr" presetSubtype="0" fill="hold" grpId="0" nodeType="withEffect">
+                                  <p:stCondLst>
+                                    <p:cond delay="1000"/>
+                                  </p:stCondLst>
+                                  <p:iterate type="lt">
+                                    <p:tmPct val="10000"/>
+                                  </p:iterate>
+                                  <p:childTnLst>
+                                    <p:set>
+                                      <p:cBhvr>
+                                        <p:cTn id="6" dur="1" fill="hold">
+                                          <p:stCondLst>
+                                            <p:cond delay="0"/>
+                                          </p:stCondLst>
+                                        </p:cTn>
+                                        <p:tgtEl>
+                                          <p:spTgt spid="2"/>
+                                        </p:tgtEl>
+                                        <p:attrNameLst>
+                                          <p:attrName>style.visibility</p:attrName>
+                                        </p:attrNameLst>
+                                      </p:cBhvr>
+                                      <p:to>
+                                        <p:strVal val="visible"/>
+                                      </p:to>
+                                    </p:set>
+                                    <p:animEffect transition="in" filter="fade">
+                                      <p:cBhvr>
+                                        <p:cTn id="7" dur="400"/>
+                                        <p:tgtEl>
+                                          <p:spTgt spid="2"/>
+                                        </p:tgtEl>
+                                      </p:cBhvr>
+                                    </p:animEffect>
+                                  </p:childTnLst>
+                                </p:cTn>
+                              </p:par>
+                            </p:childTnLst>
+                          </p:cTn>
+                        </p:par>
+                      </p:childTnLst>
+                    </p:cTn>
+                  </p:par>
+                </p:childTnLst>
+              </p:cTn>
+              <p:prevCondLst>
+                <p:cond evt="onPrev" delay="0">
+                  <p:tgtEl>
+                    <p:sldTgt/>
+                  </p:tgtEl>
+                </p:cond>
+              </p:prevCondLst>
+              <p:nextCondLst>
+                <p:cond evt="onNext" delay="0">
+                  <p:tgtEl>
+                    <p:sldTgt/>
+                  </p:tgtEl>
+                </p:cond>
+              </p:nextCondLst>
+            </p:seq>
+          </p:childTnLst>
+        </p:cTn>
+      </p:par>
+    </p:tnLst>
+    <p:bldLst>
+      <p:bldP spid="2" grpId="0"/>
+    </p:bldLst>
+  </p:timing>
 </p:sld>
 </file>
 
@@ -4661,6 +4588,421 @@
           <p:cNvPr id="2" name="Title 1">
             <a:extLst>
               <a:ext uri="{FF2B5EF4-FFF2-40B4-BE49-F238E27FC236}">
+                <a16:creationId xmlns:a16="http://schemas.microsoft.com/office/drawing/2014/main" id="{7728BDED-42C8-A07E-62BB-E0AB8DE2E6DE}"/>
+              </a:ext>
+            </a:extLst>
+          </p:cNvPr>
+          <p:cNvSpPr>
+            <a:spLocks noGrp="1"/>
+          </p:cNvSpPr>
+          <p:nvPr>
+            <p:ph type="title"/>
+          </p:nvPr>
+        </p:nvSpPr>
+        <p:spPr/>
+        <p:txBody>
+          <a:bodyPr/>
+          <a:lstStyle/>
+          <a:p>
+            <a:r>
+              <a:rPr lang="en-US"/>
+              <a:t>Related Work</a:t>
+            </a:r>
+          </a:p>
+        </p:txBody>
+      </p:sp>
+      <p:sp>
+        <p:nvSpPr>
+          <p:cNvPr id="3" name="Content Placeholder 2">
+            <a:extLst>
+              <a:ext uri="{FF2B5EF4-FFF2-40B4-BE49-F238E27FC236}">
+                <a16:creationId xmlns:a16="http://schemas.microsoft.com/office/drawing/2014/main" id="{867B05C8-82AD-F656-A5F4-86EE00AD3D34}"/>
+              </a:ext>
+            </a:extLst>
+          </p:cNvPr>
+          <p:cNvSpPr>
+            <a:spLocks noGrp="1"/>
+          </p:cNvSpPr>
+          <p:nvPr>
+            <p:ph idx="1"/>
+          </p:nvPr>
+        </p:nvSpPr>
+        <p:spPr/>
+        <p:txBody>
+          <a:bodyPr/>
+          <a:lstStyle/>
+          <a:p>
+            <a:endParaRPr lang="en-US"/>
+          </a:p>
+        </p:txBody>
+      </p:sp>
+    </p:spTree>
+    <p:extLst>
+      <p:ext uri="{BB962C8B-B14F-4D97-AF65-F5344CB8AC3E}">
+        <p14:creationId xmlns:p14="http://schemas.microsoft.com/office/powerpoint/2010/main" val="3532286866"/>
+      </p:ext>
+    </p:extLst>
+  </p:cSld>
+  <p:clrMapOvr>
+    <a:masterClrMapping/>
+  </p:clrMapOvr>
+</p:sld>
+</file>
+
+<file path=ppt/slides/slide11.xml><?xml version="1.0" encoding="utf-8"?>
+<p:sld xmlns:a="http://schemas.openxmlformats.org/drawingml/2006/main" xmlns:r="http://schemas.openxmlformats.org/officeDocument/2006/relationships" xmlns:p="http://schemas.openxmlformats.org/presentationml/2006/main">
+  <p:cSld>
+    <p:spTree>
+      <p:nvGrpSpPr>
+        <p:cNvPr id="1" name=""/>
+        <p:cNvGrpSpPr/>
+        <p:nvPr/>
+      </p:nvGrpSpPr>
+      <p:grpSpPr>
+        <a:xfrm>
+          <a:off x="0" y="0"/>
+          <a:ext cx="0" cy="0"/>
+          <a:chOff x="0" y="0"/>
+          <a:chExt cx="0" cy="0"/>
+        </a:xfrm>
+      </p:grpSpPr>
+      <p:sp>
+        <p:nvSpPr>
+          <p:cNvPr id="2" name="Title 1">
+            <a:extLst>
+              <a:ext uri="{FF2B5EF4-FFF2-40B4-BE49-F238E27FC236}">
+                <a16:creationId xmlns:a16="http://schemas.microsoft.com/office/drawing/2014/main" id="{8EBC56D0-057A-5FFF-AE39-705722231E04}"/>
+              </a:ext>
+            </a:extLst>
+          </p:cNvPr>
+          <p:cNvSpPr>
+            <a:spLocks noGrp="1"/>
+          </p:cNvSpPr>
+          <p:nvPr>
+            <p:ph type="title"/>
+          </p:nvPr>
+        </p:nvSpPr>
+        <p:spPr/>
+        <p:txBody>
+          <a:bodyPr/>
+          <a:lstStyle/>
+          <a:p>
+            <a:r>
+              <a:rPr lang="en-US"/>
+              <a:t>Flappy Bird</a:t>
+            </a:r>
+          </a:p>
+        </p:txBody>
+      </p:sp>
+      <p:sp>
+        <p:nvSpPr>
+          <p:cNvPr id="3" name="Content Placeholder 2">
+            <a:extLst>
+              <a:ext uri="{FF2B5EF4-FFF2-40B4-BE49-F238E27FC236}">
+                <a16:creationId xmlns:a16="http://schemas.microsoft.com/office/drawing/2014/main" id="{C1859EA6-7032-9EEE-34DB-29CF5C933C47}"/>
+              </a:ext>
+            </a:extLst>
+          </p:cNvPr>
+          <p:cNvSpPr>
+            <a:spLocks noGrp="1"/>
+          </p:cNvSpPr>
+          <p:nvPr>
+            <p:ph idx="1"/>
+          </p:nvPr>
+        </p:nvSpPr>
+        <p:spPr/>
+        <p:txBody>
+          <a:bodyPr/>
+          <a:lstStyle/>
+          <a:p>
+            <a:endParaRPr lang="en-US"/>
+          </a:p>
+        </p:txBody>
+      </p:sp>
+    </p:spTree>
+    <p:extLst>
+      <p:ext uri="{BB962C8B-B14F-4D97-AF65-F5344CB8AC3E}">
+        <p14:creationId xmlns:p14="http://schemas.microsoft.com/office/powerpoint/2010/main" val="1092649761"/>
+      </p:ext>
+    </p:extLst>
+  </p:cSld>
+  <p:clrMapOvr>
+    <a:masterClrMapping/>
+  </p:clrMapOvr>
+</p:sld>
+</file>
+
+<file path=ppt/slides/slide12.xml><?xml version="1.0" encoding="utf-8"?>
+<p:sld xmlns:a="http://schemas.openxmlformats.org/drawingml/2006/main" xmlns:r="http://schemas.openxmlformats.org/officeDocument/2006/relationships" xmlns:p="http://schemas.openxmlformats.org/presentationml/2006/main">
+  <p:cSld>
+    <p:spTree>
+      <p:nvGrpSpPr>
+        <p:cNvPr id="1" name=""/>
+        <p:cNvGrpSpPr/>
+        <p:nvPr/>
+      </p:nvGrpSpPr>
+      <p:grpSpPr>
+        <a:xfrm>
+          <a:off x="0" y="0"/>
+          <a:ext cx="0" cy="0"/>
+          <a:chOff x="0" y="0"/>
+          <a:chExt cx="0" cy="0"/>
+        </a:xfrm>
+      </p:grpSpPr>
+      <p:sp>
+        <p:nvSpPr>
+          <p:cNvPr id="2" name="Title 1">
+            <a:extLst>
+              <a:ext uri="{FF2B5EF4-FFF2-40B4-BE49-F238E27FC236}">
+                <a16:creationId xmlns:a16="http://schemas.microsoft.com/office/drawing/2014/main" id="{77C0A9B3-F8B8-53B6-BDD7-D2AFC35626E5}"/>
+              </a:ext>
+            </a:extLst>
+          </p:cNvPr>
+          <p:cNvSpPr>
+            <a:spLocks noGrp="1"/>
+          </p:cNvSpPr>
+          <p:nvPr>
+            <p:ph type="title"/>
+          </p:nvPr>
+        </p:nvSpPr>
+        <p:spPr/>
+        <p:txBody>
+          <a:bodyPr/>
+          <a:lstStyle/>
+          <a:p>
+            <a:r>
+              <a:rPr lang="en-US"/>
+              <a:t>Introduction to Reinforcement Learning</a:t>
+            </a:r>
+          </a:p>
+        </p:txBody>
+      </p:sp>
+      <p:sp>
+        <p:nvSpPr>
+          <p:cNvPr id="3" name="Content Placeholder 2">
+            <a:extLst>
+              <a:ext uri="{FF2B5EF4-FFF2-40B4-BE49-F238E27FC236}">
+                <a16:creationId xmlns:a16="http://schemas.microsoft.com/office/drawing/2014/main" id="{7855BF93-0762-AFCD-7F98-DEB3B9778901}"/>
+              </a:ext>
+            </a:extLst>
+          </p:cNvPr>
+          <p:cNvSpPr>
+            <a:spLocks noGrp="1"/>
+          </p:cNvSpPr>
+          <p:nvPr>
+            <p:ph idx="1"/>
+          </p:nvPr>
+        </p:nvSpPr>
+        <p:spPr/>
+        <p:txBody>
+          <a:bodyPr/>
+          <a:lstStyle/>
+          <a:p>
+            <a:endParaRPr lang="en-US"/>
+          </a:p>
+        </p:txBody>
+      </p:sp>
+    </p:spTree>
+    <p:extLst>
+      <p:ext uri="{BB962C8B-B14F-4D97-AF65-F5344CB8AC3E}">
+        <p14:creationId xmlns:p14="http://schemas.microsoft.com/office/powerpoint/2010/main" val="1569823619"/>
+      </p:ext>
+    </p:extLst>
+  </p:cSld>
+  <p:clrMapOvr>
+    <a:masterClrMapping/>
+  </p:clrMapOvr>
+</p:sld>
+</file>
+
+<file path=ppt/slides/slide13.xml><?xml version="1.0" encoding="utf-8"?>
+<p:sld xmlns:a="http://schemas.openxmlformats.org/drawingml/2006/main" xmlns:r="http://schemas.openxmlformats.org/officeDocument/2006/relationships" xmlns:p="http://schemas.openxmlformats.org/presentationml/2006/main">
+  <p:cSld>
+    <p:spTree>
+      <p:nvGrpSpPr>
+        <p:cNvPr id="1" name=""/>
+        <p:cNvGrpSpPr/>
+        <p:nvPr/>
+      </p:nvGrpSpPr>
+      <p:grpSpPr>
+        <a:xfrm>
+          <a:off x="0" y="0"/>
+          <a:ext cx="0" cy="0"/>
+          <a:chOff x="0" y="0"/>
+          <a:chExt cx="0" cy="0"/>
+        </a:xfrm>
+      </p:grpSpPr>
+      <p:sp>
+        <p:nvSpPr>
+          <p:cNvPr id="2" name="Title 1">
+            <a:extLst>
+              <a:ext uri="{FF2B5EF4-FFF2-40B4-BE49-F238E27FC236}">
+                <a16:creationId xmlns:a16="http://schemas.microsoft.com/office/drawing/2014/main" id="{E9417F6A-B489-58EC-2709-0CA1EB40035E}"/>
+              </a:ext>
+            </a:extLst>
+          </p:cNvPr>
+          <p:cNvSpPr>
+            <a:spLocks noGrp="1"/>
+          </p:cNvSpPr>
+          <p:nvPr>
+            <p:ph type="title"/>
+          </p:nvPr>
+        </p:nvSpPr>
+        <p:spPr/>
+        <p:txBody>
+          <a:bodyPr/>
+          <a:lstStyle/>
+          <a:p>
+            <a:r>
+              <a:rPr lang="en-US"/>
+              <a:t>DQNs</a:t>
+            </a:r>
+          </a:p>
+        </p:txBody>
+      </p:sp>
+      <p:sp>
+        <p:nvSpPr>
+          <p:cNvPr id="3" name="Content Placeholder 2">
+            <a:extLst>
+              <a:ext uri="{FF2B5EF4-FFF2-40B4-BE49-F238E27FC236}">
+                <a16:creationId xmlns:a16="http://schemas.microsoft.com/office/drawing/2014/main" id="{82422E28-09FE-805E-EFD4-53761C0B6F06}"/>
+              </a:ext>
+            </a:extLst>
+          </p:cNvPr>
+          <p:cNvSpPr>
+            <a:spLocks noGrp="1"/>
+          </p:cNvSpPr>
+          <p:nvPr>
+            <p:ph idx="1"/>
+          </p:nvPr>
+        </p:nvSpPr>
+        <p:spPr/>
+        <p:txBody>
+          <a:bodyPr/>
+          <a:lstStyle/>
+          <a:p>
+            <a:endParaRPr lang="en-US"/>
+          </a:p>
+        </p:txBody>
+      </p:sp>
+    </p:spTree>
+    <p:extLst>
+      <p:ext uri="{BB962C8B-B14F-4D97-AF65-F5344CB8AC3E}">
+        <p14:creationId xmlns:p14="http://schemas.microsoft.com/office/powerpoint/2010/main" val="3790762345"/>
+      </p:ext>
+    </p:extLst>
+  </p:cSld>
+  <p:clrMapOvr>
+    <a:masterClrMapping/>
+  </p:clrMapOvr>
+</p:sld>
+</file>
+
+<file path=ppt/slides/slide14.xml><?xml version="1.0" encoding="utf-8"?>
+<p:sld xmlns:a="http://schemas.openxmlformats.org/drawingml/2006/main" xmlns:r="http://schemas.openxmlformats.org/officeDocument/2006/relationships" xmlns:p="http://schemas.openxmlformats.org/presentationml/2006/main">
+  <p:cSld>
+    <p:spTree>
+      <p:nvGrpSpPr>
+        <p:cNvPr id="1" name=""/>
+        <p:cNvGrpSpPr/>
+        <p:nvPr/>
+      </p:nvGrpSpPr>
+      <p:grpSpPr>
+        <a:xfrm>
+          <a:off x="0" y="0"/>
+          <a:ext cx="0" cy="0"/>
+          <a:chOff x="0" y="0"/>
+          <a:chExt cx="0" cy="0"/>
+        </a:xfrm>
+      </p:grpSpPr>
+      <p:sp>
+        <p:nvSpPr>
+          <p:cNvPr id="2" name="Title 1">
+            <a:extLst>
+              <a:ext uri="{FF2B5EF4-FFF2-40B4-BE49-F238E27FC236}">
+                <a16:creationId xmlns:a16="http://schemas.microsoft.com/office/drawing/2014/main" id="{10346395-9B9B-8FA1-3058-10C2035756A2}"/>
+              </a:ext>
+            </a:extLst>
+          </p:cNvPr>
+          <p:cNvSpPr>
+            <a:spLocks noGrp="1"/>
+          </p:cNvSpPr>
+          <p:nvPr>
+            <p:ph type="title"/>
+          </p:nvPr>
+        </p:nvSpPr>
+        <p:spPr/>
+        <p:txBody>
+          <a:bodyPr/>
+          <a:lstStyle/>
+          <a:p>
+            <a:r>
+              <a:rPr lang="en-US"/>
+              <a:t>Ablation Study</a:t>
+            </a:r>
+          </a:p>
+        </p:txBody>
+      </p:sp>
+      <p:sp>
+        <p:nvSpPr>
+          <p:cNvPr id="3" name="Content Placeholder 2">
+            <a:extLst>
+              <a:ext uri="{FF2B5EF4-FFF2-40B4-BE49-F238E27FC236}">
+                <a16:creationId xmlns:a16="http://schemas.microsoft.com/office/drawing/2014/main" id="{B6E285AD-E51E-6BDF-5353-C94A567F586F}"/>
+              </a:ext>
+            </a:extLst>
+          </p:cNvPr>
+          <p:cNvSpPr>
+            <a:spLocks noGrp="1"/>
+          </p:cNvSpPr>
+          <p:nvPr>
+            <p:ph idx="1"/>
+          </p:nvPr>
+        </p:nvSpPr>
+        <p:spPr/>
+        <p:txBody>
+          <a:bodyPr/>
+          <a:lstStyle/>
+          <a:p>
+            <a:endParaRPr lang="en-US"/>
+          </a:p>
+        </p:txBody>
+      </p:sp>
+    </p:spTree>
+    <p:extLst>
+      <p:ext uri="{BB962C8B-B14F-4D97-AF65-F5344CB8AC3E}">
+        <p14:creationId xmlns:p14="http://schemas.microsoft.com/office/powerpoint/2010/main" val="1905475954"/>
+      </p:ext>
+    </p:extLst>
+  </p:cSld>
+  <p:clrMapOvr>
+    <a:masterClrMapping/>
+  </p:clrMapOvr>
+</p:sld>
+</file>
+
+<file path=ppt/slides/slide15.xml><?xml version="1.0" encoding="utf-8"?>
+<p:sld xmlns:a="http://schemas.openxmlformats.org/drawingml/2006/main" xmlns:r="http://schemas.openxmlformats.org/officeDocument/2006/relationships" xmlns:p="http://schemas.openxmlformats.org/presentationml/2006/main">
+  <p:cSld>
+    <p:spTree>
+      <p:nvGrpSpPr>
+        <p:cNvPr id="1" name=""/>
+        <p:cNvGrpSpPr/>
+        <p:nvPr/>
+      </p:nvGrpSpPr>
+      <p:grpSpPr>
+        <a:xfrm>
+          <a:off x="0" y="0"/>
+          <a:ext cx="0" cy="0"/>
+          <a:chOff x="0" y="0"/>
+          <a:chExt cx="0" cy="0"/>
+        </a:xfrm>
+      </p:grpSpPr>
+      <p:sp>
+        <p:nvSpPr>
+          <p:cNvPr id="2" name="Title 1">
+            <a:extLst>
+              <a:ext uri="{FF2B5EF4-FFF2-40B4-BE49-F238E27FC236}">
                 <a16:creationId xmlns:a16="http://schemas.microsoft.com/office/drawing/2014/main" id="{092612FB-A216-B0E3-B79A-CB0128A77CE2}"/>
               </a:ext>
             </a:extLst>
@@ -4722,7 +5064,7 @@
 </p:sld>
 </file>
 
-<file path=ppt/slides/slide11.xml><?xml version="1.0" encoding="utf-8"?>
+<file path=ppt/slides/slide16.xml><?xml version="1.0" encoding="utf-8"?>
 <p:sld xmlns:a="http://schemas.openxmlformats.org/drawingml/2006/main" xmlns:r="http://schemas.openxmlformats.org/officeDocument/2006/relationships" xmlns:p="http://schemas.openxmlformats.org/presentationml/2006/main">
   <p:cSld>
     <p:spTree>
@@ -4824,10 +5166,10 @@
       </p:grpSpPr>
       <p:sp>
         <p:nvSpPr>
-          <p:cNvPr id="2" name="Title 1">
+          <p:cNvPr id="3" name="Content Placeholder 2">
             <a:extLst>
               <a:ext uri="{FF2B5EF4-FFF2-40B4-BE49-F238E27FC236}">
-                <a16:creationId xmlns:a16="http://schemas.microsoft.com/office/drawing/2014/main" id="{BB6F790C-E6D3-C10E-DFE4-85D103CA5757}"/>
+                <a16:creationId xmlns:a16="http://schemas.microsoft.com/office/drawing/2014/main" id="{59ADD652-6846-363B-B4BF-E8122BE24C9C}"/>
               </a:ext>
             </a:extLst>
           </p:cNvPr>
@@ -4835,68 +5177,106 @@
             <a:spLocks noGrp="1"/>
           </p:cNvSpPr>
           <p:nvPr>
-            <p:ph type="title"/>
-          </p:nvPr>
-        </p:nvSpPr>
-        <p:spPr/>
-        <p:txBody>
-          <a:bodyPr/>
-          <a:lstStyle/>
-          <a:p>
-            <a:r>
-              <a:rPr lang="en-US"/>
-              <a:t>Introduction</a:t>
-            </a:r>
-          </a:p>
-        </p:txBody>
-      </p:sp>
-      <p:sp>
-        <p:nvSpPr>
-          <p:cNvPr id="3" name="Content Placeholder 2">
+            <p:ph idx="1"/>
+          </p:nvPr>
+        </p:nvSpPr>
+        <p:spPr>
+          <a:xfrm>
+            <a:off x="420016" y="1253331"/>
+            <a:ext cx="10515600" cy="4351338"/>
+          </a:xfrm>
+        </p:spPr>
+        <p:txBody>
+          <a:bodyPr/>
+          <a:lstStyle/>
+          <a:p>
+            <a:r>
+              <a:rPr lang="en-US"/>
+              <a:t>Path Planning</a:t>
+            </a:r>
+          </a:p>
+          <a:p>
+            <a:pPr lvl="1"/>
+            <a:r>
+              <a:rPr lang="en-US"/>
+              <a:t>Navigation</a:t>
+            </a:r>
+          </a:p>
+          <a:p>
+            <a:pPr lvl="1"/>
+            <a:r>
+              <a:rPr lang="en-US"/>
+              <a:t>Autonomy</a:t>
+            </a:r>
+          </a:p>
+          <a:p>
+            <a:pPr lvl="1"/>
+            <a:r>
+              <a:rPr lang="en-US"/>
+              <a:t>Motion Planning</a:t>
+            </a:r>
+          </a:p>
+          <a:p>
+            <a:r>
+              <a:rPr lang="en-US"/>
+              <a:t>ATR</a:t>
+            </a:r>
+          </a:p>
+          <a:p>
+            <a:pPr lvl="1"/>
+            <a:r>
+              <a:rPr lang="en-US"/>
+              <a:t>SSD</a:t>
+            </a:r>
+          </a:p>
+          <a:p>
+            <a:pPr lvl="1"/>
+            <a:r>
+              <a:rPr lang="en-US"/>
+              <a:t>RT-DETR</a:t>
+            </a:r>
+          </a:p>
+        </p:txBody>
+      </p:sp>
+      <p:sp>
+        <p:nvSpPr>
+          <p:cNvPr id="4" name="TextBox 3">
             <a:extLst>
               <a:ext uri="{FF2B5EF4-FFF2-40B4-BE49-F238E27FC236}">
-                <a16:creationId xmlns:a16="http://schemas.microsoft.com/office/drawing/2014/main" id="{E6B4044C-E997-1227-1BE4-7A3ED16EB3F3}"/>
+                <a16:creationId xmlns:a16="http://schemas.microsoft.com/office/drawing/2014/main" id="{8559854B-9201-4DEE-B770-677D547F1245}"/>
               </a:ext>
             </a:extLst>
           </p:cNvPr>
-          <p:cNvSpPr>
-            <a:spLocks noGrp="1"/>
-          </p:cNvSpPr>
-          <p:nvPr>
-            <p:ph idx="1"/>
-          </p:nvPr>
-        </p:nvSpPr>
-        <p:spPr/>
-        <p:txBody>
-          <a:bodyPr/>
-          <a:lstStyle/>
-          <a:p>
-            <a:r>
-              <a:rPr lang="en-US"/>
-              <a:t>Investigate neural network complexity required for optimal Flappy Bird performance</a:t>
-            </a:r>
-          </a:p>
-          <a:p>
-            <a:r>
-              <a:rPr lang="en-US"/>
-              <a:t>Define "perfect performance" as surpassing a handcrafted evaluation agent scoring 950/1000 over 1000 runs with a std of 170</a:t>
-            </a:r>
-          </a:p>
-          <a:p>
-            <a:pPr marL="0" indent="0">
-              <a:buNone/>
-            </a:pPr>
-            <a:endParaRPr lang="en-US"/>
-          </a:p>
-          <a:p>
-            <a:endParaRPr lang="en-US"/>
+          <p:cNvSpPr txBox="1"/>
+          <p:nvPr/>
+        </p:nvSpPr>
+        <p:spPr>
+          <a:xfrm>
+            <a:off x="420016" y="309390"/>
+            <a:ext cx="2901918" cy="707886"/>
+          </a:xfrm>
+          <a:prstGeom prst="rect">
+            <a:avLst/>
+          </a:prstGeom>
+          <a:noFill/>
+        </p:spPr>
+        <p:txBody>
+          <a:bodyPr wrap="square" rtlCol="0">
+            <a:spAutoFit/>
+          </a:bodyPr>
+          <a:lstStyle/>
+          <a:p>
+            <a:r>
+              <a:rPr lang="en-US" sz="4000"/>
+              <a:t>Experience</a:t>
+            </a:r>
           </a:p>
         </p:txBody>
       </p:sp>
     </p:spTree>
     <p:extLst>
       <p:ext uri="{BB962C8B-B14F-4D97-AF65-F5344CB8AC3E}">
-        <p14:creationId xmlns:p14="http://schemas.microsoft.com/office/powerpoint/2010/main" val="3217657075"/>
+        <p14:creationId xmlns:p14="http://schemas.microsoft.com/office/powerpoint/2010/main" val="3711912704"/>
       </p:ext>
     </p:extLst>
   </p:cSld>
@@ -4928,7 +5308,7 @@
           <p:cNvPr id="2" name="Title 1">
             <a:extLst>
               <a:ext uri="{FF2B5EF4-FFF2-40B4-BE49-F238E27FC236}">
-                <a16:creationId xmlns:a16="http://schemas.microsoft.com/office/drawing/2014/main" id="{DFF08C58-45B2-1194-66F6-3D260E1BD43F}"/>
+                <a16:creationId xmlns:a16="http://schemas.microsoft.com/office/drawing/2014/main" id="{B437DFE7-4672-2BCA-F4BE-7E789FAC8FEE}"/>
               </a:ext>
             </a:extLst>
           </p:cNvPr>
@@ -4946,7 +5326,7 @@
           <a:p>
             <a:r>
               <a:rPr lang="en-US"/>
-              <a:t>Contributions</a:t>
+              <a:t>Career Summary</a:t>
             </a:r>
           </a:p>
         </p:txBody>
@@ -4956,7 +5336,7 @@
           <p:cNvPr id="3" name="Content Placeholder 2">
             <a:extLst>
               <a:ext uri="{FF2B5EF4-FFF2-40B4-BE49-F238E27FC236}">
-                <a16:creationId xmlns:a16="http://schemas.microsoft.com/office/drawing/2014/main" id="{DEFB5949-8589-537D-D504-0DAAF0A4409B}"/>
+                <a16:creationId xmlns:a16="http://schemas.microsoft.com/office/drawing/2014/main" id="{9FF8641F-01D2-F458-5651-2DA813732757}"/>
               </a:ext>
             </a:extLst>
           </p:cNvPr>
@@ -4967,17 +5347,90 @@
             <p:ph idx="1"/>
           </p:nvPr>
         </p:nvSpPr>
-        <p:spPr/>
-        <p:txBody>
-          <a:bodyPr/>
-          <a:lstStyle/>
-          <a:p>
-            <a:r>
-              <a:rPr lang="en-US"/>
-              <a:t>Development of high-performing handcrafted agent</a:t>
-            </a:r>
-          </a:p>
-          <a:p>
+        <p:spPr>
+          <a:xfrm>
+            <a:off x="1043940" y="1690688"/>
+            <a:ext cx="5619750" cy="4351338"/>
+          </a:xfrm>
+        </p:spPr>
+        <p:txBody>
+          <a:bodyPr/>
+          <a:lstStyle/>
+          <a:p>
+            <a:pPr marL="514350" indent="-514350">
+              <a:buFont typeface="+mj-lt"/>
+              <a:buAutoNum type="arabicPeriod"/>
+            </a:pPr>
+            <a:r>
+              <a:rPr lang="en-US"/>
+              <a:t>Path Planning</a:t>
+            </a:r>
+          </a:p>
+          <a:p>
+            <a:pPr marL="971550" lvl="1" indent="-514350">
+              <a:buFont typeface="+mj-lt"/>
+              <a:buAutoNum type="arabicPeriod"/>
+            </a:pPr>
+            <a:r>
+              <a:rPr lang="en-US"/>
+              <a:t>Navigation</a:t>
+            </a:r>
+          </a:p>
+          <a:p>
+            <a:pPr marL="971550" lvl="1" indent="-514350">
+              <a:buFont typeface="+mj-lt"/>
+              <a:buAutoNum type="arabicPeriod"/>
+            </a:pPr>
+            <a:r>
+              <a:rPr lang="en-US"/>
+              <a:t>Autonomy</a:t>
+            </a:r>
+          </a:p>
+          <a:p>
+            <a:pPr marL="971550" lvl="1" indent="-514350">
+              <a:buFont typeface="+mj-lt"/>
+              <a:buAutoNum type="arabicPeriod"/>
+            </a:pPr>
+            <a:r>
+              <a:rPr lang="en-US"/>
+              <a:t>Motion Planning</a:t>
+            </a:r>
+          </a:p>
+          <a:p>
+            <a:pPr marL="514350" indent="-514350">
+              <a:buFont typeface="+mj-lt"/>
+              <a:buAutoNum type="arabicPeriod"/>
+            </a:pPr>
+            <a:r>
+              <a:rPr lang="en-US"/>
+              <a:t>Automated Target Recognition</a:t>
+            </a:r>
+          </a:p>
+          <a:p>
+            <a:pPr marL="971550" lvl="1" indent="-514350">
+              <a:buFont typeface="+mj-lt"/>
+              <a:buAutoNum type="arabicPeriod"/>
+            </a:pPr>
+            <a:r>
+              <a:rPr lang="en-US"/>
+              <a:t>SSD</a:t>
+            </a:r>
+          </a:p>
+          <a:p>
+            <a:pPr marL="971550" lvl="1" indent="-514350">
+              <a:buFont typeface="+mj-lt"/>
+              <a:buAutoNum type="arabicPeriod"/>
+            </a:pPr>
+            <a:r>
+              <a:rPr lang="en-US"/>
+              <a:t>RT-DETR</a:t>
+            </a:r>
+          </a:p>
+          <a:p>
+            <a:pPr marL="971550" lvl="1" indent="-514350">
+              <a:buFont typeface="+mj-lt"/>
+              <a:buAutoNum type="arabicPeriod"/>
+            </a:pPr>
             <a:endParaRPr lang="en-US"/>
           </a:p>
         </p:txBody>
@@ -4985,7 +5438,7 @@
     </p:spTree>
     <p:extLst>
       <p:ext uri="{BB962C8B-B14F-4D97-AF65-F5344CB8AC3E}">
-        <p14:creationId xmlns:p14="http://schemas.microsoft.com/office/powerpoint/2010/main" val="2625338137"/>
+        <p14:creationId xmlns:p14="http://schemas.microsoft.com/office/powerpoint/2010/main" val="3173743963"/>
       </p:ext>
     </p:extLst>
   </p:cSld>
@@ -5017,7 +5470,7 @@
           <p:cNvPr id="2" name="Title 1">
             <a:extLst>
               <a:ext uri="{FF2B5EF4-FFF2-40B4-BE49-F238E27FC236}">
-                <a16:creationId xmlns:a16="http://schemas.microsoft.com/office/drawing/2014/main" id="{61E03812-1D25-2927-A296-372454B9BEAD}"/>
+                <a16:creationId xmlns:a16="http://schemas.microsoft.com/office/drawing/2014/main" id="{6B3610FF-F65E-47CD-0799-11F645D1DCC7}"/>
               </a:ext>
             </a:extLst>
           </p:cNvPr>
@@ -5035,7 +5488,7 @@
           <a:p>
             <a:r>
               <a:rPr lang="en-US"/>
-              <a:t>Disclaimer</a:t>
+              <a:t>Categories of Reinforcement Learning</a:t>
             </a:r>
           </a:p>
         </p:txBody>
@@ -5045,7 +5498,7 @@
           <p:cNvPr id="3" name="Content Placeholder 2">
             <a:extLst>
               <a:ext uri="{FF2B5EF4-FFF2-40B4-BE49-F238E27FC236}">
-                <a16:creationId xmlns:a16="http://schemas.microsoft.com/office/drawing/2014/main" id="{F7AC0773-F915-197C-3C07-76E6074E1786}"/>
+                <a16:creationId xmlns:a16="http://schemas.microsoft.com/office/drawing/2014/main" id="{28B3F20A-DA6E-76F6-EEBF-E807DD581216}"/>
               </a:ext>
             </a:extLst>
           </p:cNvPr>
@@ -5061,23 +5514,29 @@
           <a:bodyPr/>
           <a:lstStyle/>
           <a:p>
-            <a:r>
-              <a:rPr lang="en-US"/>
-              <a:t>Non-pixel based learning</a:t>
-            </a:r>
-          </a:p>
-          <a:p>
-            <a:pPr marL="0" indent="0">
-              <a:buNone/>
+            <a:pPr marL="514350" indent="-514350">
+              <a:buAutoNum type="arabicPeriod"/>
             </a:pPr>
-            <a:endParaRPr lang="en-US"/>
+            <a:r>
+              <a:rPr lang="en-US"/>
+              <a:t>Model-based / Model-free</a:t>
+            </a:r>
+          </a:p>
+          <a:p>
+            <a:pPr marL="514350" indent="-514350">
+              <a:buAutoNum type="arabicPeriod"/>
+            </a:pPr>
+            <a:r>
+              <a:rPr lang="en-US"/>
+              <a:t>Value-based / Policy-based Methods</a:t>
+            </a:r>
           </a:p>
         </p:txBody>
       </p:sp>
     </p:spTree>
     <p:extLst>
       <p:ext uri="{BB962C8B-B14F-4D97-AF65-F5344CB8AC3E}">
-        <p14:creationId xmlns:p14="http://schemas.microsoft.com/office/powerpoint/2010/main" val="3999997264"/>
+        <p14:creationId xmlns:p14="http://schemas.microsoft.com/office/powerpoint/2010/main" val="445927258"/>
       </p:ext>
     </p:extLst>
   </p:cSld>
@@ -5109,7 +5568,7 @@
           <p:cNvPr id="2" name="Title 1">
             <a:extLst>
               <a:ext uri="{FF2B5EF4-FFF2-40B4-BE49-F238E27FC236}">
-                <a16:creationId xmlns:a16="http://schemas.microsoft.com/office/drawing/2014/main" id="{7728BDED-42C8-A07E-62BB-E0AB8DE2E6DE}"/>
+                <a16:creationId xmlns:a16="http://schemas.microsoft.com/office/drawing/2014/main" id="{BB6F790C-E6D3-C10E-DFE4-85D103CA5757}"/>
               </a:ext>
             </a:extLst>
           </p:cNvPr>
@@ -5127,7 +5586,7 @@
           <a:p>
             <a:r>
               <a:rPr lang="en-US"/>
-              <a:t>Related Work</a:t>
+              <a:t>What is reinforcement learning?</a:t>
             </a:r>
           </a:p>
         </p:txBody>
@@ -5137,7 +5596,7 @@
           <p:cNvPr id="3" name="Content Placeholder 2">
             <a:extLst>
               <a:ext uri="{FF2B5EF4-FFF2-40B4-BE49-F238E27FC236}">
-                <a16:creationId xmlns:a16="http://schemas.microsoft.com/office/drawing/2014/main" id="{867B05C8-82AD-F656-A5F4-86EE00AD3D34}"/>
+                <a16:creationId xmlns:a16="http://schemas.microsoft.com/office/drawing/2014/main" id="{E6B4044C-E997-1227-1BE4-7A3ED16EB3F3}"/>
               </a:ext>
             </a:extLst>
           </p:cNvPr>
@@ -5153,6 +5612,19 @@
           <a:bodyPr/>
           <a:lstStyle/>
           <a:p>
+            <a:r>
+              <a:rPr lang="en-US"/>
+              <a:t>Automates the process of human learning</a:t>
+            </a:r>
+          </a:p>
+          <a:p>
+            <a:pPr lvl="1"/>
+            <a:r>
+              <a:rPr lang="en-US"/>
+              <a:t>A numerical reward instead of emotional reward</a:t>
+            </a:r>
+          </a:p>
+          <a:p>
             <a:endParaRPr lang="en-US"/>
           </a:p>
         </p:txBody>
@@ -5160,7 +5632,7 @@
     </p:spTree>
     <p:extLst>
       <p:ext uri="{BB962C8B-B14F-4D97-AF65-F5344CB8AC3E}">
-        <p14:creationId xmlns:p14="http://schemas.microsoft.com/office/powerpoint/2010/main" val="3532286866"/>
+        <p14:creationId xmlns:p14="http://schemas.microsoft.com/office/powerpoint/2010/main" val="3217657075"/>
       </p:ext>
     </p:extLst>
   </p:cSld>
@@ -5192,7 +5664,7 @@
           <p:cNvPr id="2" name="Title 1">
             <a:extLst>
               <a:ext uri="{FF2B5EF4-FFF2-40B4-BE49-F238E27FC236}">
-                <a16:creationId xmlns:a16="http://schemas.microsoft.com/office/drawing/2014/main" id="{8EBC56D0-057A-5FFF-AE39-705722231E04}"/>
+                <a16:creationId xmlns:a16="http://schemas.microsoft.com/office/drawing/2014/main" id="{DFF08C58-45B2-1194-66F6-3D260E1BD43F}"/>
               </a:ext>
             </a:extLst>
           </p:cNvPr>
@@ -5210,7 +5682,7 @@
           <a:p>
             <a:r>
               <a:rPr lang="en-US"/>
-              <a:t>Flappy Bird</a:t>
+              <a:t>Model-based Methods</a:t>
             </a:r>
           </a:p>
         </p:txBody>
@@ -5220,7 +5692,7 @@
           <p:cNvPr id="3" name="Content Placeholder 2">
             <a:extLst>
               <a:ext uri="{FF2B5EF4-FFF2-40B4-BE49-F238E27FC236}">
-                <a16:creationId xmlns:a16="http://schemas.microsoft.com/office/drawing/2014/main" id="{C1859EA6-7032-9EEE-34DB-29CF5C933C47}"/>
+                <a16:creationId xmlns:a16="http://schemas.microsoft.com/office/drawing/2014/main" id="{DEFB5949-8589-537D-D504-0DAAF0A4409B}"/>
               </a:ext>
             </a:extLst>
           </p:cNvPr>
@@ -5236,14 +5708,17 @@
           <a:bodyPr/>
           <a:lstStyle/>
           <a:p>
-            <a:endParaRPr lang="en-US"/>
+            <a:r>
+              <a:rPr lang="en-US"/>
+              <a:t>Knowledge of the next state, but not it's value</a:t>
+            </a:r>
           </a:p>
         </p:txBody>
       </p:sp>
     </p:spTree>
     <p:extLst>
       <p:ext uri="{BB962C8B-B14F-4D97-AF65-F5344CB8AC3E}">
-        <p14:creationId xmlns:p14="http://schemas.microsoft.com/office/powerpoint/2010/main" val="1092649761"/>
+        <p14:creationId xmlns:p14="http://schemas.microsoft.com/office/powerpoint/2010/main" val="2625338137"/>
       </p:ext>
     </p:extLst>
   </p:cSld>
@@ -5275,7 +5750,7 @@
           <p:cNvPr id="2" name="Title 1">
             <a:extLst>
               <a:ext uri="{FF2B5EF4-FFF2-40B4-BE49-F238E27FC236}">
-                <a16:creationId xmlns:a16="http://schemas.microsoft.com/office/drawing/2014/main" id="{77C0A9B3-F8B8-53B6-BDD7-D2AFC35626E5}"/>
+                <a16:creationId xmlns:a16="http://schemas.microsoft.com/office/drawing/2014/main" id="{457C2D9E-13CA-EF29-DC50-290667E24BC9}"/>
               </a:ext>
             </a:extLst>
           </p:cNvPr>
@@ -5293,7 +5768,7 @@
           <a:p>
             <a:r>
               <a:rPr lang="en-US"/>
-              <a:t>Introduction to Reinforcement Learning</a:t>
+              <a:t>Model-free Methods</a:t>
             </a:r>
           </a:p>
         </p:txBody>
@@ -5303,7 +5778,7 @@
           <p:cNvPr id="3" name="Content Placeholder 2">
             <a:extLst>
               <a:ext uri="{FF2B5EF4-FFF2-40B4-BE49-F238E27FC236}">
-                <a16:creationId xmlns:a16="http://schemas.microsoft.com/office/drawing/2014/main" id="{7855BF93-0762-AFCD-7F98-DEB3B9778901}"/>
+                <a16:creationId xmlns:a16="http://schemas.microsoft.com/office/drawing/2014/main" id="{7C282F2D-F2EF-66BA-C718-B219CAE368A8}"/>
               </a:ext>
             </a:extLst>
           </p:cNvPr>
@@ -5319,6 +5794,15 @@
           <a:bodyPr/>
           <a:lstStyle/>
           <a:p>
+            <a:r>
+              <a:rPr lang="en-US"/>
+              <a:t>Must learn P(S' |s,a)</a:t>
+            </a:r>
+          </a:p>
+          <a:p>
+            <a:pPr marL="0" indent="0">
+              <a:buNone/>
+            </a:pPr>
             <a:endParaRPr lang="en-US"/>
           </a:p>
         </p:txBody>
@@ -5326,7 +5810,7 @@
     </p:spTree>
     <p:extLst>
       <p:ext uri="{BB962C8B-B14F-4D97-AF65-F5344CB8AC3E}">
-        <p14:creationId xmlns:p14="http://schemas.microsoft.com/office/powerpoint/2010/main" val="1569823619"/>
+        <p14:creationId xmlns:p14="http://schemas.microsoft.com/office/powerpoint/2010/main" val="1242731641"/>
       </p:ext>
     </p:extLst>
   </p:cSld>
@@ -5358,7 +5842,7 @@
           <p:cNvPr id="2" name="Title 1">
             <a:extLst>
               <a:ext uri="{FF2B5EF4-FFF2-40B4-BE49-F238E27FC236}">
-                <a16:creationId xmlns:a16="http://schemas.microsoft.com/office/drawing/2014/main" id="{E9417F6A-B489-58EC-2709-0CA1EB40035E}"/>
+                <a16:creationId xmlns:a16="http://schemas.microsoft.com/office/drawing/2014/main" id="{61E03812-1D25-2927-A296-372454B9BEAD}"/>
               </a:ext>
             </a:extLst>
           </p:cNvPr>
@@ -5376,7 +5860,7 @@
           <a:p>
             <a:r>
               <a:rPr lang="en-US"/>
-              <a:t>DQNs</a:t>
+              <a:t>Policy Based Methods</a:t>
             </a:r>
           </a:p>
         </p:txBody>
@@ -5386,7 +5870,7 @@
           <p:cNvPr id="3" name="Content Placeholder 2">
             <a:extLst>
               <a:ext uri="{FF2B5EF4-FFF2-40B4-BE49-F238E27FC236}">
-                <a16:creationId xmlns:a16="http://schemas.microsoft.com/office/drawing/2014/main" id="{82422E28-09FE-805E-EFD4-53761C0B6F06}"/>
+                <a16:creationId xmlns:a16="http://schemas.microsoft.com/office/drawing/2014/main" id="{F7AC0773-F915-197C-3C07-76E6074E1786}"/>
               </a:ext>
             </a:extLst>
           </p:cNvPr>
@@ -5402,14 +5886,17 @@
           <a:bodyPr/>
           <a:lstStyle/>
           <a:p>
-            <a:endParaRPr lang="en-US"/>
+            <a:r>
+              <a:rPr lang="en-US"/>
+              <a:t>Assumes that the the optimal choice in each state is not fixed, but rather a probability</a:t>
+            </a:r>
           </a:p>
         </p:txBody>
       </p:sp>
     </p:spTree>
     <p:extLst>
       <p:ext uri="{BB962C8B-B14F-4D97-AF65-F5344CB8AC3E}">
-        <p14:creationId xmlns:p14="http://schemas.microsoft.com/office/powerpoint/2010/main" val="3790762345"/>
+        <p14:creationId xmlns:p14="http://schemas.microsoft.com/office/powerpoint/2010/main" val="3999997264"/>
       </p:ext>
     </p:extLst>
   </p:cSld>
@@ -5441,7 +5928,7 @@
           <p:cNvPr id="2" name="Title 1">
             <a:extLst>
               <a:ext uri="{FF2B5EF4-FFF2-40B4-BE49-F238E27FC236}">
-                <a16:creationId xmlns:a16="http://schemas.microsoft.com/office/drawing/2014/main" id="{10346395-9B9B-8FA1-3058-10C2035756A2}"/>
+                <a16:creationId xmlns:a16="http://schemas.microsoft.com/office/drawing/2014/main" id="{EACA37CC-234D-96AC-5C44-709D037CAD07}"/>
               </a:ext>
             </a:extLst>
           </p:cNvPr>
@@ -5459,7 +5946,7 @@
           <a:p>
             <a:r>
               <a:rPr lang="en-US"/>
-              <a:t>Ablation Study</a:t>
+              <a:t>Policy Free (Value-based) methods</a:t>
             </a:r>
           </a:p>
         </p:txBody>
@@ -5469,7 +5956,7 @@
           <p:cNvPr id="3" name="Content Placeholder 2">
             <a:extLst>
               <a:ext uri="{FF2B5EF4-FFF2-40B4-BE49-F238E27FC236}">
-                <a16:creationId xmlns:a16="http://schemas.microsoft.com/office/drawing/2014/main" id="{B6E285AD-E51E-6BDF-5353-C94A567F586F}"/>
+                <a16:creationId xmlns:a16="http://schemas.microsoft.com/office/drawing/2014/main" id="{8767E11B-2806-C734-4D2F-BBB1DF6B9FFB}"/>
               </a:ext>
             </a:extLst>
           </p:cNvPr>
@@ -5485,14 +5972,17 @@
           <a:bodyPr/>
           <a:lstStyle/>
           <a:p>
-            <a:endParaRPr lang="en-US"/>
+            <a:r>
+              <a:rPr lang="en-US"/>
+              <a:t>Assume that there is one optimal choice in each state</a:t>
+            </a:r>
           </a:p>
         </p:txBody>
       </p:sp>
     </p:spTree>
     <p:extLst>
       <p:ext uri="{BB962C8B-B14F-4D97-AF65-F5344CB8AC3E}">
-        <p14:creationId xmlns:p14="http://schemas.microsoft.com/office/powerpoint/2010/main" val="1905475954"/>
+        <p14:creationId xmlns:p14="http://schemas.microsoft.com/office/powerpoint/2010/main" val="1870705804"/>
       </p:ext>
     </p:extLst>
   </p:cSld>
@@ -5505,7 +5995,7 @@
 <file path=ppt/theme/theme1.xml><?xml version="1.0" encoding="utf-8"?>
 <a:theme xmlns:a="http://schemas.openxmlformats.org/drawingml/2006/main" name="Office Theme">
   <a:themeElements>
-    <a:clrScheme name="Office">
+    <a:clrScheme name="Grayscale">
       <a:dk1>
         <a:sysClr val="windowText" lastClr="000000"/>
       </a:dk1>
@@ -5513,37 +6003,37 @@
         <a:sysClr val="window" lastClr="FFFFFF"/>
       </a:lt1>
       <a:dk2>
-        <a:srgbClr val="0E2841"/>
+        <a:srgbClr val="000000"/>
       </a:dk2>
       <a:lt2>
-        <a:srgbClr val="E8E8E8"/>
+        <a:srgbClr val="F8F8F8"/>
       </a:lt2>
       <a:accent1>
-        <a:srgbClr val="156082"/>
+        <a:srgbClr val="DDDDDD"/>
       </a:accent1>
       <a:accent2>
-        <a:srgbClr val="E97132"/>
+        <a:srgbClr val="B2B2B2"/>
       </a:accent2>
       <a:accent3>
-        <a:srgbClr val="196B24"/>
+        <a:srgbClr val="969696"/>
       </a:accent3>
       <a:accent4>
-        <a:srgbClr val="0F9ED5"/>
+        <a:srgbClr val="808080"/>
       </a:accent4>
       <a:accent5>
-        <a:srgbClr val="A02B93"/>
+        <a:srgbClr val="5F5F5F"/>
       </a:accent5>
       <a:accent6>
-        <a:srgbClr val="4EA72E"/>
+        <a:srgbClr val="4D4D4D"/>
       </a:accent6>
       <a:hlink>
-        <a:srgbClr val="467886"/>
+        <a:srgbClr val="5F5F5F"/>
       </a:hlink>
       <a:folHlink>
-        <a:srgbClr val="96607D"/>
+        <a:srgbClr val="919191"/>
       </a:folHlink>
     </a:clrScheme>
-    <a:fontScheme name="Office">
+    <a:fontScheme name="Office Theme">
       <a:majorFont>
         <a:latin typeface="Aptos Display" panose="02110004020202020204"/>
         <a:ea typeface=""/>
@@ -5649,7 +6139,7 @@
         <a:font script="Tfng" typeface="Ebrima"/>
       </a:minorFont>
     </a:fontScheme>
-    <a:fmtScheme name="Office">
+    <a:fmtScheme name="Office Theme">
       <a:fillStyleLst>
         <a:solidFill>
           <a:schemeClr val="phClr"/>

</xml_diff>

<commit_message>
fix: started implementing prioritized_experience_replay
</commit_message>
<xml_diff>
--- a/Slides.pptx
+++ b/Slides.pptx
@@ -5,25 +5,19 @@
     <p:sldMasterId id="2147483720" r:id="rId1"/>
   </p:sldMasterIdLst>
   <p:notesMasterIdLst>
-    <p:notesMasterId r:id="rId18"/>
+    <p:notesMasterId r:id="rId12"/>
   </p:notesMasterIdLst>
   <p:sldIdLst>
     <p:sldId id="256" r:id="rId2"/>
     <p:sldId id="271" r:id="rId3"/>
-    <p:sldId id="270" r:id="rId4"/>
-    <p:sldId id="267" r:id="rId5"/>
-    <p:sldId id="257" r:id="rId6"/>
-    <p:sldId id="258" r:id="rId7"/>
-    <p:sldId id="268" r:id="rId8"/>
-    <p:sldId id="259" r:id="rId9"/>
-    <p:sldId id="269" r:id="rId10"/>
-    <p:sldId id="260" r:id="rId11"/>
-    <p:sldId id="261" r:id="rId12"/>
-    <p:sldId id="262" r:id="rId13"/>
-    <p:sldId id="263" r:id="rId14"/>
-    <p:sldId id="264" r:id="rId15"/>
-    <p:sldId id="265" r:id="rId16"/>
-    <p:sldId id="266" r:id="rId17"/>
+    <p:sldId id="276" r:id="rId4"/>
+    <p:sldId id="272" r:id="rId5"/>
+    <p:sldId id="274" r:id="rId6"/>
+    <p:sldId id="275" r:id="rId7"/>
+    <p:sldId id="277" r:id="rId8"/>
+    <p:sldId id="260" r:id="rId9"/>
+    <p:sldId id="261" r:id="rId10"/>
+    <p:sldId id="278" r:id="rId11"/>
   </p:sldIdLst>
   <p:sldSz cx="12192000" cy="6858000"/>
   <p:notesSz cx="6858000" cy="9144000"/>
@@ -175,7 +169,9 @@
           <a:bodyPr vert="horz" lIns="91440" tIns="45720" rIns="91440" bIns="45720" rtlCol="0"/>
           <a:lstStyle>
             <a:lvl1pPr algn="l">
-              <a:defRPr sz="1200"/>
+              <a:defRPr sz="1200" b="0" i="0">
+                <a:latin typeface="Calibri" panose="020F0502020204030204" pitchFamily="34" charset="0"/>
+              </a:defRPr>
             </a:lvl1pPr>
           </a:lstStyle>
           <a:p>
@@ -206,11 +202,15 @@
           <a:bodyPr vert="horz" lIns="91440" tIns="45720" rIns="91440" bIns="45720" rtlCol="0"/>
           <a:lstStyle>
             <a:lvl1pPr algn="r">
-              <a:defRPr sz="1200"/>
+              <a:defRPr sz="1200" b="0" i="0">
+                <a:latin typeface="Calibri" panose="020F0502020204030204" pitchFamily="34" charset="0"/>
+              </a:defRPr>
             </a:lvl1pPr>
           </a:lstStyle>
           <a:p>
             <a:fld id="{E211B9FA-8CB0-9347-9780-F0C7613563D5}" type="datetimeFigureOut">
+              <a:rPr lang="en-US"/>
+              <a:pPr/>
               <a:t>1/4/25</a:t>
             </a:fld>
             <a:endParaRPr lang="en-US"/>
@@ -332,7 +332,9 @@
           <a:bodyPr vert="horz" lIns="91440" tIns="45720" rIns="91440" bIns="45720" rtlCol="0" anchor="b"/>
           <a:lstStyle>
             <a:lvl1pPr algn="l">
-              <a:defRPr sz="1200"/>
+              <a:defRPr sz="1200" b="0" i="0">
+                <a:latin typeface="Calibri" panose="020F0502020204030204" pitchFamily="34" charset="0"/>
+              </a:defRPr>
             </a:lvl1pPr>
           </a:lstStyle>
           <a:p>
@@ -363,11 +365,15 @@
           <a:bodyPr vert="horz" lIns="91440" tIns="45720" rIns="91440" bIns="45720" rtlCol="0" anchor="b"/>
           <a:lstStyle>
             <a:lvl1pPr algn="r">
-              <a:defRPr sz="1200"/>
+              <a:defRPr sz="1200" b="0" i="0">
+                <a:latin typeface="Calibri" panose="020F0502020204030204" pitchFamily="34" charset="0"/>
+              </a:defRPr>
             </a:lvl1pPr>
           </a:lstStyle>
           <a:p>
             <a:fld id="{57FAE2F2-15A5-7946-8E81-C5B8DDF8F3A5}" type="slidenum">
+              <a:rPr lang="en-US"/>
+              <a:pPr/>
               <a:t>‹#›</a:t>
             </a:fld>
             <a:endParaRPr lang="en-US"/>
@@ -384,51 +390,51 @@
   <p:clrMap bg1="lt1" tx1="dk1" bg2="lt2" tx2="dk2" accent1="accent1" accent2="accent2" accent3="accent3" accent4="accent4" accent5="accent5" accent6="accent6" hlink="hlink" folHlink="folHlink"/>
   <p:notesStyle>
     <a:lvl1pPr marL="0" algn="l" defTabSz="914400" rtl="0" eaLnBrk="1" latinLnBrk="0" hangingPunct="1">
-      <a:defRPr sz="1200" kern="1200">
+      <a:defRPr sz="1200" b="0" i="0" kern="1200">
         <a:solidFill>
           <a:schemeClr val="tx1"/>
         </a:solidFill>
-        <a:latin typeface="+mn-lt"/>
+        <a:latin typeface="Calibri" panose="020F0502020204030204" pitchFamily="34" charset="0"/>
         <a:ea typeface="+mn-ea"/>
         <a:cs typeface="+mn-cs"/>
       </a:defRPr>
     </a:lvl1pPr>
     <a:lvl2pPr marL="457200" algn="l" defTabSz="914400" rtl="0" eaLnBrk="1" latinLnBrk="0" hangingPunct="1">
-      <a:defRPr sz="1200" kern="1200">
+      <a:defRPr sz="1200" b="0" i="0" kern="1200">
         <a:solidFill>
           <a:schemeClr val="tx1"/>
         </a:solidFill>
-        <a:latin typeface="+mn-lt"/>
+        <a:latin typeface="Calibri" panose="020F0502020204030204" pitchFamily="34" charset="0"/>
         <a:ea typeface="+mn-ea"/>
         <a:cs typeface="+mn-cs"/>
       </a:defRPr>
     </a:lvl2pPr>
     <a:lvl3pPr marL="914400" algn="l" defTabSz="914400" rtl="0" eaLnBrk="1" latinLnBrk="0" hangingPunct="1">
-      <a:defRPr sz="1200" kern="1200">
+      <a:defRPr sz="1200" b="0" i="0" kern="1200">
         <a:solidFill>
           <a:schemeClr val="tx1"/>
         </a:solidFill>
-        <a:latin typeface="+mn-lt"/>
+        <a:latin typeface="Calibri" panose="020F0502020204030204" pitchFamily="34" charset="0"/>
         <a:ea typeface="+mn-ea"/>
         <a:cs typeface="+mn-cs"/>
       </a:defRPr>
     </a:lvl3pPr>
     <a:lvl4pPr marL="1371600" algn="l" defTabSz="914400" rtl="0" eaLnBrk="1" latinLnBrk="0" hangingPunct="1">
-      <a:defRPr sz="1200" kern="1200">
+      <a:defRPr sz="1200" b="0" i="0" kern="1200">
         <a:solidFill>
           <a:schemeClr val="tx1"/>
         </a:solidFill>
-        <a:latin typeface="+mn-lt"/>
+        <a:latin typeface="Calibri" panose="020F0502020204030204" pitchFamily="34" charset="0"/>
         <a:ea typeface="+mn-ea"/>
         <a:cs typeface="+mn-cs"/>
       </a:defRPr>
     </a:lvl4pPr>
     <a:lvl5pPr marL="1828800" algn="l" defTabSz="914400" rtl="0" eaLnBrk="1" latinLnBrk="0" hangingPunct="1">
-      <a:defRPr sz="1200" kern="1200">
+      <a:defRPr sz="1200" b="0" i="0" kern="1200">
         <a:solidFill>
           <a:schemeClr val="tx1"/>
         </a:solidFill>
-        <a:latin typeface="+mn-lt"/>
+        <a:latin typeface="Calibri" panose="020F0502020204030204" pitchFamily="34" charset="0"/>
         <a:ea typeface="+mn-ea"/>
         <a:cs typeface="+mn-cs"/>
       </a:defRPr>
@@ -563,338 +569,6 @@
 </p:notes>
 </file>
 
-<file path=ppt/notesSlides/notesSlide10.xml><?xml version="1.0" encoding="utf-8"?>
-<p:notes xmlns:a="http://schemas.openxmlformats.org/drawingml/2006/main" xmlns:r="http://schemas.openxmlformats.org/officeDocument/2006/relationships" xmlns:p="http://schemas.openxmlformats.org/presentationml/2006/main">
-  <p:cSld>
-    <p:spTree>
-      <p:nvGrpSpPr>
-        <p:cNvPr id="1" name=""/>
-        <p:cNvGrpSpPr/>
-        <p:nvPr/>
-      </p:nvGrpSpPr>
-      <p:grpSpPr>
-        <a:xfrm>
-          <a:off x="0" y="0"/>
-          <a:ext cx="0" cy="0"/>
-          <a:chOff x="0" y="0"/>
-          <a:chExt cx="0" cy="0"/>
-        </a:xfrm>
-      </p:grpSpPr>
-      <p:sp>
-        <p:nvSpPr>
-          <p:cNvPr id="2" name="Slide Image Placeholder 1"/>
-          <p:cNvSpPr>
-            <a:spLocks noGrp="1" noRot="1" noChangeAspect="1"/>
-          </p:cNvSpPr>
-          <p:nvPr>
-            <p:ph type="sldImg"/>
-          </p:nvPr>
-        </p:nvSpPr>
-        <p:spPr/>
-      </p:sp>
-      <p:sp>
-        <p:nvSpPr>
-          <p:cNvPr id="3" name="Notes Placeholder 2"/>
-          <p:cNvSpPr>
-            <a:spLocks noGrp="1"/>
-          </p:cNvSpPr>
-          <p:nvPr>
-            <p:ph type="body" idx="1"/>
-          </p:nvPr>
-        </p:nvSpPr>
-        <p:spPr/>
-        <p:txBody>
-          <a:bodyPr/>
-          <a:lstStyle/>
-          <a:p>
-            <a:endParaRPr lang="en-US"/>
-          </a:p>
-        </p:txBody>
-      </p:sp>
-      <p:sp>
-        <p:nvSpPr>
-          <p:cNvPr id="4" name="Slide Number Placeholder 3"/>
-          <p:cNvSpPr>
-            <a:spLocks noGrp="1"/>
-          </p:cNvSpPr>
-          <p:nvPr>
-            <p:ph type="sldNum" sz="quarter" idx="5"/>
-          </p:nvPr>
-        </p:nvSpPr>
-        <p:spPr/>
-        <p:txBody>
-          <a:bodyPr/>
-          <a:lstStyle/>
-          <a:p>
-            <a:fld id="{57FAE2F2-15A5-7946-8E81-C5B8DDF8F3A5}" type="slidenum">
-              <a:t>13</a:t>
-            </a:fld>
-            <a:endParaRPr lang="en-US"/>
-          </a:p>
-        </p:txBody>
-      </p:sp>
-    </p:spTree>
-    <p:extLst>
-      <p:ext uri="{BB962C8B-B14F-4D97-AF65-F5344CB8AC3E}">
-        <p14:creationId xmlns:p14="http://schemas.microsoft.com/office/powerpoint/2010/main" val="2634273261"/>
-      </p:ext>
-    </p:extLst>
-  </p:cSld>
-  <p:clrMapOvr>
-    <a:masterClrMapping/>
-  </p:clrMapOvr>
-</p:notes>
-</file>
-
-<file path=ppt/notesSlides/notesSlide11.xml><?xml version="1.0" encoding="utf-8"?>
-<p:notes xmlns:a="http://schemas.openxmlformats.org/drawingml/2006/main" xmlns:r="http://schemas.openxmlformats.org/officeDocument/2006/relationships" xmlns:p="http://schemas.openxmlformats.org/presentationml/2006/main">
-  <p:cSld>
-    <p:spTree>
-      <p:nvGrpSpPr>
-        <p:cNvPr id="1" name=""/>
-        <p:cNvGrpSpPr/>
-        <p:nvPr/>
-      </p:nvGrpSpPr>
-      <p:grpSpPr>
-        <a:xfrm>
-          <a:off x="0" y="0"/>
-          <a:ext cx="0" cy="0"/>
-          <a:chOff x="0" y="0"/>
-          <a:chExt cx="0" cy="0"/>
-        </a:xfrm>
-      </p:grpSpPr>
-      <p:sp>
-        <p:nvSpPr>
-          <p:cNvPr id="2" name="Slide Image Placeholder 1"/>
-          <p:cNvSpPr>
-            <a:spLocks noGrp="1" noRot="1" noChangeAspect="1"/>
-          </p:cNvSpPr>
-          <p:nvPr>
-            <p:ph type="sldImg"/>
-          </p:nvPr>
-        </p:nvSpPr>
-        <p:spPr/>
-      </p:sp>
-      <p:sp>
-        <p:nvSpPr>
-          <p:cNvPr id="3" name="Notes Placeholder 2"/>
-          <p:cNvSpPr>
-            <a:spLocks noGrp="1"/>
-          </p:cNvSpPr>
-          <p:nvPr>
-            <p:ph type="body" idx="1"/>
-          </p:nvPr>
-        </p:nvSpPr>
-        <p:spPr/>
-        <p:txBody>
-          <a:bodyPr/>
-          <a:lstStyle/>
-          <a:p>
-            <a:endParaRPr lang="en-US"/>
-          </a:p>
-        </p:txBody>
-      </p:sp>
-      <p:sp>
-        <p:nvSpPr>
-          <p:cNvPr id="4" name="Slide Number Placeholder 3"/>
-          <p:cNvSpPr>
-            <a:spLocks noGrp="1"/>
-          </p:cNvSpPr>
-          <p:nvPr>
-            <p:ph type="sldNum" sz="quarter" idx="5"/>
-          </p:nvPr>
-        </p:nvSpPr>
-        <p:spPr/>
-        <p:txBody>
-          <a:bodyPr/>
-          <a:lstStyle/>
-          <a:p>
-            <a:fld id="{57FAE2F2-15A5-7946-8E81-C5B8DDF8F3A5}" type="slidenum">
-              <a:t>14</a:t>
-            </a:fld>
-            <a:endParaRPr lang="en-US"/>
-          </a:p>
-        </p:txBody>
-      </p:sp>
-    </p:spTree>
-    <p:extLst>
-      <p:ext uri="{BB962C8B-B14F-4D97-AF65-F5344CB8AC3E}">
-        <p14:creationId xmlns:p14="http://schemas.microsoft.com/office/powerpoint/2010/main" val="1433416517"/>
-      </p:ext>
-    </p:extLst>
-  </p:cSld>
-  <p:clrMapOvr>
-    <a:masterClrMapping/>
-  </p:clrMapOvr>
-</p:notes>
-</file>
-
-<file path=ppt/notesSlides/notesSlide12.xml><?xml version="1.0" encoding="utf-8"?>
-<p:notes xmlns:a="http://schemas.openxmlformats.org/drawingml/2006/main" xmlns:r="http://schemas.openxmlformats.org/officeDocument/2006/relationships" xmlns:p="http://schemas.openxmlformats.org/presentationml/2006/main">
-  <p:cSld>
-    <p:spTree>
-      <p:nvGrpSpPr>
-        <p:cNvPr id="1" name=""/>
-        <p:cNvGrpSpPr/>
-        <p:nvPr/>
-      </p:nvGrpSpPr>
-      <p:grpSpPr>
-        <a:xfrm>
-          <a:off x="0" y="0"/>
-          <a:ext cx="0" cy="0"/>
-          <a:chOff x="0" y="0"/>
-          <a:chExt cx="0" cy="0"/>
-        </a:xfrm>
-      </p:grpSpPr>
-      <p:sp>
-        <p:nvSpPr>
-          <p:cNvPr id="2" name="Slide Image Placeholder 1"/>
-          <p:cNvSpPr>
-            <a:spLocks noGrp="1" noRot="1" noChangeAspect="1"/>
-          </p:cNvSpPr>
-          <p:nvPr>
-            <p:ph type="sldImg"/>
-          </p:nvPr>
-        </p:nvSpPr>
-        <p:spPr/>
-      </p:sp>
-      <p:sp>
-        <p:nvSpPr>
-          <p:cNvPr id="3" name="Notes Placeholder 2"/>
-          <p:cNvSpPr>
-            <a:spLocks noGrp="1"/>
-          </p:cNvSpPr>
-          <p:nvPr>
-            <p:ph type="body" idx="1"/>
-          </p:nvPr>
-        </p:nvSpPr>
-        <p:spPr/>
-        <p:txBody>
-          <a:bodyPr/>
-          <a:lstStyle/>
-          <a:p>
-            <a:endParaRPr lang="en-US"/>
-          </a:p>
-        </p:txBody>
-      </p:sp>
-      <p:sp>
-        <p:nvSpPr>
-          <p:cNvPr id="4" name="Slide Number Placeholder 3"/>
-          <p:cNvSpPr>
-            <a:spLocks noGrp="1"/>
-          </p:cNvSpPr>
-          <p:nvPr>
-            <p:ph type="sldNum" sz="quarter" idx="5"/>
-          </p:nvPr>
-        </p:nvSpPr>
-        <p:spPr/>
-        <p:txBody>
-          <a:bodyPr/>
-          <a:lstStyle/>
-          <a:p>
-            <a:fld id="{57FAE2F2-15A5-7946-8E81-C5B8DDF8F3A5}" type="slidenum">
-              <a:t>15</a:t>
-            </a:fld>
-            <a:endParaRPr lang="en-US"/>
-          </a:p>
-        </p:txBody>
-      </p:sp>
-    </p:spTree>
-    <p:extLst>
-      <p:ext uri="{BB962C8B-B14F-4D97-AF65-F5344CB8AC3E}">
-        <p14:creationId xmlns:p14="http://schemas.microsoft.com/office/powerpoint/2010/main" val="3201831742"/>
-      </p:ext>
-    </p:extLst>
-  </p:cSld>
-  <p:clrMapOvr>
-    <a:masterClrMapping/>
-  </p:clrMapOvr>
-</p:notes>
-</file>
-
-<file path=ppt/notesSlides/notesSlide13.xml><?xml version="1.0" encoding="utf-8"?>
-<p:notes xmlns:a="http://schemas.openxmlformats.org/drawingml/2006/main" xmlns:r="http://schemas.openxmlformats.org/officeDocument/2006/relationships" xmlns:p="http://schemas.openxmlformats.org/presentationml/2006/main">
-  <p:cSld>
-    <p:spTree>
-      <p:nvGrpSpPr>
-        <p:cNvPr id="1" name=""/>
-        <p:cNvGrpSpPr/>
-        <p:nvPr/>
-      </p:nvGrpSpPr>
-      <p:grpSpPr>
-        <a:xfrm>
-          <a:off x="0" y="0"/>
-          <a:ext cx="0" cy="0"/>
-          <a:chOff x="0" y="0"/>
-          <a:chExt cx="0" cy="0"/>
-        </a:xfrm>
-      </p:grpSpPr>
-      <p:sp>
-        <p:nvSpPr>
-          <p:cNvPr id="2" name="Slide Image Placeholder 1"/>
-          <p:cNvSpPr>
-            <a:spLocks noGrp="1" noRot="1" noChangeAspect="1"/>
-          </p:cNvSpPr>
-          <p:nvPr>
-            <p:ph type="sldImg"/>
-          </p:nvPr>
-        </p:nvSpPr>
-        <p:spPr/>
-      </p:sp>
-      <p:sp>
-        <p:nvSpPr>
-          <p:cNvPr id="3" name="Notes Placeholder 2"/>
-          <p:cNvSpPr>
-            <a:spLocks noGrp="1"/>
-          </p:cNvSpPr>
-          <p:nvPr>
-            <p:ph type="body" idx="1"/>
-          </p:nvPr>
-        </p:nvSpPr>
-        <p:spPr/>
-        <p:txBody>
-          <a:bodyPr/>
-          <a:lstStyle/>
-          <a:p>
-            <a:endParaRPr lang="en-US"/>
-          </a:p>
-        </p:txBody>
-      </p:sp>
-      <p:sp>
-        <p:nvSpPr>
-          <p:cNvPr id="4" name="Slide Number Placeholder 3"/>
-          <p:cNvSpPr>
-            <a:spLocks noGrp="1"/>
-          </p:cNvSpPr>
-          <p:nvPr>
-            <p:ph type="sldNum" sz="quarter" idx="5"/>
-          </p:nvPr>
-        </p:nvSpPr>
-        <p:spPr/>
-        <p:txBody>
-          <a:bodyPr/>
-          <a:lstStyle/>
-          <a:p>
-            <a:fld id="{57FAE2F2-15A5-7946-8E81-C5B8DDF8F3A5}" type="slidenum">
-              <a:t>16</a:t>
-            </a:fld>
-            <a:endParaRPr lang="en-US"/>
-          </a:p>
-        </p:txBody>
-      </p:sp>
-    </p:spTree>
-    <p:extLst>
-      <p:ext uri="{BB962C8B-B14F-4D97-AF65-F5344CB8AC3E}">
-        <p14:creationId xmlns:p14="http://schemas.microsoft.com/office/powerpoint/2010/main" val="2907721001"/>
-      </p:ext>
-    </p:extLst>
-  </p:cSld>
-  <p:clrMapOvr>
-    <a:masterClrMapping/>
-  </p:clrMapOvr>
-</p:notes>
-</file>
-
 <file path=ppt/notesSlides/notesSlide2.xml><?xml version="1.0" encoding="utf-8"?>
 <p:notes xmlns:a="http://schemas.openxmlformats.org/drawingml/2006/main" xmlns:r="http://schemas.openxmlformats.org/officeDocument/2006/relationships" xmlns:p="http://schemas.openxmlformats.org/presentationml/2006/main">
   <p:cSld>
@@ -1046,8 +720,7 @@
           <a:lstStyle/>
           <a:p>
             <a:fld id="{57FAE2F2-15A5-7946-8E81-C5B8DDF8F3A5}" type="slidenum">
-              <a:rPr lang="en-US"/>
-              <a:t>3</a:t>
+              <a:t>8</a:t>
             </a:fld>
             <a:endParaRPr lang="en-US"/>
           </a:p>
@@ -1056,7 +729,7 @@
     </p:spTree>
     <p:extLst>
       <p:ext uri="{BB962C8B-B14F-4D97-AF65-F5344CB8AC3E}">
-        <p14:creationId xmlns:p14="http://schemas.microsoft.com/office/powerpoint/2010/main" val="1513555924"/>
+        <p14:creationId xmlns:p14="http://schemas.microsoft.com/office/powerpoint/2010/main" val="1276190430"/>
       </p:ext>
     </p:extLst>
   </p:cSld>
@@ -1130,339 +803,7 @@
           <a:lstStyle/>
           <a:p>
             <a:fld id="{57FAE2F2-15A5-7946-8E81-C5B8DDF8F3A5}" type="slidenum">
-              <a:t>5</a:t>
-            </a:fld>
-            <a:endParaRPr lang="en-US"/>
-          </a:p>
-        </p:txBody>
-      </p:sp>
-    </p:spTree>
-    <p:extLst>
-      <p:ext uri="{BB962C8B-B14F-4D97-AF65-F5344CB8AC3E}">
-        <p14:creationId xmlns:p14="http://schemas.microsoft.com/office/powerpoint/2010/main" val="2076568155"/>
-      </p:ext>
-    </p:extLst>
-  </p:cSld>
-  <p:clrMapOvr>
-    <a:masterClrMapping/>
-  </p:clrMapOvr>
-</p:notes>
-</file>
-
-<file path=ppt/notesSlides/notesSlide5.xml><?xml version="1.0" encoding="utf-8"?>
-<p:notes xmlns:a="http://schemas.openxmlformats.org/drawingml/2006/main" xmlns:r="http://schemas.openxmlformats.org/officeDocument/2006/relationships" xmlns:p="http://schemas.openxmlformats.org/presentationml/2006/main">
-  <p:cSld>
-    <p:spTree>
-      <p:nvGrpSpPr>
-        <p:cNvPr id="1" name=""/>
-        <p:cNvGrpSpPr/>
-        <p:nvPr/>
-      </p:nvGrpSpPr>
-      <p:grpSpPr>
-        <a:xfrm>
-          <a:off x="0" y="0"/>
-          <a:ext cx="0" cy="0"/>
-          <a:chOff x="0" y="0"/>
-          <a:chExt cx="0" cy="0"/>
-        </a:xfrm>
-      </p:grpSpPr>
-      <p:sp>
-        <p:nvSpPr>
-          <p:cNvPr id="2" name="Slide Image Placeholder 1"/>
-          <p:cNvSpPr>
-            <a:spLocks noGrp="1" noRot="1" noChangeAspect="1"/>
-          </p:cNvSpPr>
-          <p:nvPr>
-            <p:ph type="sldImg"/>
-          </p:nvPr>
-        </p:nvSpPr>
-        <p:spPr/>
-      </p:sp>
-      <p:sp>
-        <p:nvSpPr>
-          <p:cNvPr id="3" name="Notes Placeholder 2"/>
-          <p:cNvSpPr>
-            <a:spLocks noGrp="1"/>
-          </p:cNvSpPr>
-          <p:nvPr>
-            <p:ph type="body" idx="1"/>
-          </p:nvPr>
-        </p:nvSpPr>
-        <p:spPr/>
-        <p:txBody>
-          <a:bodyPr/>
-          <a:lstStyle/>
-          <a:p>
-            <a:endParaRPr lang="en-US"/>
-          </a:p>
-        </p:txBody>
-      </p:sp>
-      <p:sp>
-        <p:nvSpPr>
-          <p:cNvPr id="4" name="Slide Number Placeholder 3"/>
-          <p:cNvSpPr>
-            <a:spLocks noGrp="1"/>
-          </p:cNvSpPr>
-          <p:nvPr>
-            <p:ph type="sldNum" sz="quarter" idx="5"/>
-          </p:nvPr>
-        </p:nvSpPr>
-        <p:spPr/>
-        <p:txBody>
-          <a:bodyPr/>
-          <a:lstStyle/>
-          <a:p>
-            <a:fld id="{57FAE2F2-15A5-7946-8E81-C5B8DDF8F3A5}" type="slidenum">
-              <a:t>6</a:t>
-            </a:fld>
-            <a:endParaRPr lang="en-US"/>
-          </a:p>
-        </p:txBody>
-      </p:sp>
-    </p:spTree>
-    <p:extLst>
-      <p:ext uri="{BB962C8B-B14F-4D97-AF65-F5344CB8AC3E}">
-        <p14:creationId xmlns:p14="http://schemas.microsoft.com/office/powerpoint/2010/main" val="3870637215"/>
-      </p:ext>
-    </p:extLst>
-  </p:cSld>
-  <p:clrMapOvr>
-    <a:masterClrMapping/>
-  </p:clrMapOvr>
-</p:notes>
-</file>
-
-<file path=ppt/notesSlides/notesSlide6.xml><?xml version="1.0" encoding="utf-8"?>
-<p:notes xmlns:a="http://schemas.openxmlformats.org/drawingml/2006/main" xmlns:r="http://schemas.openxmlformats.org/officeDocument/2006/relationships" xmlns:p="http://schemas.openxmlformats.org/presentationml/2006/main">
-  <p:cSld>
-    <p:spTree>
-      <p:nvGrpSpPr>
-        <p:cNvPr id="1" name=""/>
-        <p:cNvGrpSpPr/>
-        <p:nvPr/>
-      </p:nvGrpSpPr>
-      <p:grpSpPr>
-        <a:xfrm>
-          <a:off x="0" y="0"/>
-          <a:ext cx="0" cy="0"/>
-          <a:chOff x="0" y="0"/>
-          <a:chExt cx="0" cy="0"/>
-        </a:xfrm>
-      </p:grpSpPr>
-      <p:sp>
-        <p:nvSpPr>
-          <p:cNvPr id="2" name="Slide Image Placeholder 1"/>
-          <p:cNvSpPr>
-            <a:spLocks noGrp="1" noRot="1" noChangeAspect="1"/>
-          </p:cNvSpPr>
-          <p:nvPr>
-            <p:ph type="sldImg"/>
-          </p:nvPr>
-        </p:nvSpPr>
-        <p:spPr/>
-      </p:sp>
-      <p:sp>
-        <p:nvSpPr>
-          <p:cNvPr id="3" name="Notes Placeholder 2"/>
-          <p:cNvSpPr>
-            <a:spLocks noGrp="1"/>
-          </p:cNvSpPr>
-          <p:nvPr>
-            <p:ph type="body" idx="1"/>
-          </p:nvPr>
-        </p:nvSpPr>
-        <p:spPr/>
-        <p:txBody>
-          <a:bodyPr/>
-          <a:lstStyle/>
-          <a:p>
-            <a:endParaRPr lang="en-US"/>
-          </a:p>
-        </p:txBody>
-      </p:sp>
-      <p:sp>
-        <p:nvSpPr>
-          <p:cNvPr id="4" name="Slide Number Placeholder 3"/>
-          <p:cNvSpPr>
-            <a:spLocks noGrp="1"/>
-          </p:cNvSpPr>
-          <p:nvPr>
-            <p:ph type="sldNum" sz="quarter" idx="5"/>
-          </p:nvPr>
-        </p:nvSpPr>
-        <p:spPr/>
-        <p:txBody>
-          <a:bodyPr/>
-          <a:lstStyle/>
-          <a:p>
-            <a:fld id="{57FAE2F2-15A5-7946-8E81-C5B8DDF8F3A5}" type="slidenum">
-              <a:t>8</a:t>
-            </a:fld>
-            <a:endParaRPr lang="en-US"/>
-          </a:p>
-        </p:txBody>
-      </p:sp>
-    </p:spTree>
-    <p:extLst>
-      <p:ext uri="{BB962C8B-B14F-4D97-AF65-F5344CB8AC3E}">
-        <p14:creationId xmlns:p14="http://schemas.microsoft.com/office/powerpoint/2010/main" val="4040090847"/>
-      </p:ext>
-    </p:extLst>
-  </p:cSld>
-  <p:clrMapOvr>
-    <a:masterClrMapping/>
-  </p:clrMapOvr>
-</p:notes>
-</file>
-
-<file path=ppt/notesSlides/notesSlide7.xml><?xml version="1.0" encoding="utf-8"?>
-<p:notes xmlns:a="http://schemas.openxmlformats.org/drawingml/2006/main" xmlns:r="http://schemas.openxmlformats.org/officeDocument/2006/relationships" xmlns:p="http://schemas.openxmlformats.org/presentationml/2006/main">
-  <p:cSld>
-    <p:spTree>
-      <p:nvGrpSpPr>
-        <p:cNvPr id="1" name=""/>
-        <p:cNvGrpSpPr/>
-        <p:nvPr/>
-      </p:nvGrpSpPr>
-      <p:grpSpPr>
-        <a:xfrm>
-          <a:off x="0" y="0"/>
-          <a:ext cx="0" cy="0"/>
-          <a:chOff x="0" y="0"/>
-          <a:chExt cx="0" cy="0"/>
-        </a:xfrm>
-      </p:grpSpPr>
-      <p:sp>
-        <p:nvSpPr>
-          <p:cNvPr id="2" name="Slide Image Placeholder 1"/>
-          <p:cNvSpPr>
-            <a:spLocks noGrp="1" noRot="1" noChangeAspect="1"/>
-          </p:cNvSpPr>
-          <p:nvPr>
-            <p:ph type="sldImg"/>
-          </p:nvPr>
-        </p:nvSpPr>
-        <p:spPr/>
-      </p:sp>
-      <p:sp>
-        <p:nvSpPr>
-          <p:cNvPr id="3" name="Notes Placeholder 2"/>
-          <p:cNvSpPr>
-            <a:spLocks noGrp="1"/>
-          </p:cNvSpPr>
-          <p:nvPr>
-            <p:ph type="body" idx="1"/>
-          </p:nvPr>
-        </p:nvSpPr>
-        <p:spPr/>
-        <p:txBody>
-          <a:bodyPr/>
-          <a:lstStyle/>
-          <a:p>
-            <a:endParaRPr lang="en-US"/>
-          </a:p>
-        </p:txBody>
-      </p:sp>
-      <p:sp>
-        <p:nvSpPr>
-          <p:cNvPr id="4" name="Slide Number Placeholder 3"/>
-          <p:cNvSpPr>
-            <a:spLocks noGrp="1"/>
-          </p:cNvSpPr>
-          <p:nvPr>
-            <p:ph type="sldNum" sz="quarter" idx="5"/>
-          </p:nvPr>
-        </p:nvSpPr>
-        <p:spPr/>
-        <p:txBody>
-          <a:bodyPr/>
-          <a:lstStyle/>
-          <a:p>
-            <a:fld id="{57FAE2F2-15A5-7946-8E81-C5B8DDF8F3A5}" type="slidenum">
-              <a:t>10</a:t>
-            </a:fld>
-            <a:endParaRPr lang="en-US"/>
-          </a:p>
-        </p:txBody>
-      </p:sp>
-    </p:spTree>
-    <p:extLst>
-      <p:ext uri="{BB962C8B-B14F-4D97-AF65-F5344CB8AC3E}">
-        <p14:creationId xmlns:p14="http://schemas.microsoft.com/office/powerpoint/2010/main" val="1276190430"/>
-      </p:ext>
-    </p:extLst>
-  </p:cSld>
-  <p:clrMapOvr>
-    <a:masterClrMapping/>
-  </p:clrMapOvr>
-</p:notes>
-</file>
-
-<file path=ppt/notesSlides/notesSlide8.xml><?xml version="1.0" encoding="utf-8"?>
-<p:notes xmlns:a="http://schemas.openxmlformats.org/drawingml/2006/main" xmlns:r="http://schemas.openxmlformats.org/officeDocument/2006/relationships" xmlns:p="http://schemas.openxmlformats.org/presentationml/2006/main">
-  <p:cSld>
-    <p:spTree>
-      <p:nvGrpSpPr>
-        <p:cNvPr id="1" name=""/>
-        <p:cNvGrpSpPr/>
-        <p:nvPr/>
-      </p:nvGrpSpPr>
-      <p:grpSpPr>
-        <a:xfrm>
-          <a:off x="0" y="0"/>
-          <a:ext cx="0" cy="0"/>
-          <a:chOff x="0" y="0"/>
-          <a:chExt cx="0" cy="0"/>
-        </a:xfrm>
-      </p:grpSpPr>
-      <p:sp>
-        <p:nvSpPr>
-          <p:cNvPr id="2" name="Slide Image Placeholder 1"/>
-          <p:cNvSpPr>
-            <a:spLocks noGrp="1" noRot="1" noChangeAspect="1"/>
-          </p:cNvSpPr>
-          <p:nvPr>
-            <p:ph type="sldImg"/>
-          </p:nvPr>
-        </p:nvSpPr>
-        <p:spPr/>
-      </p:sp>
-      <p:sp>
-        <p:nvSpPr>
-          <p:cNvPr id="3" name="Notes Placeholder 2"/>
-          <p:cNvSpPr>
-            <a:spLocks noGrp="1"/>
-          </p:cNvSpPr>
-          <p:nvPr>
-            <p:ph type="body" idx="1"/>
-          </p:nvPr>
-        </p:nvSpPr>
-        <p:spPr/>
-        <p:txBody>
-          <a:bodyPr/>
-          <a:lstStyle/>
-          <a:p>
-            <a:endParaRPr lang="en-US"/>
-          </a:p>
-        </p:txBody>
-      </p:sp>
-      <p:sp>
-        <p:nvSpPr>
-          <p:cNvPr id="4" name="Slide Number Placeholder 3"/>
-          <p:cNvSpPr>
-            <a:spLocks noGrp="1"/>
-          </p:cNvSpPr>
-          <p:nvPr>
-            <p:ph type="sldNum" sz="quarter" idx="5"/>
-          </p:nvPr>
-        </p:nvSpPr>
-        <p:spPr/>
-        <p:txBody>
-          <a:bodyPr/>
-          <a:lstStyle/>
-          <a:p>
-            <a:fld id="{57FAE2F2-15A5-7946-8E81-C5B8DDF8F3A5}" type="slidenum">
-              <a:t>11</a:t>
+              <a:t>9</a:t>
             </a:fld>
             <a:endParaRPr lang="en-US"/>
           </a:p>
@@ -1472,89 +813,6 @@
     <p:extLst>
       <p:ext uri="{BB962C8B-B14F-4D97-AF65-F5344CB8AC3E}">
         <p14:creationId xmlns:p14="http://schemas.microsoft.com/office/powerpoint/2010/main" val="1265794021"/>
-      </p:ext>
-    </p:extLst>
-  </p:cSld>
-  <p:clrMapOvr>
-    <a:masterClrMapping/>
-  </p:clrMapOvr>
-</p:notes>
-</file>
-
-<file path=ppt/notesSlides/notesSlide9.xml><?xml version="1.0" encoding="utf-8"?>
-<p:notes xmlns:a="http://schemas.openxmlformats.org/drawingml/2006/main" xmlns:r="http://schemas.openxmlformats.org/officeDocument/2006/relationships" xmlns:p="http://schemas.openxmlformats.org/presentationml/2006/main">
-  <p:cSld>
-    <p:spTree>
-      <p:nvGrpSpPr>
-        <p:cNvPr id="1" name=""/>
-        <p:cNvGrpSpPr/>
-        <p:nvPr/>
-      </p:nvGrpSpPr>
-      <p:grpSpPr>
-        <a:xfrm>
-          <a:off x="0" y="0"/>
-          <a:ext cx="0" cy="0"/>
-          <a:chOff x="0" y="0"/>
-          <a:chExt cx="0" cy="0"/>
-        </a:xfrm>
-      </p:grpSpPr>
-      <p:sp>
-        <p:nvSpPr>
-          <p:cNvPr id="2" name="Slide Image Placeholder 1"/>
-          <p:cNvSpPr>
-            <a:spLocks noGrp="1" noRot="1" noChangeAspect="1"/>
-          </p:cNvSpPr>
-          <p:nvPr>
-            <p:ph type="sldImg"/>
-          </p:nvPr>
-        </p:nvSpPr>
-        <p:spPr/>
-      </p:sp>
-      <p:sp>
-        <p:nvSpPr>
-          <p:cNvPr id="3" name="Notes Placeholder 2"/>
-          <p:cNvSpPr>
-            <a:spLocks noGrp="1"/>
-          </p:cNvSpPr>
-          <p:nvPr>
-            <p:ph type="body" idx="1"/>
-          </p:nvPr>
-        </p:nvSpPr>
-        <p:spPr/>
-        <p:txBody>
-          <a:bodyPr/>
-          <a:lstStyle/>
-          <a:p>
-            <a:endParaRPr lang="en-US"/>
-          </a:p>
-        </p:txBody>
-      </p:sp>
-      <p:sp>
-        <p:nvSpPr>
-          <p:cNvPr id="4" name="Slide Number Placeholder 3"/>
-          <p:cNvSpPr>
-            <a:spLocks noGrp="1"/>
-          </p:cNvSpPr>
-          <p:nvPr>
-            <p:ph type="sldNum" sz="quarter" idx="5"/>
-          </p:nvPr>
-        </p:nvSpPr>
-        <p:spPr/>
-        <p:txBody>
-          <a:bodyPr/>
-          <a:lstStyle/>
-          <a:p>
-            <a:fld id="{57FAE2F2-15A5-7946-8E81-C5B8DDF8F3A5}" type="slidenum">
-              <a:t>12</a:t>
-            </a:fld>
-            <a:endParaRPr lang="en-US"/>
-          </a:p>
-        </p:txBody>
-      </p:sp>
-    </p:spTree>
-    <p:extLst>
-      <p:ext uri="{BB962C8B-B14F-4D97-AF65-F5344CB8AC3E}">
-        <p14:creationId xmlns:p14="http://schemas.microsoft.com/office/powerpoint/2010/main" val="3183568284"/>
       </p:ext>
     </p:extLst>
   </p:cSld>
@@ -3986,18 +3244,20 @@
           <a:bodyPr vert="horz" lIns="91440" tIns="45720" rIns="91440" bIns="45720" rtlCol="0" anchor="ctr"/>
           <a:lstStyle>
             <a:lvl1pPr algn="l">
-              <a:defRPr sz="1200">
+              <a:defRPr sz="1200" b="0" i="0">
                 <a:solidFill>
                   <a:schemeClr val="tx1">
                     <a:tint val="82000"/>
                   </a:schemeClr>
                 </a:solidFill>
+                <a:latin typeface="Calibri" panose="020F0502020204030204" pitchFamily="34" charset="0"/>
               </a:defRPr>
             </a:lvl1pPr>
           </a:lstStyle>
           <a:p>
             <a:fld id="{0CE49D37-DE82-A944-A799-DA76EC8094F2}" type="datetimeFigureOut">
               <a:rPr lang="en-US"/>
+              <a:pPr/>
               <a:t>1/4/25</a:t>
             </a:fld>
             <a:endParaRPr lang="en-US"/>
@@ -4027,12 +3287,13 @@
           <a:bodyPr vert="horz" lIns="91440" tIns="45720" rIns="91440" bIns="45720" rtlCol="0" anchor="ctr"/>
           <a:lstStyle>
             <a:lvl1pPr algn="ctr">
-              <a:defRPr sz="1200">
+              <a:defRPr sz="1200" b="0" i="0">
                 <a:solidFill>
                   <a:schemeClr val="tx1">
                     <a:tint val="82000"/>
                   </a:schemeClr>
                 </a:solidFill>
+                <a:latin typeface="Calibri" panose="020F0502020204030204" pitchFamily="34" charset="0"/>
               </a:defRPr>
             </a:lvl1pPr>
           </a:lstStyle>
@@ -4064,18 +3325,20 @@
           <a:bodyPr vert="horz" lIns="91440" tIns="45720" rIns="91440" bIns="45720" rtlCol="0" anchor="ctr"/>
           <a:lstStyle>
             <a:lvl1pPr algn="r">
-              <a:defRPr sz="1200">
+              <a:defRPr sz="1200" b="0" i="0">
                 <a:solidFill>
                   <a:schemeClr val="tx1">
                     <a:tint val="82000"/>
                   </a:schemeClr>
                 </a:solidFill>
+                <a:latin typeface="Calibri" panose="020F0502020204030204" pitchFamily="34" charset="0"/>
               </a:defRPr>
             </a:lvl1pPr>
           </a:lstStyle>
           <a:p>
             <a:fld id="{B9E7304B-7719-154A-8737-3D00501421C3}" type="slidenum">
               <a:rPr lang="en-US"/>
+              <a:pPr/>
               <a:t>‹#›</a:t>
             </a:fld>
             <a:endParaRPr lang="en-US"/>
@@ -4113,11 +3376,11 @@
           <a:spcPct val="0"/>
         </a:spcBef>
         <a:buNone/>
-        <a:defRPr sz="4400" kern="1200">
+        <a:defRPr sz="4400" b="0" i="0" kern="1200">
           <a:solidFill>
             <a:schemeClr val="tx1"/>
           </a:solidFill>
-          <a:latin typeface="+mj-lt"/>
+          <a:latin typeface="Calibri" panose="020F0502020204030204" pitchFamily="34" charset="0"/>
           <a:ea typeface="+mj-ea"/>
           <a:cs typeface="+mj-cs"/>
         </a:defRPr>
@@ -4133,11 +3396,11 @@
         </a:spcBef>
         <a:buFont typeface="Arial" panose="020B0604020202020204" pitchFamily="34" charset="0"/>
         <a:buChar char="•"/>
-        <a:defRPr sz="2800" kern="1200">
+        <a:defRPr sz="2800" b="0" i="0" kern="1200">
           <a:solidFill>
             <a:schemeClr val="tx1"/>
           </a:solidFill>
-          <a:latin typeface="+mn-lt"/>
+          <a:latin typeface="Calibri" panose="020F0502020204030204" pitchFamily="34" charset="0"/>
           <a:ea typeface="+mn-ea"/>
           <a:cs typeface="+mn-cs"/>
         </a:defRPr>
@@ -4151,11 +3414,11 @@
         </a:spcBef>
         <a:buFont typeface="Arial" panose="020B0604020202020204" pitchFamily="34" charset="0"/>
         <a:buChar char="•"/>
-        <a:defRPr sz="2400" kern="1200">
+        <a:defRPr sz="2400" b="0" i="0" kern="1200">
           <a:solidFill>
             <a:schemeClr val="tx1"/>
           </a:solidFill>
-          <a:latin typeface="+mn-lt"/>
+          <a:latin typeface="Calibri" panose="020F0502020204030204" pitchFamily="34" charset="0"/>
           <a:ea typeface="+mn-ea"/>
           <a:cs typeface="+mn-cs"/>
         </a:defRPr>
@@ -4169,11 +3432,11 @@
         </a:spcBef>
         <a:buFont typeface="Arial" panose="020B0604020202020204" pitchFamily="34" charset="0"/>
         <a:buChar char="•"/>
-        <a:defRPr sz="2000" kern="1200">
+        <a:defRPr sz="2000" b="0" i="0" kern="1200">
           <a:solidFill>
             <a:schemeClr val="tx1"/>
           </a:solidFill>
-          <a:latin typeface="+mn-lt"/>
+          <a:latin typeface="Calibri" panose="020F0502020204030204" pitchFamily="34" charset="0"/>
           <a:ea typeface="+mn-ea"/>
           <a:cs typeface="+mn-cs"/>
         </a:defRPr>
@@ -4187,11 +3450,11 @@
         </a:spcBef>
         <a:buFont typeface="Arial" panose="020B0604020202020204" pitchFamily="34" charset="0"/>
         <a:buChar char="•"/>
-        <a:defRPr sz="1800" kern="1200">
+        <a:defRPr sz="1800" b="0" i="0" kern="1200">
           <a:solidFill>
             <a:schemeClr val="tx1"/>
           </a:solidFill>
-          <a:latin typeface="+mn-lt"/>
+          <a:latin typeface="Calibri" panose="020F0502020204030204" pitchFamily="34" charset="0"/>
           <a:ea typeface="+mn-ea"/>
           <a:cs typeface="+mn-cs"/>
         </a:defRPr>
@@ -4205,11 +3468,11 @@
         </a:spcBef>
         <a:buFont typeface="Arial" panose="020B0604020202020204" pitchFamily="34" charset="0"/>
         <a:buChar char="•"/>
-        <a:defRPr sz="1800" kern="1200">
+        <a:defRPr sz="1800" b="0" i="0" kern="1200">
           <a:solidFill>
             <a:schemeClr val="tx1"/>
           </a:solidFill>
-          <a:latin typeface="+mn-lt"/>
+          <a:latin typeface="Calibri" panose="020F0502020204030204" pitchFamily="34" charset="0"/>
           <a:ea typeface="+mn-ea"/>
           <a:cs typeface="+mn-cs"/>
         </a:defRPr>
@@ -4435,7 +3698,7 @@
         </p:spPr>
         <p:txBody>
           <a:bodyPr>
-            <a:normAutofit/>
+            <a:normAutofit fontScale="90000"/>
           </a:bodyPr>
           <a:lstStyle/>
           <a:p>
@@ -4453,8 +3716,8 @@
             </a:r>
             <a:r>
               <a:rPr lang="en-US">
-                <a:latin typeface="Gautami" panose="020B0502040204020203" pitchFamily="34" charset="0"/>
-                <a:cs typeface="Gautami" panose="020B0502040204020203" pitchFamily="34" charset="0"/>
+                <a:latin typeface="Calibri" panose="020F0502020204030204" pitchFamily="34" charset="0"/>
+                <a:cs typeface="Calibri" panose="020F0502020204030204" pitchFamily="34" charset="0"/>
               </a:rPr>
               <a:t>Anduril</a:t>
             </a:r>
@@ -4471,98 +3734,6 @@
   <p:clrMapOvr>
     <a:masterClrMapping/>
   </p:clrMapOvr>
-  <p:timing>
-    <p:tnLst>
-      <p:par>
-        <p:cTn id="1" dur="indefinite" restart="never" nodeType="tmRoot">
-          <p:childTnLst>
-            <p:seq concurrent="1" nextAc="seek">
-              <p:cTn id="2" dur="indefinite" nodeType="mainSeq">
-                <p:childTnLst>
-                  <p:par>
-                    <p:cTn id="3" fill="hold">
-                      <p:stCondLst>
-                        <p:cond delay="indefinite"/>
-                        <p:cond evt="onBegin" delay="0">
-                          <p:tn val="2"/>
-                        </p:cond>
-                      </p:stCondLst>
-                      <p:childTnLst>
-                        <p:par>
-                          <p:cTn id="4" fill="hold">
-                            <p:stCondLst>
-                              <p:cond delay="0"/>
-                            </p:stCondLst>
-                            <p:childTnLst>
-                              <p:par>
-                                <p:cTn id="5" presetID="10" presetClass="entr" presetSubtype="0" fill="hold" grpId="0" nodeType="withEffect">
-                                  <p:stCondLst>
-                                    <p:cond delay="1000"/>
-                                  </p:stCondLst>
-                                  <p:iterate type="lt">
-                                    <p:tmPct val="10000"/>
-                                  </p:iterate>
-                                  <p:childTnLst>
-                                    <p:set>
-                                      <p:cBhvr>
-                                        <p:cTn id="6" dur="1" fill="hold">
-                                          <p:stCondLst>
-                                            <p:cond delay="0"/>
-                                          </p:stCondLst>
-                                        </p:cTn>
-                                        <p:tgtEl>
-                                          <p:spTgt spid="2"/>
-                                        </p:tgtEl>
-                                        <p:attrNameLst>
-                                          <p:attrName>style.visibility</p:attrName>
-                                        </p:attrNameLst>
-                                      </p:cBhvr>
-                                      <p:to>
-                                        <p:strVal val="visible"/>
-                                      </p:to>
-                                    </p:set>
-                                    <p:animEffect transition="in" filter="fade">
-                                      <p:cBhvr>
-                                        <p:cTn id="7" dur="400"/>
-                                        <p:tgtEl>
-                                          <p:spTgt spid="2"/>
-                                        </p:tgtEl>
-                                      </p:cBhvr>
-                                    </p:animEffect>
-                                  </p:childTnLst>
-                                </p:cTn>
-                              </p:par>
-                            </p:childTnLst>
-                          </p:cTn>
-                        </p:par>
-                      </p:childTnLst>
-                    </p:cTn>
-                  </p:par>
-                </p:childTnLst>
-              </p:cTn>
-              <p:prevCondLst>
-                <p:cond evt="onPrev" delay="0">
-                  <p:tgtEl>
-                    <p:sldTgt/>
-                  </p:tgtEl>
-                </p:cond>
-              </p:prevCondLst>
-              <p:nextCondLst>
-                <p:cond evt="onNext" delay="0">
-                  <p:tgtEl>
-                    <p:sldTgt/>
-                  </p:tgtEl>
-                </p:cond>
-              </p:nextCondLst>
-            </p:seq>
-          </p:childTnLst>
-        </p:cTn>
-      </p:par>
-    </p:tnLst>
-    <p:bldLst>
-      <p:bldP spid="2" grpId="0"/>
-    </p:bldLst>
-  </p:timing>
 </p:sld>
 </file>
 
@@ -4585,10 +3756,10 @@
       </p:grpSpPr>
       <p:sp>
         <p:nvSpPr>
-          <p:cNvPr id="2" name="Title 1">
+          <p:cNvPr id="4" name="Title 3">
             <a:extLst>
               <a:ext uri="{FF2B5EF4-FFF2-40B4-BE49-F238E27FC236}">
-                <a16:creationId xmlns:a16="http://schemas.microsoft.com/office/drawing/2014/main" id="{7728BDED-42C8-A07E-62BB-E0AB8DE2E6DE}"/>
+                <a16:creationId xmlns:a16="http://schemas.microsoft.com/office/drawing/2014/main" id="{08A659CA-4291-1C75-B450-04E15C1B4DD9}"/>
               </a:ext>
             </a:extLst>
           </p:cNvPr>
@@ -4604,19 +3775,22 @@
           <a:bodyPr/>
           <a:lstStyle/>
           <a:p>
-            <a:r>
+            <a:br>
               <a:rPr lang="en-US"/>
-              <a:t>Related Work</a:t>
-            </a:r>
-          </a:p>
-        </p:txBody>
-      </p:sp>
-      <p:sp>
-        <p:nvSpPr>
-          <p:cNvPr id="3" name="Content Placeholder 2">
+            </a:br>
+            <a:r>
+              <a:rPr lang="en-US"/>
+              <a:t>Reinforcement Learning</a:t>
+            </a:r>
+          </a:p>
+        </p:txBody>
+      </p:sp>
+      <p:sp>
+        <p:nvSpPr>
+          <p:cNvPr id="5" name="Text Placeholder 4">
             <a:extLst>
               <a:ext uri="{FF2B5EF4-FFF2-40B4-BE49-F238E27FC236}">
-                <a16:creationId xmlns:a16="http://schemas.microsoft.com/office/drawing/2014/main" id="{867B05C8-82AD-F656-A5F4-86EE00AD3D34}"/>
+                <a16:creationId xmlns:a16="http://schemas.microsoft.com/office/drawing/2014/main" id="{20190E43-4D58-2529-2315-25CEDC873BFC}"/>
               </a:ext>
             </a:extLst>
           </p:cNvPr>
@@ -4624,520 +3798,25 @@
             <a:spLocks noGrp="1"/>
           </p:cNvSpPr>
           <p:nvPr>
-            <p:ph idx="1"/>
-          </p:nvPr>
-        </p:nvSpPr>
-        <p:spPr/>
-        <p:txBody>
-          <a:bodyPr/>
-          <a:lstStyle/>
-          <a:p>
-            <a:endParaRPr lang="en-US"/>
+            <p:ph type="body" idx="1"/>
+          </p:nvPr>
+        </p:nvSpPr>
+        <p:spPr/>
+        <p:txBody>
+          <a:bodyPr/>
+          <a:lstStyle/>
+          <a:p>
+            <a:r>
+              <a:rPr lang="en-US"/>
+              <a:t>A Side Project</a:t>
+            </a:r>
           </a:p>
         </p:txBody>
       </p:sp>
     </p:spTree>
     <p:extLst>
       <p:ext uri="{BB962C8B-B14F-4D97-AF65-F5344CB8AC3E}">
-        <p14:creationId xmlns:p14="http://schemas.microsoft.com/office/powerpoint/2010/main" val="3532286866"/>
-      </p:ext>
-    </p:extLst>
-  </p:cSld>
-  <p:clrMapOvr>
-    <a:masterClrMapping/>
-  </p:clrMapOvr>
-</p:sld>
-</file>
-
-<file path=ppt/slides/slide11.xml><?xml version="1.0" encoding="utf-8"?>
-<p:sld xmlns:a="http://schemas.openxmlformats.org/drawingml/2006/main" xmlns:r="http://schemas.openxmlformats.org/officeDocument/2006/relationships" xmlns:p="http://schemas.openxmlformats.org/presentationml/2006/main">
-  <p:cSld>
-    <p:spTree>
-      <p:nvGrpSpPr>
-        <p:cNvPr id="1" name=""/>
-        <p:cNvGrpSpPr/>
-        <p:nvPr/>
-      </p:nvGrpSpPr>
-      <p:grpSpPr>
-        <a:xfrm>
-          <a:off x="0" y="0"/>
-          <a:ext cx="0" cy="0"/>
-          <a:chOff x="0" y="0"/>
-          <a:chExt cx="0" cy="0"/>
-        </a:xfrm>
-      </p:grpSpPr>
-      <p:sp>
-        <p:nvSpPr>
-          <p:cNvPr id="2" name="Title 1">
-            <a:extLst>
-              <a:ext uri="{FF2B5EF4-FFF2-40B4-BE49-F238E27FC236}">
-                <a16:creationId xmlns:a16="http://schemas.microsoft.com/office/drawing/2014/main" id="{8EBC56D0-057A-5FFF-AE39-705722231E04}"/>
-              </a:ext>
-            </a:extLst>
-          </p:cNvPr>
-          <p:cNvSpPr>
-            <a:spLocks noGrp="1"/>
-          </p:cNvSpPr>
-          <p:nvPr>
-            <p:ph type="title"/>
-          </p:nvPr>
-        </p:nvSpPr>
-        <p:spPr/>
-        <p:txBody>
-          <a:bodyPr/>
-          <a:lstStyle/>
-          <a:p>
-            <a:r>
-              <a:rPr lang="en-US"/>
-              <a:t>Flappy Bird</a:t>
-            </a:r>
-          </a:p>
-        </p:txBody>
-      </p:sp>
-      <p:sp>
-        <p:nvSpPr>
-          <p:cNvPr id="3" name="Content Placeholder 2">
-            <a:extLst>
-              <a:ext uri="{FF2B5EF4-FFF2-40B4-BE49-F238E27FC236}">
-                <a16:creationId xmlns:a16="http://schemas.microsoft.com/office/drawing/2014/main" id="{C1859EA6-7032-9EEE-34DB-29CF5C933C47}"/>
-              </a:ext>
-            </a:extLst>
-          </p:cNvPr>
-          <p:cNvSpPr>
-            <a:spLocks noGrp="1"/>
-          </p:cNvSpPr>
-          <p:nvPr>
-            <p:ph idx="1"/>
-          </p:nvPr>
-        </p:nvSpPr>
-        <p:spPr/>
-        <p:txBody>
-          <a:bodyPr/>
-          <a:lstStyle/>
-          <a:p>
-            <a:endParaRPr lang="en-US"/>
-          </a:p>
-        </p:txBody>
-      </p:sp>
-    </p:spTree>
-    <p:extLst>
-      <p:ext uri="{BB962C8B-B14F-4D97-AF65-F5344CB8AC3E}">
-        <p14:creationId xmlns:p14="http://schemas.microsoft.com/office/powerpoint/2010/main" val="1092649761"/>
-      </p:ext>
-    </p:extLst>
-  </p:cSld>
-  <p:clrMapOvr>
-    <a:masterClrMapping/>
-  </p:clrMapOvr>
-</p:sld>
-</file>
-
-<file path=ppt/slides/slide12.xml><?xml version="1.0" encoding="utf-8"?>
-<p:sld xmlns:a="http://schemas.openxmlformats.org/drawingml/2006/main" xmlns:r="http://schemas.openxmlformats.org/officeDocument/2006/relationships" xmlns:p="http://schemas.openxmlformats.org/presentationml/2006/main">
-  <p:cSld>
-    <p:spTree>
-      <p:nvGrpSpPr>
-        <p:cNvPr id="1" name=""/>
-        <p:cNvGrpSpPr/>
-        <p:nvPr/>
-      </p:nvGrpSpPr>
-      <p:grpSpPr>
-        <a:xfrm>
-          <a:off x="0" y="0"/>
-          <a:ext cx="0" cy="0"/>
-          <a:chOff x="0" y="0"/>
-          <a:chExt cx="0" cy="0"/>
-        </a:xfrm>
-      </p:grpSpPr>
-      <p:sp>
-        <p:nvSpPr>
-          <p:cNvPr id="2" name="Title 1">
-            <a:extLst>
-              <a:ext uri="{FF2B5EF4-FFF2-40B4-BE49-F238E27FC236}">
-                <a16:creationId xmlns:a16="http://schemas.microsoft.com/office/drawing/2014/main" id="{77C0A9B3-F8B8-53B6-BDD7-D2AFC35626E5}"/>
-              </a:ext>
-            </a:extLst>
-          </p:cNvPr>
-          <p:cNvSpPr>
-            <a:spLocks noGrp="1"/>
-          </p:cNvSpPr>
-          <p:nvPr>
-            <p:ph type="title"/>
-          </p:nvPr>
-        </p:nvSpPr>
-        <p:spPr/>
-        <p:txBody>
-          <a:bodyPr/>
-          <a:lstStyle/>
-          <a:p>
-            <a:r>
-              <a:rPr lang="en-US"/>
-              <a:t>Introduction to Reinforcement Learning</a:t>
-            </a:r>
-          </a:p>
-        </p:txBody>
-      </p:sp>
-      <p:sp>
-        <p:nvSpPr>
-          <p:cNvPr id="3" name="Content Placeholder 2">
-            <a:extLst>
-              <a:ext uri="{FF2B5EF4-FFF2-40B4-BE49-F238E27FC236}">
-                <a16:creationId xmlns:a16="http://schemas.microsoft.com/office/drawing/2014/main" id="{7855BF93-0762-AFCD-7F98-DEB3B9778901}"/>
-              </a:ext>
-            </a:extLst>
-          </p:cNvPr>
-          <p:cNvSpPr>
-            <a:spLocks noGrp="1"/>
-          </p:cNvSpPr>
-          <p:nvPr>
-            <p:ph idx="1"/>
-          </p:nvPr>
-        </p:nvSpPr>
-        <p:spPr/>
-        <p:txBody>
-          <a:bodyPr/>
-          <a:lstStyle/>
-          <a:p>
-            <a:endParaRPr lang="en-US"/>
-          </a:p>
-        </p:txBody>
-      </p:sp>
-    </p:spTree>
-    <p:extLst>
-      <p:ext uri="{BB962C8B-B14F-4D97-AF65-F5344CB8AC3E}">
-        <p14:creationId xmlns:p14="http://schemas.microsoft.com/office/powerpoint/2010/main" val="1569823619"/>
-      </p:ext>
-    </p:extLst>
-  </p:cSld>
-  <p:clrMapOvr>
-    <a:masterClrMapping/>
-  </p:clrMapOvr>
-</p:sld>
-</file>
-
-<file path=ppt/slides/slide13.xml><?xml version="1.0" encoding="utf-8"?>
-<p:sld xmlns:a="http://schemas.openxmlformats.org/drawingml/2006/main" xmlns:r="http://schemas.openxmlformats.org/officeDocument/2006/relationships" xmlns:p="http://schemas.openxmlformats.org/presentationml/2006/main">
-  <p:cSld>
-    <p:spTree>
-      <p:nvGrpSpPr>
-        <p:cNvPr id="1" name=""/>
-        <p:cNvGrpSpPr/>
-        <p:nvPr/>
-      </p:nvGrpSpPr>
-      <p:grpSpPr>
-        <a:xfrm>
-          <a:off x="0" y="0"/>
-          <a:ext cx="0" cy="0"/>
-          <a:chOff x="0" y="0"/>
-          <a:chExt cx="0" cy="0"/>
-        </a:xfrm>
-      </p:grpSpPr>
-      <p:sp>
-        <p:nvSpPr>
-          <p:cNvPr id="2" name="Title 1">
-            <a:extLst>
-              <a:ext uri="{FF2B5EF4-FFF2-40B4-BE49-F238E27FC236}">
-                <a16:creationId xmlns:a16="http://schemas.microsoft.com/office/drawing/2014/main" id="{E9417F6A-B489-58EC-2709-0CA1EB40035E}"/>
-              </a:ext>
-            </a:extLst>
-          </p:cNvPr>
-          <p:cNvSpPr>
-            <a:spLocks noGrp="1"/>
-          </p:cNvSpPr>
-          <p:nvPr>
-            <p:ph type="title"/>
-          </p:nvPr>
-        </p:nvSpPr>
-        <p:spPr/>
-        <p:txBody>
-          <a:bodyPr/>
-          <a:lstStyle/>
-          <a:p>
-            <a:r>
-              <a:rPr lang="en-US"/>
-              <a:t>DQNs</a:t>
-            </a:r>
-          </a:p>
-        </p:txBody>
-      </p:sp>
-      <p:sp>
-        <p:nvSpPr>
-          <p:cNvPr id="3" name="Content Placeholder 2">
-            <a:extLst>
-              <a:ext uri="{FF2B5EF4-FFF2-40B4-BE49-F238E27FC236}">
-                <a16:creationId xmlns:a16="http://schemas.microsoft.com/office/drawing/2014/main" id="{82422E28-09FE-805E-EFD4-53761C0B6F06}"/>
-              </a:ext>
-            </a:extLst>
-          </p:cNvPr>
-          <p:cNvSpPr>
-            <a:spLocks noGrp="1"/>
-          </p:cNvSpPr>
-          <p:nvPr>
-            <p:ph idx="1"/>
-          </p:nvPr>
-        </p:nvSpPr>
-        <p:spPr/>
-        <p:txBody>
-          <a:bodyPr/>
-          <a:lstStyle/>
-          <a:p>
-            <a:endParaRPr lang="en-US"/>
-          </a:p>
-        </p:txBody>
-      </p:sp>
-    </p:spTree>
-    <p:extLst>
-      <p:ext uri="{BB962C8B-B14F-4D97-AF65-F5344CB8AC3E}">
-        <p14:creationId xmlns:p14="http://schemas.microsoft.com/office/powerpoint/2010/main" val="3790762345"/>
-      </p:ext>
-    </p:extLst>
-  </p:cSld>
-  <p:clrMapOvr>
-    <a:masterClrMapping/>
-  </p:clrMapOvr>
-</p:sld>
-</file>
-
-<file path=ppt/slides/slide14.xml><?xml version="1.0" encoding="utf-8"?>
-<p:sld xmlns:a="http://schemas.openxmlformats.org/drawingml/2006/main" xmlns:r="http://schemas.openxmlformats.org/officeDocument/2006/relationships" xmlns:p="http://schemas.openxmlformats.org/presentationml/2006/main">
-  <p:cSld>
-    <p:spTree>
-      <p:nvGrpSpPr>
-        <p:cNvPr id="1" name=""/>
-        <p:cNvGrpSpPr/>
-        <p:nvPr/>
-      </p:nvGrpSpPr>
-      <p:grpSpPr>
-        <a:xfrm>
-          <a:off x="0" y="0"/>
-          <a:ext cx="0" cy="0"/>
-          <a:chOff x="0" y="0"/>
-          <a:chExt cx="0" cy="0"/>
-        </a:xfrm>
-      </p:grpSpPr>
-      <p:sp>
-        <p:nvSpPr>
-          <p:cNvPr id="2" name="Title 1">
-            <a:extLst>
-              <a:ext uri="{FF2B5EF4-FFF2-40B4-BE49-F238E27FC236}">
-                <a16:creationId xmlns:a16="http://schemas.microsoft.com/office/drawing/2014/main" id="{10346395-9B9B-8FA1-3058-10C2035756A2}"/>
-              </a:ext>
-            </a:extLst>
-          </p:cNvPr>
-          <p:cNvSpPr>
-            <a:spLocks noGrp="1"/>
-          </p:cNvSpPr>
-          <p:nvPr>
-            <p:ph type="title"/>
-          </p:nvPr>
-        </p:nvSpPr>
-        <p:spPr/>
-        <p:txBody>
-          <a:bodyPr/>
-          <a:lstStyle/>
-          <a:p>
-            <a:r>
-              <a:rPr lang="en-US"/>
-              <a:t>Ablation Study</a:t>
-            </a:r>
-          </a:p>
-        </p:txBody>
-      </p:sp>
-      <p:sp>
-        <p:nvSpPr>
-          <p:cNvPr id="3" name="Content Placeholder 2">
-            <a:extLst>
-              <a:ext uri="{FF2B5EF4-FFF2-40B4-BE49-F238E27FC236}">
-                <a16:creationId xmlns:a16="http://schemas.microsoft.com/office/drawing/2014/main" id="{B6E285AD-E51E-6BDF-5353-C94A567F586F}"/>
-              </a:ext>
-            </a:extLst>
-          </p:cNvPr>
-          <p:cNvSpPr>
-            <a:spLocks noGrp="1"/>
-          </p:cNvSpPr>
-          <p:nvPr>
-            <p:ph idx="1"/>
-          </p:nvPr>
-        </p:nvSpPr>
-        <p:spPr/>
-        <p:txBody>
-          <a:bodyPr/>
-          <a:lstStyle/>
-          <a:p>
-            <a:endParaRPr lang="en-US"/>
-          </a:p>
-        </p:txBody>
-      </p:sp>
-    </p:spTree>
-    <p:extLst>
-      <p:ext uri="{BB962C8B-B14F-4D97-AF65-F5344CB8AC3E}">
-        <p14:creationId xmlns:p14="http://schemas.microsoft.com/office/powerpoint/2010/main" val="1905475954"/>
-      </p:ext>
-    </p:extLst>
-  </p:cSld>
-  <p:clrMapOvr>
-    <a:masterClrMapping/>
-  </p:clrMapOvr>
-</p:sld>
-</file>
-
-<file path=ppt/slides/slide15.xml><?xml version="1.0" encoding="utf-8"?>
-<p:sld xmlns:a="http://schemas.openxmlformats.org/drawingml/2006/main" xmlns:r="http://schemas.openxmlformats.org/officeDocument/2006/relationships" xmlns:p="http://schemas.openxmlformats.org/presentationml/2006/main">
-  <p:cSld>
-    <p:spTree>
-      <p:nvGrpSpPr>
-        <p:cNvPr id="1" name=""/>
-        <p:cNvGrpSpPr/>
-        <p:nvPr/>
-      </p:nvGrpSpPr>
-      <p:grpSpPr>
-        <a:xfrm>
-          <a:off x="0" y="0"/>
-          <a:ext cx="0" cy="0"/>
-          <a:chOff x="0" y="0"/>
-          <a:chExt cx="0" cy="0"/>
-        </a:xfrm>
-      </p:grpSpPr>
-      <p:sp>
-        <p:nvSpPr>
-          <p:cNvPr id="2" name="Title 1">
-            <a:extLst>
-              <a:ext uri="{FF2B5EF4-FFF2-40B4-BE49-F238E27FC236}">
-                <a16:creationId xmlns:a16="http://schemas.microsoft.com/office/drawing/2014/main" id="{092612FB-A216-B0E3-B79A-CB0128A77CE2}"/>
-              </a:ext>
-            </a:extLst>
-          </p:cNvPr>
-          <p:cNvSpPr>
-            <a:spLocks noGrp="1"/>
-          </p:cNvSpPr>
-          <p:nvPr>
-            <p:ph type="title"/>
-          </p:nvPr>
-        </p:nvSpPr>
-        <p:spPr/>
-        <p:txBody>
-          <a:bodyPr/>
-          <a:lstStyle/>
-          <a:p>
-            <a:r>
-              <a:rPr lang="en-US"/>
-              <a:t>Further Work</a:t>
-            </a:r>
-          </a:p>
-        </p:txBody>
-      </p:sp>
-      <p:sp>
-        <p:nvSpPr>
-          <p:cNvPr id="3" name="Content Placeholder 2">
-            <a:extLst>
-              <a:ext uri="{FF2B5EF4-FFF2-40B4-BE49-F238E27FC236}">
-                <a16:creationId xmlns:a16="http://schemas.microsoft.com/office/drawing/2014/main" id="{A3F84966-FC6B-C99D-E133-EA93559EC038}"/>
-              </a:ext>
-            </a:extLst>
-          </p:cNvPr>
-          <p:cNvSpPr>
-            <a:spLocks noGrp="1"/>
-          </p:cNvSpPr>
-          <p:nvPr>
-            <p:ph idx="1"/>
-          </p:nvPr>
-        </p:nvSpPr>
-        <p:spPr/>
-        <p:txBody>
-          <a:bodyPr/>
-          <a:lstStyle/>
-          <a:p>
-            <a:endParaRPr lang="en-US"/>
-          </a:p>
-        </p:txBody>
-      </p:sp>
-    </p:spTree>
-    <p:extLst>
-      <p:ext uri="{BB962C8B-B14F-4D97-AF65-F5344CB8AC3E}">
-        <p14:creationId xmlns:p14="http://schemas.microsoft.com/office/powerpoint/2010/main" val="4098911880"/>
-      </p:ext>
-    </p:extLst>
-  </p:cSld>
-  <p:clrMapOvr>
-    <a:masterClrMapping/>
-  </p:clrMapOvr>
-</p:sld>
-</file>
-
-<file path=ppt/slides/slide16.xml><?xml version="1.0" encoding="utf-8"?>
-<p:sld xmlns:a="http://schemas.openxmlformats.org/drawingml/2006/main" xmlns:r="http://schemas.openxmlformats.org/officeDocument/2006/relationships" xmlns:p="http://schemas.openxmlformats.org/presentationml/2006/main">
-  <p:cSld>
-    <p:spTree>
-      <p:nvGrpSpPr>
-        <p:cNvPr id="1" name=""/>
-        <p:cNvGrpSpPr/>
-        <p:nvPr/>
-      </p:nvGrpSpPr>
-      <p:grpSpPr>
-        <a:xfrm>
-          <a:off x="0" y="0"/>
-          <a:ext cx="0" cy="0"/>
-          <a:chOff x="0" y="0"/>
-          <a:chExt cx="0" cy="0"/>
-        </a:xfrm>
-      </p:grpSpPr>
-      <p:sp>
-        <p:nvSpPr>
-          <p:cNvPr id="2" name="Title 1">
-            <a:extLst>
-              <a:ext uri="{FF2B5EF4-FFF2-40B4-BE49-F238E27FC236}">
-                <a16:creationId xmlns:a16="http://schemas.microsoft.com/office/drawing/2014/main" id="{F7A36888-76F7-93E5-91E6-C1DEEB747DF5}"/>
-              </a:ext>
-            </a:extLst>
-          </p:cNvPr>
-          <p:cNvSpPr>
-            <a:spLocks noGrp="1"/>
-          </p:cNvSpPr>
-          <p:nvPr>
-            <p:ph type="title"/>
-          </p:nvPr>
-        </p:nvSpPr>
-        <p:spPr/>
-        <p:txBody>
-          <a:bodyPr/>
-          <a:lstStyle/>
-          <a:p>
-            <a:r>
-              <a:rPr lang="en-US"/>
-              <a:t>Conclusion</a:t>
-            </a:r>
-          </a:p>
-        </p:txBody>
-      </p:sp>
-      <p:sp>
-        <p:nvSpPr>
-          <p:cNvPr id="3" name="Content Placeholder 2">
-            <a:extLst>
-              <a:ext uri="{FF2B5EF4-FFF2-40B4-BE49-F238E27FC236}">
-                <a16:creationId xmlns:a16="http://schemas.microsoft.com/office/drawing/2014/main" id="{5667A71C-C34B-B0DA-5AD6-26B2681054AF}"/>
-              </a:ext>
-            </a:extLst>
-          </p:cNvPr>
-          <p:cNvSpPr>
-            <a:spLocks noGrp="1"/>
-          </p:cNvSpPr>
-          <p:nvPr>
-            <p:ph idx="1"/>
-          </p:nvPr>
-        </p:nvSpPr>
-        <p:spPr/>
-        <p:txBody>
-          <a:bodyPr/>
-          <a:lstStyle/>
-          <a:p>
-            <a:endParaRPr lang="en-US"/>
-          </a:p>
-        </p:txBody>
-      </p:sp>
-    </p:spTree>
-    <p:extLst>
-      <p:ext uri="{BB962C8B-B14F-4D97-AF65-F5344CB8AC3E}">
-        <p14:creationId xmlns:p14="http://schemas.microsoft.com/office/powerpoint/2010/main" val="814436619"/>
+        <p14:creationId xmlns:p14="http://schemas.microsoft.com/office/powerpoint/2010/main" val="3117989012"/>
       </p:ext>
     </p:extLst>
   </p:cSld>
@@ -5191,48 +3870,78 @@
           <a:lstStyle/>
           <a:p>
             <a:r>
-              <a:rPr lang="en-US"/>
+              <a:rPr lang="en-US">
+                <a:latin typeface="Calibri" panose="020F0502020204030204" pitchFamily="34" charset="0"/>
+                <a:cs typeface="Calibri" panose="020F0502020204030204" pitchFamily="34" charset="0"/>
+              </a:rPr>
+              <a:t>Worked IRAD for two years</a:t>
+            </a:r>
+          </a:p>
+          <a:p>
+            <a:r>
+              <a:rPr lang="en-US">
+                <a:latin typeface="Calibri" panose="020F0502020204030204" pitchFamily="34" charset="0"/>
+                <a:cs typeface="Calibri" panose="020F0502020204030204" pitchFamily="34" charset="0"/>
+              </a:rPr>
               <a:t>Path Planning</a:t>
             </a:r>
           </a:p>
           <a:p>
             <a:pPr lvl="1"/>
             <a:r>
-              <a:rPr lang="en-US"/>
+              <a:rPr lang="en-US">
+                <a:latin typeface="Calibri" panose="020F0502020204030204" pitchFamily="34" charset="0"/>
+                <a:cs typeface="Calibri" panose="020F0502020204030204" pitchFamily="34" charset="0"/>
+              </a:rPr>
               <a:t>Navigation</a:t>
             </a:r>
           </a:p>
           <a:p>
             <a:pPr lvl="1"/>
             <a:r>
-              <a:rPr lang="en-US"/>
+              <a:rPr lang="en-US">
+                <a:latin typeface="Calibri" panose="020F0502020204030204" pitchFamily="34" charset="0"/>
+                <a:cs typeface="Calibri" panose="020F0502020204030204" pitchFamily="34" charset="0"/>
+              </a:rPr>
               <a:t>Autonomy</a:t>
             </a:r>
           </a:p>
           <a:p>
             <a:pPr lvl="1"/>
             <a:r>
-              <a:rPr lang="en-US"/>
+              <a:rPr lang="en-US">
+                <a:latin typeface="Calibri" panose="020F0502020204030204" pitchFamily="34" charset="0"/>
+                <a:cs typeface="Calibri" panose="020F0502020204030204" pitchFamily="34" charset="0"/>
+              </a:rPr>
               <a:t>Motion Planning</a:t>
             </a:r>
           </a:p>
           <a:p>
             <a:r>
-              <a:rPr lang="en-US"/>
+              <a:rPr lang="en-US">
+                <a:latin typeface="Calibri" panose="020F0502020204030204" pitchFamily="34" charset="0"/>
+                <a:cs typeface="Calibri" panose="020F0502020204030204" pitchFamily="34" charset="0"/>
+              </a:rPr>
               <a:t>ATR</a:t>
             </a:r>
           </a:p>
           <a:p>
             <a:pPr lvl="1"/>
             <a:r>
-              <a:rPr lang="en-US"/>
+              <a:rPr lang="en-US">
+                <a:latin typeface="Calibri" panose="020F0502020204030204" pitchFamily="34" charset="0"/>
+                <a:cs typeface="Calibri" panose="020F0502020204030204" pitchFamily="34" charset="0"/>
+              </a:rPr>
               <a:t>SSD</a:t>
             </a:r>
           </a:p>
           <a:p>
             <a:pPr lvl="1"/>
             <a:r>
-              <a:rPr lang="en-US"/>
+              <a:rPr lang="en-US">
+                <a:latin typeface="Calibri" panose="020F0502020204030204" pitchFamily="34" charset="0"/>
+                <a:cs typeface="Calibri" panose="020F0502020204030204" pitchFamily="34" charset="0"/>
+              </a:rPr>
               <a:t>RT-DETR</a:t>
             </a:r>
           </a:p>
@@ -5253,7 +3962,7 @@
         <p:spPr>
           <a:xfrm>
             <a:off x="420016" y="309390"/>
-            <a:ext cx="2901918" cy="707886"/>
+            <a:ext cx="4112227" cy="707886"/>
           </a:xfrm>
           <a:prstGeom prst="rect">
             <a:avLst/>
@@ -5267,8 +3976,11 @@
           <a:lstStyle/>
           <a:p>
             <a:r>
-              <a:rPr lang="en-US" sz="4000"/>
-              <a:t>Experience</a:t>
+              <a:rPr lang="en-US" sz="4000">
+                <a:latin typeface="Calibri" panose="020F0502020204030204" pitchFamily="34" charset="0"/>
+                <a:cs typeface="Calibri" panose="020F0502020204030204" pitchFamily="34" charset="0"/>
+              </a:rPr>
+              <a:t>Career Summary</a:t>
             </a:r>
           </a:p>
         </p:txBody>
@@ -5305,10 +4017,10 @@
       </p:grpSpPr>
       <p:sp>
         <p:nvSpPr>
-          <p:cNvPr id="2" name="Title 1">
+          <p:cNvPr id="4" name="Title 3">
             <a:extLst>
               <a:ext uri="{FF2B5EF4-FFF2-40B4-BE49-F238E27FC236}">
-                <a16:creationId xmlns:a16="http://schemas.microsoft.com/office/drawing/2014/main" id="{B437DFE7-4672-2BCA-F4BE-7E789FAC8FEE}"/>
+                <a16:creationId xmlns:a16="http://schemas.microsoft.com/office/drawing/2014/main" id="{799F43B6-4604-63A7-0C88-0BDD6AF2CEFD}"/>
               </a:ext>
             </a:extLst>
           </p:cNvPr>
@@ -5326,17 +4038,17 @@
           <a:p>
             <a:r>
               <a:rPr lang="en-US"/>
-              <a:t>Career Summary</a:t>
-            </a:r>
-          </a:p>
-        </p:txBody>
-      </p:sp>
-      <p:sp>
-        <p:nvSpPr>
-          <p:cNvPr id="3" name="Content Placeholder 2">
+              <a:t>Path Planning</a:t>
+            </a:r>
+          </a:p>
+        </p:txBody>
+      </p:sp>
+      <p:sp>
+        <p:nvSpPr>
+          <p:cNvPr id="5" name="Text Placeholder 4">
             <a:extLst>
               <a:ext uri="{FF2B5EF4-FFF2-40B4-BE49-F238E27FC236}">
-                <a16:creationId xmlns:a16="http://schemas.microsoft.com/office/drawing/2014/main" id="{9FF8641F-01D2-F458-5651-2DA813732757}"/>
+                <a16:creationId xmlns:a16="http://schemas.microsoft.com/office/drawing/2014/main" id="{FE32D7E5-46FC-42BD-E648-399FC0666129}"/>
               </a:ext>
             </a:extLst>
           </p:cNvPr>
@@ -5344,93 +4056,14 @@
             <a:spLocks noGrp="1"/>
           </p:cNvSpPr>
           <p:nvPr>
-            <p:ph idx="1"/>
-          </p:nvPr>
-        </p:nvSpPr>
-        <p:spPr>
-          <a:xfrm>
-            <a:off x="1043940" y="1690688"/>
-            <a:ext cx="5619750" cy="4351338"/>
-          </a:xfrm>
-        </p:spPr>
-        <p:txBody>
-          <a:bodyPr/>
-          <a:lstStyle/>
-          <a:p>
-            <a:pPr marL="514350" indent="-514350">
-              <a:buFont typeface="+mj-lt"/>
-              <a:buAutoNum type="arabicPeriod"/>
-            </a:pPr>
-            <a:r>
-              <a:rPr lang="en-US"/>
-              <a:t>Path Planning</a:t>
-            </a:r>
-          </a:p>
-          <a:p>
-            <a:pPr marL="971550" lvl="1" indent="-514350">
-              <a:buFont typeface="+mj-lt"/>
-              <a:buAutoNum type="arabicPeriod"/>
-            </a:pPr>
-            <a:r>
-              <a:rPr lang="en-US"/>
-              <a:t>Navigation</a:t>
-            </a:r>
-          </a:p>
-          <a:p>
-            <a:pPr marL="971550" lvl="1" indent="-514350">
-              <a:buFont typeface="+mj-lt"/>
-              <a:buAutoNum type="arabicPeriod"/>
-            </a:pPr>
-            <a:r>
-              <a:rPr lang="en-US"/>
-              <a:t>Autonomy</a:t>
-            </a:r>
-          </a:p>
-          <a:p>
-            <a:pPr marL="971550" lvl="1" indent="-514350">
-              <a:buFont typeface="+mj-lt"/>
-              <a:buAutoNum type="arabicPeriod"/>
-            </a:pPr>
-            <a:r>
-              <a:rPr lang="en-US"/>
-              <a:t>Motion Planning</a:t>
-            </a:r>
-          </a:p>
-          <a:p>
-            <a:pPr marL="514350" indent="-514350">
-              <a:buFont typeface="+mj-lt"/>
-              <a:buAutoNum type="arabicPeriod"/>
-            </a:pPr>
-            <a:r>
-              <a:rPr lang="en-US"/>
-              <a:t>Automated Target Recognition</a:t>
-            </a:r>
-          </a:p>
-          <a:p>
-            <a:pPr marL="971550" lvl="1" indent="-514350">
-              <a:buFont typeface="+mj-lt"/>
-              <a:buAutoNum type="arabicPeriod"/>
-            </a:pPr>
-            <a:r>
-              <a:rPr lang="en-US"/>
-              <a:t>SSD</a:t>
-            </a:r>
-          </a:p>
-          <a:p>
-            <a:pPr marL="971550" lvl="1" indent="-514350">
-              <a:buFont typeface="+mj-lt"/>
-              <a:buAutoNum type="arabicPeriod"/>
-            </a:pPr>
-            <a:r>
-              <a:rPr lang="en-US"/>
-              <a:t>RT-DETR</a:t>
-            </a:r>
-          </a:p>
-          <a:p>
-            <a:pPr marL="971550" lvl="1" indent="-514350">
-              <a:buFont typeface="+mj-lt"/>
-              <a:buAutoNum type="arabicPeriod"/>
-            </a:pPr>
+            <p:ph type="body" idx="1"/>
+          </p:nvPr>
+        </p:nvSpPr>
+        <p:spPr/>
+        <p:txBody>
+          <a:bodyPr/>
+          <a:lstStyle/>
+          <a:p>
             <a:endParaRPr lang="en-US"/>
           </a:p>
         </p:txBody>
@@ -5438,7 +4071,7 @@
     </p:spTree>
     <p:extLst>
       <p:ext uri="{BB962C8B-B14F-4D97-AF65-F5344CB8AC3E}">
-        <p14:creationId xmlns:p14="http://schemas.microsoft.com/office/powerpoint/2010/main" val="3173743963"/>
+        <p14:creationId xmlns:p14="http://schemas.microsoft.com/office/powerpoint/2010/main" val="3433007207"/>
       </p:ext>
     </p:extLst>
   </p:cSld>
@@ -5470,7 +4103,7 @@
           <p:cNvPr id="2" name="Title 1">
             <a:extLst>
               <a:ext uri="{FF2B5EF4-FFF2-40B4-BE49-F238E27FC236}">
-                <a16:creationId xmlns:a16="http://schemas.microsoft.com/office/drawing/2014/main" id="{6B3610FF-F65E-47CD-0799-11F645D1DCC7}"/>
+                <a16:creationId xmlns:a16="http://schemas.microsoft.com/office/drawing/2014/main" id="{C425FDF5-702C-0D3D-CE33-29152722C5D1}"/>
               </a:ext>
             </a:extLst>
           </p:cNvPr>
@@ -5481,14 +4114,19 @@
             <p:ph type="title"/>
           </p:nvPr>
         </p:nvSpPr>
-        <p:spPr/>
+        <p:spPr>
+          <a:xfrm>
+            <a:off x="838200" y="365125"/>
+            <a:ext cx="5257800" cy="1325563"/>
+          </a:xfrm>
+        </p:spPr>
         <p:txBody>
           <a:bodyPr/>
           <a:lstStyle/>
           <a:p>
             <a:r>
               <a:rPr lang="en-US"/>
-              <a:t>Categories of Reinforcement Learning</a:t>
+              <a:t>Navigation</a:t>
             </a:r>
           </a:p>
         </p:txBody>
@@ -5498,7 +4136,7 @@
           <p:cNvPr id="3" name="Content Placeholder 2">
             <a:extLst>
               <a:ext uri="{FF2B5EF4-FFF2-40B4-BE49-F238E27FC236}">
-                <a16:creationId xmlns:a16="http://schemas.microsoft.com/office/drawing/2014/main" id="{28B3F20A-DA6E-76F6-EEBF-E807DD581216}"/>
+                <a16:creationId xmlns:a16="http://schemas.microsoft.com/office/drawing/2014/main" id="{25CADDC1-9F46-FD6E-FAE8-43C36DA13BBF}"/>
               </a:ext>
             </a:extLst>
           </p:cNvPr>
@@ -5509,34 +4147,39 @@
             <p:ph idx="1"/>
           </p:nvPr>
         </p:nvSpPr>
-        <p:spPr/>
-        <p:txBody>
-          <a:bodyPr/>
-          <a:lstStyle/>
-          <a:p>
-            <a:pPr marL="514350" indent="-514350">
-              <a:buAutoNum type="arabicPeriod"/>
-            </a:pPr>
+        <p:spPr>
+          <a:xfrm>
+            <a:off x="838200" y="1690688"/>
+            <a:ext cx="5257800" cy="4486275"/>
+          </a:xfrm>
+        </p:spPr>
+        <p:txBody>
+          <a:bodyPr/>
+          <a:lstStyle/>
+          <a:p>
             <a:r>
               <a:rPr lang="en-US"/>
-              <a:t>Model-based / Model-free</a:t>
-            </a:r>
-          </a:p>
-          <a:p>
-            <a:pPr marL="514350" indent="-514350">
-              <a:buAutoNum type="arabicPeriod"/>
-            </a:pPr>
+              <a:t>Assume positional control of drone</a:t>
+            </a:r>
+          </a:p>
+          <a:p>
             <a:r>
               <a:rPr lang="en-US"/>
-              <a:t>Value-based / Policy-based Methods</a:t>
-            </a:r>
+              <a:t>Most efficient way to navigate around obstacles</a:t>
+            </a:r>
+          </a:p>
+          <a:p>
+            <a:endParaRPr lang="en-US"/>
+          </a:p>
+          <a:p>
+            <a:endParaRPr lang="en-US"/>
           </a:p>
         </p:txBody>
       </p:sp>
     </p:spTree>
     <p:extLst>
       <p:ext uri="{BB962C8B-B14F-4D97-AF65-F5344CB8AC3E}">
-        <p14:creationId xmlns:p14="http://schemas.microsoft.com/office/powerpoint/2010/main" val="445927258"/>
+        <p14:creationId xmlns:p14="http://schemas.microsoft.com/office/powerpoint/2010/main" val="2010082861"/>
       </p:ext>
     </p:extLst>
   </p:cSld>
@@ -5568,7 +4211,7 @@
           <p:cNvPr id="2" name="Title 1">
             <a:extLst>
               <a:ext uri="{FF2B5EF4-FFF2-40B4-BE49-F238E27FC236}">
-                <a16:creationId xmlns:a16="http://schemas.microsoft.com/office/drawing/2014/main" id="{BB6F790C-E6D3-C10E-DFE4-85D103CA5757}"/>
+                <a16:creationId xmlns:a16="http://schemas.microsoft.com/office/drawing/2014/main" id="{57A47BED-4EF8-32BE-160E-19A1D62C3A2D}"/>
               </a:ext>
             </a:extLst>
           </p:cNvPr>
@@ -5586,7 +4229,7 @@
           <a:p>
             <a:r>
               <a:rPr lang="en-US"/>
-              <a:t>What is reinforcement learning?</a:t>
+              <a:t>Autonomy</a:t>
             </a:r>
           </a:p>
         </p:txBody>
@@ -5596,7 +4239,7 @@
           <p:cNvPr id="3" name="Content Placeholder 2">
             <a:extLst>
               <a:ext uri="{FF2B5EF4-FFF2-40B4-BE49-F238E27FC236}">
-                <a16:creationId xmlns:a16="http://schemas.microsoft.com/office/drawing/2014/main" id="{E6B4044C-E997-1227-1BE4-7A3ED16EB3F3}"/>
+                <a16:creationId xmlns:a16="http://schemas.microsoft.com/office/drawing/2014/main" id="{CD727FD6-B9A9-4F02-F614-BD1D3E631443}"/>
               </a:ext>
             </a:extLst>
           </p:cNvPr>
@@ -5607,32 +4250,27 @@
             <p:ph idx="1"/>
           </p:nvPr>
         </p:nvSpPr>
-        <p:spPr/>
+        <p:spPr>
+          <a:xfrm>
+            <a:off x="838200" y="1825625"/>
+            <a:ext cx="5257800" cy="4351338"/>
+          </a:xfrm>
+        </p:spPr>
         <p:txBody>
           <a:bodyPr/>
           <a:lstStyle/>
           <a:p>
             <a:r>
               <a:rPr lang="en-US"/>
-              <a:t>Automates the process of human learning</a:t>
-            </a:r>
-          </a:p>
-          <a:p>
-            <a:pPr lvl="1"/>
-            <a:r>
-              <a:rPr lang="en-US"/>
-              <a:t>A numerical reward instead of emotional reward</a:t>
-            </a:r>
-          </a:p>
-          <a:p>
-            <a:endParaRPr lang="en-US"/>
+              <a:t>algorithm for autonomous robot conduct surveillance independently</a:t>
+            </a:r>
           </a:p>
         </p:txBody>
       </p:sp>
     </p:spTree>
     <p:extLst>
       <p:ext uri="{BB962C8B-B14F-4D97-AF65-F5344CB8AC3E}">
-        <p14:creationId xmlns:p14="http://schemas.microsoft.com/office/powerpoint/2010/main" val="3217657075"/>
+        <p14:creationId xmlns:p14="http://schemas.microsoft.com/office/powerpoint/2010/main" val="3962800616"/>
       </p:ext>
     </p:extLst>
   </p:cSld>
@@ -5664,7 +4302,7 @@
           <p:cNvPr id="2" name="Title 1">
             <a:extLst>
               <a:ext uri="{FF2B5EF4-FFF2-40B4-BE49-F238E27FC236}">
-                <a16:creationId xmlns:a16="http://schemas.microsoft.com/office/drawing/2014/main" id="{DFF08C58-45B2-1194-66F6-3D260E1BD43F}"/>
+                <a16:creationId xmlns:a16="http://schemas.microsoft.com/office/drawing/2014/main" id="{38ECE26F-9D44-BA4C-01F1-4A633953190B}"/>
               </a:ext>
             </a:extLst>
           </p:cNvPr>
@@ -5675,14 +4313,19 @@
             <p:ph type="title"/>
           </p:nvPr>
         </p:nvSpPr>
-        <p:spPr/>
+        <p:spPr>
+          <a:xfrm>
+            <a:off x="838200" y="365125"/>
+            <a:ext cx="5257800" cy="1325563"/>
+          </a:xfrm>
+        </p:spPr>
         <p:txBody>
           <a:bodyPr/>
           <a:lstStyle/>
           <a:p>
             <a:r>
               <a:rPr lang="en-US"/>
-              <a:t>Model-based Methods</a:t>
+              <a:t>Motion Control</a:t>
             </a:r>
           </a:p>
         </p:txBody>
@@ -5692,7 +4335,7 @@
           <p:cNvPr id="3" name="Content Placeholder 2">
             <a:extLst>
               <a:ext uri="{FF2B5EF4-FFF2-40B4-BE49-F238E27FC236}">
-                <a16:creationId xmlns:a16="http://schemas.microsoft.com/office/drawing/2014/main" id="{DEFB5949-8589-537D-D504-0DAAF0A4409B}"/>
+                <a16:creationId xmlns:a16="http://schemas.microsoft.com/office/drawing/2014/main" id="{97761588-5CC3-5226-5669-213D212957D0}"/>
               </a:ext>
             </a:extLst>
           </p:cNvPr>
@@ -5703,22 +4346,36 @@
             <p:ph idx="1"/>
           </p:nvPr>
         </p:nvSpPr>
-        <p:spPr/>
+        <p:spPr>
+          <a:xfrm>
+            <a:off x="838200" y="1825625"/>
+            <a:ext cx="4968834" cy="4351338"/>
+          </a:xfrm>
+        </p:spPr>
         <p:txBody>
           <a:bodyPr/>
           <a:lstStyle/>
           <a:p>
             <a:r>
               <a:rPr lang="en-US"/>
-              <a:t>Knowledge of the next state, but not it's value</a:t>
-            </a:r>
+              <a:t>Navigation with acceleration control</a:t>
+            </a:r>
+          </a:p>
+          <a:p>
+            <a:r>
+              <a:rPr lang="en-US"/>
+              <a:t>Bezier curves</a:t>
+            </a:r>
+          </a:p>
+          <a:p>
+            <a:endParaRPr lang="en-US"/>
           </a:p>
         </p:txBody>
       </p:sp>
     </p:spTree>
     <p:extLst>
       <p:ext uri="{BB962C8B-B14F-4D97-AF65-F5344CB8AC3E}">
-        <p14:creationId xmlns:p14="http://schemas.microsoft.com/office/powerpoint/2010/main" val="2625338137"/>
+        <p14:creationId xmlns:p14="http://schemas.microsoft.com/office/powerpoint/2010/main" val="1985342631"/>
       </p:ext>
     </p:extLst>
   </p:cSld>
@@ -5747,10 +4404,10 @@
       </p:grpSpPr>
       <p:sp>
         <p:nvSpPr>
-          <p:cNvPr id="2" name="Title 1">
+          <p:cNvPr id="4" name="Title 3">
             <a:extLst>
               <a:ext uri="{FF2B5EF4-FFF2-40B4-BE49-F238E27FC236}">
-                <a16:creationId xmlns:a16="http://schemas.microsoft.com/office/drawing/2014/main" id="{457C2D9E-13CA-EF29-DC50-290667E24BC9}"/>
+                <a16:creationId xmlns:a16="http://schemas.microsoft.com/office/drawing/2014/main" id="{4747FC82-697B-13BE-98B4-C11D6CE65F74}"/>
               </a:ext>
             </a:extLst>
           </p:cNvPr>
@@ -5768,17 +4425,17 @@
           <a:p>
             <a:r>
               <a:rPr lang="en-US"/>
-              <a:t>Model-free Methods</a:t>
-            </a:r>
-          </a:p>
-        </p:txBody>
-      </p:sp>
-      <p:sp>
-        <p:nvSpPr>
-          <p:cNvPr id="3" name="Content Placeholder 2">
+              <a:t>Automated Target Recognition</a:t>
+            </a:r>
+          </a:p>
+        </p:txBody>
+      </p:sp>
+      <p:sp>
+        <p:nvSpPr>
+          <p:cNvPr id="5" name="Text Placeholder 4">
             <a:extLst>
               <a:ext uri="{FF2B5EF4-FFF2-40B4-BE49-F238E27FC236}">
-                <a16:creationId xmlns:a16="http://schemas.microsoft.com/office/drawing/2014/main" id="{7C282F2D-F2EF-66BA-C718-B219CAE368A8}"/>
+                <a16:creationId xmlns:a16="http://schemas.microsoft.com/office/drawing/2014/main" id="{222A3FB5-A48B-F400-C2E8-FD0A4ACA2B81}"/>
               </a:ext>
             </a:extLst>
           </p:cNvPr>
@@ -5786,23 +4443,14 @@
             <a:spLocks noGrp="1"/>
           </p:cNvSpPr>
           <p:nvPr>
-            <p:ph idx="1"/>
-          </p:nvPr>
-        </p:nvSpPr>
-        <p:spPr/>
-        <p:txBody>
-          <a:bodyPr/>
-          <a:lstStyle/>
-          <a:p>
-            <a:r>
-              <a:rPr lang="en-US"/>
-              <a:t>Must learn P(S' |s,a)</a:t>
-            </a:r>
-          </a:p>
-          <a:p>
-            <a:pPr marL="0" indent="0">
-              <a:buNone/>
-            </a:pPr>
+            <p:ph type="body" idx="1"/>
+          </p:nvPr>
+        </p:nvSpPr>
+        <p:spPr/>
+        <p:txBody>
+          <a:bodyPr/>
+          <a:lstStyle/>
+          <a:p>
             <a:endParaRPr lang="en-US"/>
           </a:p>
         </p:txBody>
@@ -5810,7 +4458,7 @@
     </p:spTree>
     <p:extLst>
       <p:ext uri="{BB962C8B-B14F-4D97-AF65-F5344CB8AC3E}">
-        <p14:creationId xmlns:p14="http://schemas.microsoft.com/office/powerpoint/2010/main" val="1242731641"/>
+        <p14:creationId xmlns:p14="http://schemas.microsoft.com/office/powerpoint/2010/main" val="3050639"/>
       </p:ext>
     </p:extLst>
   </p:cSld>
@@ -5842,7 +4490,7 @@
           <p:cNvPr id="2" name="Title 1">
             <a:extLst>
               <a:ext uri="{FF2B5EF4-FFF2-40B4-BE49-F238E27FC236}">
-                <a16:creationId xmlns:a16="http://schemas.microsoft.com/office/drawing/2014/main" id="{61E03812-1D25-2927-A296-372454B9BEAD}"/>
+                <a16:creationId xmlns:a16="http://schemas.microsoft.com/office/drawing/2014/main" id="{7728BDED-42C8-A07E-62BB-E0AB8DE2E6DE}"/>
               </a:ext>
             </a:extLst>
           </p:cNvPr>
@@ -5860,7 +4508,7 @@
           <a:p>
             <a:r>
               <a:rPr lang="en-US"/>
-              <a:t>Policy Based Methods</a:t>
+              <a:t>Single Shot Detector</a:t>
             </a:r>
           </a:p>
         </p:txBody>
@@ -5870,7 +4518,7 @@
           <p:cNvPr id="3" name="Content Placeholder 2">
             <a:extLst>
               <a:ext uri="{FF2B5EF4-FFF2-40B4-BE49-F238E27FC236}">
-                <a16:creationId xmlns:a16="http://schemas.microsoft.com/office/drawing/2014/main" id="{F7AC0773-F915-197C-3C07-76E6074E1786}"/>
+                <a16:creationId xmlns:a16="http://schemas.microsoft.com/office/drawing/2014/main" id="{867B05C8-82AD-F656-A5F4-86EE00AD3D34}"/>
               </a:ext>
             </a:extLst>
           </p:cNvPr>
@@ -5886,17 +4534,14 @@
           <a:bodyPr/>
           <a:lstStyle/>
           <a:p>
-            <a:r>
-              <a:rPr lang="en-US"/>
-              <a:t>Assumes that the the optimal choice in each state is not fixed, but rather a probability</a:t>
-            </a:r>
+            <a:endParaRPr lang="en-US"/>
           </a:p>
         </p:txBody>
       </p:sp>
     </p:spTree>
     <p:extLst>
       <p:ext uri="{BB962C8B-B14F-4D97-AF65-F5344CB8AC3E}">
-        <p14:creationId xmlns:p14="http://schemas.microsoft.com/office/powerpoint/2010/main" val="3999997264"/>
+        <p14:creationId xmlns:p14="http://schemas.microsoft.com/office/powerpoint/2010/main" val="3532286866"/>
       </p:ext>
     </p:extLst>
   </p:cSld>
@@ -5928,7 +4573,7 @@
           <p:cNvPr id="2" name="Title 1">
             <a:extLst>
               <a:ext uri="{FF2B5EF4-FFF2-40B4-BE49-F238E27FC236}">
-                <a16:creationId xmlns:a16="http://schemas.microsoft.com/office/drawing/2014/main" id="{EACA37CC-234D-96AC-5C44-709D037CAD07}"/>
+                <a16:creationId xmlns:a16="http://schemas.microsoft.com/office/drawing/2014/main" id="{8EBC56D0-057A-5FFF-AE39-705722231E04}"/>
               </a:ext>
             </a:extLst>
           </p:cNvPr>
@@ -5946,7 +4591,7 @@
           <a:p>
             <a:r>
               <a:rPr lang="en-US"/>
-              <a:t>Policy Free (Value-based) methods</a:t>
+              <a:t>RT-DETR</a:t>
             </a:r>
           </a:p>
         </p:txBody>
@@ -5956,7 +4601,7 @@
           <p:cNvPr id="3" name="Content Placeholder 2">
             <a:extLst>
               <a:ext uri="{FF2B5EF4-FFF2-40B4-BE49-F238E27FC236}">
-                <a16:creationId xmlns:a16="http://schemas.microsoft.com/office/drawing/2014/main" id="{8767E11B-2806-C734-4D2F-BBB1DF6B9FFB}"/>
+                <a16:creationId xmlns:a16="http://schemas.microsoft.com/office/drawing/2014/main" id="{C1859EA6-7032-9EEE-34DB-29CF5C933C47}"/>
               </a:ext>
             </a:extLst>
           </p:cNvPr>
@@ -5972,17 +4617,14 @@
           <a:bodyPr/>
           <a:lstStyle/>
           <a:p>
-            <a:r>
-              <a:rPr lang="en-US"/>
-              <a:t>Assume that there is one optimal choice in each state</a:t>
-            </a:r>
+            <a:endParaRPr lang="en-US"/>
           </a:p>
         </p:txBody>
       </p:sp>
     </p:spTree>
     <p:extLst>
       <p:ext uri="{BB962C8B-B14F-4D97-AF65-F5344CB8AC3E}">
-        <p14:creationId xmlns:p14="http://schemas.microsoft.com/office/powerpoint/2010/main" val="1870705804"/>
+        <p14:creationId xmlns:p14="http://schemas.microsoft.com/office/powerpoint/2010/main" val="1092649761"/>
       </p:ext>
     </p:extLst>
   </p:cSld>
@@ -6620,4 +5262,24 @@
     </a:ext>
   </a:extLst>
 </a:theme>
+</file>
+
+<file path=ppt/webextensions/taskpanes.xml><?xml version="1.0" encoding="utf-8"?>
+<wetp:taskpanes xmlns:wetp="http://schemas.microsoft.com/office/webextensions/taskpanes/2010/11">
+  <wetp:taskpane dockstate="right" visibility="0" width="350" row="0">
+    <wetp:webextensionref xmlns:r="http://schemas.openxmlformats.org/officeDocument/2006/relationships" r:id="rId1"/>
+  </wetp:taskpane>
+</wetp:taskpanes>
+</file>
+
+<file path=ppt/webextensions/webextension1.xml><?xml version="1.0" encoding="utf-8"?>
+<we:webextension xmlns:we="http://schemas.microsoft.com/office/webextensions/webextension/2010/11" id="{A9B6AD05-0328-8C4C-AA22-AB10C95206A9}">
+  <we:reference id="wa200004052" version="1.0.0.2" store="en-US" storeType="OMEX"/>
+  <we:alternateReferences>
+    <we:reference id="wa200004052" version="1.0.0.2" store="WA200004052" storeType="OMEX"/>
+  </we:alternateReferences>
+  <we:properties/>
+  <we:bindings/>
+  <we:snapshot xmlns:r="http://schemas.openxmlformats.org/officeDocument/2006/relationships"/>
+</we:webextension>
 </file>
</xml_diff>

<commit_message>
feat: accidentally ended up with a good idea
</commit_message>
<xml_diff>
--- a/Slides.pptx
+++ b/Slides.pptx
@@ -5,19 +5,22 @@
     <p:sldMasterId id="2147483720" r:id="rId1"/>
   </p:sldMasterIdLst>
   <p:notesMasterIdLst>
-    <p:notesMasterId r:id="rId12"/>
+    <p:notesMasterId r:id="rId15"/>
   </p:notesMasterIdLst>
   <p:sldIdLst>
     <p:sldId id="256" r:id="rId2"/>
     <p:sldId id="271" r:id="rId3"/>
     <p:sldId id="276" r:id="rId4"/>
     <p:sldId id="272" r:id="rId5"/>
-    <p:sldId id="274" r:id="rId6"/>
-    <p:sldId id="275" r:id="rId7"/>
+    <p:sldId id="275" r:id="rId6"/>
+    <p:sldId id="274" r:id="rId7"/>
     <p:sldId id="277" r:id="rId8"/>
     <p:sldId id="260" r:id="rId9"/>
     <p:sldId id="261" r:id="rId10"/>
-    <p:sldId id="278" r:id="rId11"/>
+    <p:sldId id="280" r:id="rId11"/>
+    <p:sldId id="278" r:id="rId12"/>
+    <p:sldId id="281" r:id="rId13"/>
+    <p:sldId id="282" r:id="rId14"/>
   </p:sldIdLst>
   <p:sldSz cx="12192000" cy="6858000"/>
   <p:notesSz cx="6858000" cy="9144000"/>
@@ -211,7 +214,7 @@
             <a:fld id="{E211B9FA-8CB0-9347-9780-F0C7613563D5}" type="datetimeFigureOut">
               <a:rPr lang="en-US"/>
               <a:pPr/>
-              <a:t>1/4/25</a:t>
+              <a:t>1/5/25</a:t>
             </a:fld>
             <a:endParaRPr lang="en-US"/>
           </a:p>
@@ -720,7 +723,9 @@
           <a:lstStyle/>
           <a:p>
             <a:fld id="{57FAE2F2-15A5-7946-8E81-C5B8DDF8F3A5}" type="slidenum">
-              <a:t>8</a:t>
+              <a:rPr lang="en-US"/>
+              <a:pPr/>
+              <a:t>6</a:t>
             </a:fld>
             <a:endParaRPr lang="en-US"/>
           </a:p>
@@ -729,7 +734,7 @@
     </p:spTree>
     <p:extLst>
       <p:ext uri="{BB962C8B-B14F-4D97-AF65-F5344CB8AC3E}">
-        <p14:creationId xmlns:p14="http://schemas.microsoft.com/office/powerpoint/2010/main" val="1276190430"/>
+        <p14:creationId xmlns:p14="http://schemas.microsoft.com/office/powerpoint/2010/main" val="1920681846"/>
       </p:ext>
     </p:extLst>
   </p:cSld>
@@ -803,6 +808,89 @@
           <a:lstStyle/>
           <a:p>
             <a:fld id="{57FAE2F2-15A5-7946-8E81-C5B8DDF8F3A5}" type="slidenum">
+              <a:t>8</a:t>
+            </a:fld>
+            <a:endParaRPr lang="en-US"/>
+          </a:p>
+        </p:txBody>
+      </p:sp>
+    </p:spTree>
+    <p:extLst>
+      <p:ext uri="{BB962C8B-B14F-4D97-AF65-F5344CB8AC3E}">
+        <p14:creationId xmlns:p14="http://schemas.microsoft.com/office/powerpoint/2010/main" val="1276190430"/>
+      </p:ext>
+    </p:extLst>
+  </p:cSld>
+  <p:clrMapOvr>
+    <a:masterClrMapping/>
+  </p:clrMapOvr>
+</p:notes>
+</file>
+
+<file path=ppt/notesSlides/notesSlide5.xml><?xml version="1.0" encoding="utf-8"?>
+<p:notes xmlns:a="http://schemas.openxmlformats.org/drawingml/2006/main" xmlns:r="http://schemas.openxmlformats.org/officeDocument/2006/relationships" xmlns:p="http://schemas.openxmlformats.org/presentationml/2006/main">
+  <p:cSld>
+    <p:spTree>
+      <p:nvGrpSpPr>
+        <p:cNvPr id="1" name=""/>
+        <p:cNvGrpSpPr/>
+        <p:nvPr/>
+      </p:nvGrpSpPr>
+      <p:grpSpPr>
+        <a:xfrm>
+          <a:off x="0" y="0"/>
+          <a:ext cx="0" cy="0"/>
+          <a:chOff x="0" y="0"/>
+          <a:chExt cx="0" cy="0"/>
+        </a:xfrm>
+      </p:grpSpPr>
+      <p:sp>
+        <p:nvSpPr>
+          <p:cNvPr id="2" name="Slide Image Placeholder 1"/>
+          <p:cNvSpPr>
+            <a:spLocks noGrp="1" noRot="1" noChangeAspect="1"/>
+          </p:cNvSpPr>
+          <p:nvPr>
+            <p:ph type="sldImg"/>
+          </p:nvPr>
+        </p:nvSpPr>
+        <p:spPr/>
+      </p:sp>
+      <p:sp>
+        <p:nvSpPr>
+          <p:cNvPr id="3" name="Notes Placeholder 2"/>
+          <p:cNvSpPr>
+            <a:spLocks noGrp="1"/>
+          </p:cNvSpPr>
+          <p:nvPr>
+            <p:ph type="body" idx="1"/>
+          </p:nvPr>
+        </p:nvSpPr>
+        <p:spPr/>
+        <p:txBody>
+          <a:bodyPr/>
+          <a:lstStyle/>
+          <a:p>
+            <a:endParaRPr lang="en-US"/>
+          </a:p>
+        </p:txBody>
+      </p:sp>
+      <p:sp>
+        <p:nvSpPr>
+          <p:cNvPr id="4" name="Slide Number Placeholder 3"/>
+          <p:cNvSpPr>
+            <a:spLocks noGrp="1"/>
+          </p:cNvSpPr>
+          <p:nvPr>
+            <p:ph type="sldNum" sz="quarter" idx="5"/>
+          </p:nvPr>
+        </p:nvSpPr>
+        <p:spPr/>
+        <p:txBody>
+          <a:bodyPr/>
+          <a:lstStyle/>
+          <a:p>
+            <a:fld id="{57FAE2F2-15A5-7946-8E81-C5B8DDF8F3A5}" type="slidenum">
               <a:t>9</a:t>
             </a:fld>
             <a:endParaRPr lang="en-US"/>
@@ -813,6 +901,91 @@
     <p:extLst>
       <p:ext uri="{BB962C8B-B14F-4D97-AF65-F5344CB8AC3E}">
         <p14:creationId xmlns:p14="http://schemas.microsoft.com/office/powerpoint/2010/main" val="1265794021"/>
+      </p:ext>
+    </p:extLst>
+  </p:cSld>
+  <p:clrMapOvr>
+    <a:masterClrMapping/>
+  </p:clrMapOvr>
+</p:notes>
+</file>
+
+<file path=ppt/notesSlides/notesSlide6.xml><?xml version="1.0" encoding="utf-8"?>
+<p:notes xmlns:a="http://schemas.openxmlformats.org/drawingml/2006/main" xmlns:r="http://schemas.openxmlformats.org/officeDocument/2006/relationships" xmlns:p="http://schemas.openxmlformats.org/presentationml/2006/main">
+  <p:cSld>
+    <p:spTree>
+      <p:nvGrpSpPr>
+        <p:cNvPr id="1" name=""/>
+        <p:cNvGrpSpPr/>
+        <p:nvPr/>
+      </p:nvGrpSpPr>
+      <p:grpSpPr>
+        <a:xfrm>
+          <a:off x="0" y="0"/>
+          <a:ext cx="0" cy="0"/>
+          <a:chOff x="0" y="0"/>
+          <a:chExt cx="0" cy="0"/>
+        </a:xfrm>
+      </p:grpSpPr>
+      <p:sp>
+        <p:nvSpPr>
+          <p:cNvPr id="2" name="Slide Image Placeholder 1"/>
+          <p:cNvSpPr>
+            <a:spLocks noGrp="1" noRot="1" noChangeAspect="1"/>
+          </p:cNvSpPr>
+          <p:nvPr>
+            <p:ph type="sldImg"/>
+          </p:nvPr>
+        </p:nvSpPr>
+        <p:spPr/>
+      </p:sp>
+      <p:sp>
+        <p:nvSpPr>
+          <p:cNvPr id="3" name="Notes Placeholder 2"/>
+          <p:cNvSpPr>
+            <a:spLocks noGrp="1"/>
+          </p:cNvSpPr>
+          <p:nvPr>
+            <p:ph type="body" idx="1"/>
+          </p:nvPr>
+        </p:nvSpPr>
+        <p:spPr/>
+        <p:txBody>
+          <a:bodyPr/>
+          <a:lstStyle/>
+          <a:p>
+            <a:endParaRPr lang="en-US"/>
+          </a:p>
+        </p:txBody>
+      </p:sp>
+      <p:sp>
+        <p:nvSpPr>
+          <p:cNvPr id="4" name="Slide Number Placeholder 3"/>
+          <p:cNvSpPr>
+            <a:spLocks noGrp="1"/>
+          </p:cNvSpPr>
+          <p:nvPr>
+            <p:ph type="sldNum" sz="quarter" idx="5"/>
+          </p:nvPr>
+        </p:nvSpPr>
+        <p:spPr/>
+        <p:txBody>
+          <a:bodyPr/>
+          <a:lstStyle/>
+          <a:p>
+            <a:fld id="{57FAE2F2-15A5-7946-8E81-C5B8DDF8F3A5}" type="slidenum">
+              <a:rPr lang="en-US"/>
+              <a:pPr/>
+              <a:t>11</a:t>
+            </a:fld>
+            <a:endParaRPr lang="en-US"/>
+          </a:p>
+        </p:txBody>
+      </p:sp>
+    </p:spTree>
+    <p:extLst>
+      <p:ext uri="{BB962C8B-B14F-4D97-AF65-F5344CB8AC3E}">
+        <p14:creationId xmlns:p14="http://schemas.microsoft.com/office/powerpoint/2010/main" val="1162427785"/>
       </p:ext>
     </p:extLst>
   </p:cSld>
@@ -951,7 +1124,7 @@
           <a:p>
             <a:fld id="{0CE49D37-DE82-A944-A799-DA76EC8094F2}" type="datetimeFigureOut">
               <a:rPr lang="en-US"/>
-              <a:t>1/4/25</a:t>
+              <a:t>1/5/25</a:t>
             </a:fld>
             <a:endParaRPr lang="en-US"/>
           </a:p>
@@ -1119,7 +1292,7 @@
           <a:p>
             <a:fld id="{0CE49D37-DE82-A944-A799-DA76EC8094F2}" type="datetimeFigureOut">
               <a:rPr lang="en-US"/>
-              <a:t>1/4/25</a:t>
+              <a:t>1/5/25</a:t>
             </a:fld>
             <a:endParaRPr lang="en-US"/>
           </a:p>
@@ -1297,7 +1470,7 @@
           <a:p>
             <a:fld id="{0CE49D37-DE82-A944-A799-DA76EC8094F2}" type="datetimeFigureOut">
               <a:rPr lang="en-US"/>
-              <a:t>1/4/25</a:t>
+              <a:t>1/5/25</a:t>
             </a:fld>
             <a:endParaRPr lang="en-US"/>
           </a:p>
@@ -1465,7 +1638,7 @@
           <a:p>
             <a:fld id="{0CE49D37-DE82-A944-A799-DA76EC8094F2}" type="datetimeFigureOut">
               <a:rPr lang="en-US"/>
-              <a:t>1/4/25</a:t>
+              <a:t>1/5/25</a:t>
             </a:fld>
             <a:endParaRPr lang="en-US"/>
           </a:p>
@@ -1710,7 +1883,7 @@
           <a:p>
             <a:fld id="{0CE49D37-DE82-A944-A799-DA76EC8094F2}" type="datetimeFigureOut">
               <a:rPr lang="en-US"/>
-              <a:t>1/4/25</a:t>
+              <a:t>1/5/25</a:t>
             </a:fld>
             <a:endParaRPr lang="en-US"/>
           </a:p>
@@ -1939,7 +2112,7 @@
           <a:p>
             <a:fld id="{0CE49D37-DE82-A944-A799-DA76EC8094F2}" type="datetimeFigureOut">
               <a:rPr lang="en-US"/>
-              <a:t>1/4/25</a:t>
+              <a:t>1/5/25</a:t>
             </a:fld>
             <a:endParaRPr lang="en-US"/>
           </a:p>
@@ -2303,7 +2476,7 @@
           <a:p>
             <a:fld id="{0CE49D37-DE82-A944-A799-DA76EC8094F2}" type="datetimeFigureOut">
               <a:rPr lang="en-US"/>
-              <a:t>1/4/25</a:t>
+              <a:t>1/5/25</a:t>
             </a:fld>
             <a:endParaRPr lang="en-US"/>
           </a:p>
@@ -2420,7 +2593,7 @@
           <a:p>
             <a:fld id="{0CE49D37-DE82-A944-A799-DA76EC8094F2}" type="datetimeFigureOut">
               <a:rPr lang="en-US"/>
-              <a:t>1/4/25</a:t>
+              <a:t>1/5/25</a:t>
             </a:fld>
             <a:endParaRPr lang="en-US"/>
           </a:p>
@@ -2515,7 +2688,7 @@
           <a:p>
             <a:fld id="{0CE49D37-DE82-A944-A799-DA76EC8094F2}" type="datetimeFigureOut">
               <a:rPr lang="en-US"/>
-              <a:t>1/4/25</a:t>
+              <a:t>1/5/25</a:t>
             </a:fld>
             <a:endParaRPr lang="en-US"/>
           </a:p>
@@ -2790,7 +2963,7 @@
           <a:p>
             <a:fld id="{0CE49D37-DE82-A944-A799-DA76EC8094F2}" type="datetimeFigureOut">
               <a:rPr lang="en-US"/>
-              <a:t>1/4/25</a:t>
+              <a:t>1/5/25</a:t>
             </a:fld>
             <a:endParaRPr lang="en-US"/>
           </a:p>
@@ -3045,7 +3218,7 @@
           <a:p>
             <a:fld id="{0CE49D37-DE82-A944-A799-DA76EC8094F2}" type="datetimeFigureOut">
               <a:rPr lang="en-US"/>
-              <a:t>1/4/25</a:t>
+              <a:t>1/5/25</a:t>
             </a:fld>
             <a:endParaRPr lang="en-US"/>
           </a:p>
@@ -3258,7 +3431,7 @@
             <a:fld id="{0CE49D37-DE82-A944-A799-DA76EC8094F2}" type="datetimeFigureOut">
               <a:rPr lang="en-US"/>
               <a:pPr/>
-              <a:t>1/4/25</a:t>
+              <a:t>1/5/25</a:t>
             </a:fld>
             <a:endParaRPr lang="en-US"/>
           </a:p>
@@ -3756,6 +3929,98 @@
       </p:grpSpPr>
       <p:sp>
         <p:nvSpPr>
+          <p:cNvPr id="2" name="Title 1">
+            <a:extLst>
+              <a:ext uri="{FF2B5EF4-FFF2-40B4-BE49-F238E27FC236}">
+                <a16:creationId xmlns:a16="http://schemas.microsoft.com/office/drawing/2014/main" id="{07C87269-DAD9-34ED-80FE-13046B3342EF}"/>
+              </a:ext>
+            </a:extLst>
+          </p:cNvPr>
+          <p:cNvSpPr>
+            <a:spLocks noGrp="1"/>
+          </p:cNvSpPr>
+          <p:nvPr>
+            <p:ph type="title"/>
+          </p:nvPr>
+        </p:nvSpPr>
+        <p:spPr/>
+        <p:txBody>
+          <a:bodyPr/>
+          <a:lstStyle/>
+          <a:p>
+            <a:r>
+              <a:rPr lang="en-US"/>
+              <a:t>Object Detection w/ Model-based RL</a:t>
+            </a:r>
+          </a:p>
+        </p:txBody>
+      </p:sp>
+      <p:sp>
+        <p:nvSpPr>
+          <p:cNvPr id="3" name="Content Placeholder 2">
+            <a:extLst>
+              <a:ext uri="{FF2B5EF4-FFF2-40B4-BE49-F238E27FC236}">
+                <a16:creationId xmlns:a16="http://schemas.microsoft.com/office/drawing/2014/main" id="{862FABD3-07FC-A236-7594-1BB6E40ACF63}"/>
+              </a:ext>
+            </a:extLst>
+          </p:cNvPr>
+          <p:cNvSpPr>
+            <a:spLocks noGrp="1"/>
+          </p:cNvSpPr>
+          <p:nvPr>
+            <p:ph idx="1"/>
+          </p:nvPr>
+        </p:nvSpPr>
+        <p:spPr/>
+        <p:txBody>
+          <a:bodyPr/>
+          <a:lstStyle/>
+          <a:p>
+            <a:r>
+              <a:rPr lang="en-US"/>
+              <a:t>Learn the relationship between adjacent states</a:t>
+            </a:r>
+          </a:p>
+          <a:p>
+            <a:r>
+              <a:rPr lang="en-US"/>
+              <a:t>Then identify the objects in the image</a:t>
+            </a:r>
+          </a:p>
+        </p:txBody>
+      </p:sp>
+    </p:spTree>
+    <p:extLst>
+      <p:ext uri="{BB962C8B-B14F-4D97-AF65-F5344CB8AC3E}">
+        <p14:creationId xmlns:p14="http://schemas.microsoft.com/office/powerpoint/2010/main" val="2009347653"/>
+      </p:ext>
+    </p:extLst>
+  </p:cSld>
+  <p:clrMapOvr>
+    <a:masterClrMapping/>
+  </p:clrMapOvr>
+</p:sld>
+</file>
+
+<file path=ppt/slides/slide11.xml><?xml version="1.0" encoding="utf-8"?>
+<p:sld xmlns:a="http://schemas.openxmlformats.org/drawingml/2006/main" xmlns:r="http://schemas.openxmlformats.org/officeDocument/2006/relationships" xmlns:p="http://schemas.openxmlformats.org/presentationml/2006/main">
+  <p:cSld>
+    <p:spTree>
+      <p:nvGrpSpPr>
+        <p:cNvPr id="1" name=""/>
+        <p:cNvGrpSpPr/>
+        <p:nvPr/>
+      </p:nvGrpSpPr>
+      <p:grpSpPr>
+        <a:xfrm>
+          <a:off x="0" y="0"/>
+          <a:ext cx="0" cy="0"/>
+          <a:chOff x="0" y="0"/>
+          <a:chExt cx="0" cy="0"/>
+        </a:xfrm>
+      </p:grpSpPr>
+      <p:sp>
+        <p:nvSpPr>
           <p:cNvPr id="4" name="Title 3">
             <a:extLst>
               <a:ext uri="{FF2B5EF4-FFF2-40B4-BE49-F238E27FC236}">
@@ -3808,7 +4073,7 @@
           <a:p>
             <a:r>
               <a:rPr lang="en-US"/>
-              <a:t>A Side Project</a:t>
+              <a:t>is a mathematical framework to sequential decision making</a:t>
             </a:r>
           </a:p>
         </p:txBody>
@@ -3817,6 +4082,216 @@
     <p:extLst>
       <p:ext uri="{BB962C8B-B14F-4D97-AF65-F5344CB8AC3E}">
         <p14:creationId xmlns:p14="http://schemas.microsoft.com/office/powerpoint/2010/main" val="3117989012"/>
+      </p:ext>
+    </p:extLst>
+  </p:cSld>
+  <p:clrMapOvr>
+    <a:masterClrMapping/>
+  </p:clrMapOvr>
+</p:sld>
+</file>
+
+<file path=ppt/slides/slide12.xml><?xml version="1.0" encoding="utf-8"?>
+<p:sld xmlns:a="http://schemas.openxmlformats.org/drawingml/2006/main" xmlns:r="http://schemas.openxmlformats.org/officeDocument/2006/relationships" xmlns:p="http://schemas.openxmlformats.org/presentationml/2006/main">
+  <p:cSld>
+    <p:spTree>
+      <p:nvGrpSpPr>
+        <p:cNvPr id="1" name=""/>
+        <p:cNvGrpSpPr/>
+        <p:nvPr/>
+      </p:nvGrpSpPr>
+      <p:grpSpPr>
+        <a:xfrm>
+          <a:off x="0" y="0"/>
+          <a:ext cx="0" cy="0"/>
+          <a:chOff x="0" y="0"/>
+          <a:chExt cx="0" cy="0"/>
+        </a:xfrm>
+      </p:grpSpPr>
+      <p:sp>
+        <p:nvSpPr>
+          <p:cNvPr id="2" name="Title 1">
+            <a:extLst>
+              <a:ext uri="{FF2B5EF4-FFF2-40B4-BE49-F238E27FC236}">
+                <a16:creationId xmlns:a16="http://schemas.microsoft.com/office/drawing/2014/main" id="{A9F482FB-79D6-C24E-4BA1-BE08082C0E6E}"/>
+              </a:ext>
+            </a:extLst>
+          </p:cNvPr>
+          <p:cNvSpPr>
+            <a:spLocks noGrp="1"/>
+          </p:cNvSpPr>
+          <p:nvPr>
+            <p:ph type="title"/>
+          </p:nvPr>
+        </p:nvSpPr>
+        <p:spPr/>
+        <p:txBody>
+          <a:bodyPr/>
+          <a:lstStyle/>
+          <a:p>
+            <a:r>
+              <a:rPr lang="en-US" b="1"/>
+              <a:t>Model-Free </a:t>
+            </a:r>
+            <a:r>
+              <a:rPr lang="en-US"/>
+              <a:t>Reinforcement Learning</a:t>
+            </a:r>
+          </a:p>
+        </p:txBody>
+      </p:sp>
+      <p:sp>
+        <p:nvSpPr>
+          <p:cNvPr id="3" name="Content Placeholder 2">
+            <a:extLst>
+              <a:ext uri="{FF2B5EF4-FFF2-40B4-BE49-F238E27FC236}">
+                <a16:creationId xmlns:a16="http://schemas.microsoft.com/office/drawing/2014/main" id="{21D7AEC4-ECE5-A6F8-074D-CD193BAE909D}"/>
+              </a:ext>
+            </a:extLst>
+          </p:cNvPr>
+          <p:cNvSpPr>
+            <a:spLocks noGrp="1"/>
+          </p:cNvSpPr>
+          <p:nvPr>
+            <p:ph idx="1"/>
+          </p:nvPr>
+        </p:nvSpPr>
+        <p:spPr/>
+        <p:txBody>
+          <a:bodyPr/>
+          <a:lstStyle/>
+          <a:p>
+            <a:pPr>
+              <a:buClr>
+                <a:schemeClr val="tx1"/>
+              </a:buClr>
+            </a:pPr>
+            <a:r>
+              <a:rPr lang="en-US"/>
+              <a:t>Learning the relationship between adjacent states is unecessary for an optimal policy</a:t>
+            </a:r>
+          </a:p>
+          <a:p>
+            <a:pPr>
+              <a:buClr>
+                <a:schemeClr val="tx1"/>
+              </a:buClr>
+            </a:pPr>
+            <a:r>
+              <a:rPr lang="en-US">
+                <a:solidFill>
+                  <a:srgbClr val="00B050"/>
+                </a:solidFill>
+              </a:rPr>
+              <a:t>Value-Based Methods </a:t>
+            </a:r>
+            <a:r>
+              <a:rPr lang="en-US"/>
+              <a:t>assume that in any state, there is one good action</a:t>
+            </a:r>
+          </a:p>
+        </p:txBody>
+      </p:sp>
+    </p:spTree>
+    <p:extLst>
+      <p:ext uri="{BB962C8B-B14F-4D97-AF65-F5344CB8AC3E}">
+        <p14:creationId xmlns:p14="http://schemas.microsoft.com/office/powerpoint/2010/main" val="2386242938"/>
+      </p:ext>
+    </p:extLst>
+  </p:cSld>
+  <p:clrMapOvr>
+    <a:masterClrMapping/>
+  </p:clrMapOvr>
+</p:sld>
+</file>
+
+<file path=ppt/slides/slide13.xml><?xml version="1.0" encoding="utf-8"?>
+<p:sld xmlns:a="http://schemas.openxmlformats.org/drawingml/2006/main" xmlns:r="http://schemas.openxmlformats.org/officeDocument/2006/relationships" xmlns:p="http://schemas.openxmlformats.org/presentationml/2006/main">
+  <p:cSld>
+    <p:spTree>
+      <p:nvGrpSpPr>
+        <p:cNvPr id="1" name=""/>
+        <p:cNvGrpSpPr/>
+        <p:nvPr/>
+      </p:nvGrpSpPr>
+      <p:grpSpPr>
+        <a:xfrm>
+          <a:off x="0" y="0"/>
+          <a:ext cx="0" cy="0"/>
+          <a:chOff x="0" y="0"/>
+          <a:chExt cx="0" cy="0"/>
+        </a:xfrm>
+      </p:grpSpPr>
+      <p:sp>
+        <p:nvSpPr>
+          <p:cNvPr id="2" name="Title 1">
+            <a:extLst>
+              <a:ext uri="{FF2B5EF4-FFF2-40B4-BE49-F238E27FC236}">
+                <a16:creationId xmlns:a16="http://schemas.microsoft.com/office/drawing/2014/main" id="{AA3416F3-866C-9ED5-B3E7-3CBCB6607C44}"/>
+              </a:ext>
+            </a:extLst>
+          </p:cNvPr>
+          <p:cNvSpPr>
+            <a:spLocks noGrp="1"/>
+          </p:cNvSpPr>
+          <p:nvPr>
+            <p:ph type="title"/>
+          </p:nvPr>
+        </p:nvSpPr>
+        <p:spPr/>
+        <p:txBody>
+          <a:bodyPr/>
+          <a:lstStyle/>
+          <a:p>
+            <a:r>
+              <a:rPr lang="en-US" b="1"/>
+              <a:t>Example</a:t>
+            </a:r>
+            <a:r>
+              <a:rPr lang="en-US"/>
+              <a:t>: Flappy Bird w/ Deep Q Networks</a:t>
+            </a:r>
+          </a:p>
+        </p:txBody>
+      </p:sp>
+      <p:sp>
+        <p:nvSpPr>
+          <p:cNvPr id="3" name="Content Placeholder 2">
+            <a:extLst>
+              <a:ext uri="{FF2B5EF4-FFF2-40B4-BE49-F238E27FC236}">
+                <a16:creationId xmlns:a16="http://schemas.microsoft.com/office/drawing/2014/main" id="{E205F62E-C56B-DFD9-8C07-C329904F38AA}"/>
+              </a:ext>
+            </a:extLst>
+          </p:cNvPr>
+          <p:cNvSpPr>
+            <a:spLocks noGrp="1"/>
+          </p:cNvSpPr>
+          <p:nvPr>
+            <p:ph idx="1"/>
+          </p:nvPr>
+        </p:nvSpPr>
+        <p:spPr/>
+        <p:txBody>
+          <a:bodyPr/>
+          <a:lstStyle/>
+          <a:p>
+            <a:r>
+              <a:rPr lang="en-US"/>
+              <a:t>Create a neural network maps each state to the expected return</a:t>
+            </a:r>
+          </a:p>
+          <a:p>
+            <a:r>
+              <a:rPr lang="en-US"/>
+              <a:t>An optimal agent can be created by simply choosing the action with the highest return</a:t>
+            </a:r>
+          </a:p>
+        </p:txBody>
+      </p:sp>
+    </p:spTree>
+    <p:extLst>
+      <p:ext uri="{BB962C8B-B14F-4D97-AF65-F5344CB8AC3E}">
+        <p14:creationId xmlns:p14="http://schemas.microsoft.com/office/powerpoint/2010/main" val="2400491693"/>
       </p:ext>
     </p:extLst>
   </p:cSld>
@@ -3871,16 +4346,6 @@
           <a:p>
             <a:r>
               <a:rPr lang="en-US">
-                <a:latin typeface="Calibri" panose="020F0502020204030204" pitchFamily="34" charset="0"/>
-                <a:cs typeface="Calibri" panose="020F0502020204030204" pitchFamily="34" charset="0"/>
-              </a:rPr>
-              <a:t>Worked IRAD for two years</a:t>
-            </a:r>
-          </a:p>
-          <a:p>
-            <a:r>
-              <a:rPr lang="en-US">
-                <a:latin typeface="Calibri" panose="020F0502020204030204" pitchFamily="34" charset="0"/>
                 <a:cs typeface="Calibri" panose="020F0502020204030204" pitchFamily="34" charset="0"/>
               </a:rPr>
               <a:t>Path Planning</a:t>
@@ -3890,7 +4355,6 @@
             <a:pPr lvl="1"/>
             <a:r>
               <a:rPr lang="en-US">
-                <a:latin typeface="Calibri" panose="020F0502020204030204" pitchFamily="34" charset="0"/>
                 <a:cs typeface="Calibri" panose="020F0502020204030204" pitchFamily="34" charset="0"/>
               </a:rPr>
               <a:t>Navigation</a:t>
@@ -3900,49 +4364,44 @@
             <a:pPr lvl="1"/>
             <a:r>
               <a:rPr lang="en-US">
-                <a:latin typeface="Calibri" panose="020F0502020204030204" pitchFamily="34" charset="0"/>
+                <a:cs typeface="Calibri" panose="020F0502020204030204" pitchFamily="34" charset="0"/>
+              </a:rPr>
+              <a:t>Motion Control</a:t>
+            </a:r>
+          </a:p>
+          <a:p>
+            <a:pPr lvl="1"/>
+            <a:r>
+              <a:rPr lang="en-US">
                 <a:cs typeface="Calibri" panose="020F0502020204030204" pitchFamily="34" charset="0"/>
               </a:rPr>
               <a:t>Autonomy</a:t>
             </a:r>
           </a:p>
           <a:p>
-            <a:pPr lvl="1"/>
             <a:r>
               <a:rPr lang="en-US">
-                <a:latin typeface="Calibri" panose="020F0502020204030204" pitchFamily="34" charset="0"/>
                 <a:cs typeface="Calibri" panose="020F0502020204030204" pitchFamily="34" charset="0"/>
               </a:rPr>
-              <a:t>Motion Planning</a:t>
-            </a:r>
-          </a:p>
-          <a:p>
+              <a:t>Automated Target Recognition</a:t>
+            </a:r>
+          </a:p>
+          <a:p>
+            <a:pPr lvl="1"/>
             <a:r>
               <a:rPr lang="en-US">
-                <a:latin typeface="Calibri" panose="020F0502020204030204" pitchFamily="34" charset="0"/>
                 <a:cs typeface="Calibri" panose="020F0502020204030204" pitchFamily="34" charset="0"/>
               </a:rPr>
-              <a:t>ATR</a:t>
+              <a:t>Single Shot Detector (SSD)</a:t>
             </a:r>
           </a:p>
           <a:p>
             <a:pPr lvl="1"/>
             <a:r>
               <a:rPr lang="en-US">
-                <a:latin typeface="Calibri" panose="020F0502020204030204" pitchFamily="34" charset="0"/>
                 <a:cs typeface="Calibri" panose="020F0502020204030204" pitchFamily="34" charset="0"/>
               </a:rPr>
-              <a:t>SSD</a:t>
-            </a:r>
-          </a:p>
-          <a:p>
-            <a:pPr lvl="1"/>
-            <a:r>
-              <a:rPr lang="en-US">
-                <a:latin typeface="Calibri" panose="020F0502020204030204" pitchFamily="34" charset="0"/>
-                <a:cs typeface="Calibri" panose="020F0502020204030204" pitchFamily="34" charset="0"/>
-              </a:rPr>
-              <a:t>RT-DETR</a:t>
+              <a:t>Real-Time Detection Transformers (RT-DETR)</a:t>
             </a:r>
           </a:p>
         </p:txBody>
@@ -4064,7 +4523,10 @@
           <a:bodyPr/>
           <a:lstStyle/>
           <a:p>
-            <a:endParaRPr lang="en-US"/>
+            <a:r>
+              <a:rPr lang="en-US"/>
+              <a:t>allows robots to have control over their location</a:t>
+            </a:r>
           </a:p>
         </p:txBody>
       </p:sp>
@@ -4150,7 +4612,7 @@
         <p:spPr>
           <a:xfrm>
             <a:off x="838200" y="1690688"/>
-            <a:ext cx="5257800" cy="4486275"/>
+            <a:ext cx="10515600" cy="4486275"/>
           </a:xfrm>
         </p:spPr>
         <p:txBody>
@@ -4159,20 +4621,14 @@
           <a:p>
             <a:r>
               <a:rPr lang="en-US"/>
-              <a:t>Assume positional control of drone</a:t>
-            </a:r>
-          </a:p>
-          <a:p>
-            <a:r>
-              <a:rPr lang="en-US"/>
-              <a:t>Most efficient way to navigate around obstacles</a:t>
-            </a:r>
-          </a:p>
-          <a:p>
-            <a:endParaRPr lang="en-US"/>
-          </a:p>
-          <a:p>
-            <a:endParaRPr lang="en-US"/>
+              <a:t>In most situations shortest-time = shortest-distance = shortest-energy</a:t>
+            </a:r>
+          </a:p>
+          <a:p>
+            <a:r>
+              <a:rPr lang="en-US"/>
+              <a:t>How to navigate in domains where this is true</a:t>
+            </a:r>
           </a:p>
         </p:txBody>
       </p:sp>
@@ -4211,7 +4667,7 @@
           <p:cNvPr id="2" name="Title 1">
             <a:extLst>
               <a:ext uri="{FF2B5EF4-FFF2-40B4-BE49-F238E27FC236}">
-                <a16:creationId xmlns:a16="http://schemas.microsoft.com/office/drawing/2014/main" id="{57A47BED-4EF8-32BE-160E-19A1D62C3A2D}"/>
+                <a16:creationId xmlns:a16="http://schemas.microsoft.com/office/drawing/2014/main" id="{38ECE26F-9D44-BA4C-01F1-4A633953190B}"/>
               </a:ext>
             </a:extLst>
           </p:cNvPr>
@@ -4222,14 +4678,19 @@
             <p:ph type="title"/>
           </p:nvPr>
         </p:nvSpPr>
-        <p:spPr/>
-        <p:txBody>
-          <a:bodyPr/>
-          <a:lstStyle/>
-          <a:p>
-            <a:r>
-              <a:rPr lang="en-US"/>
-              <a:t>Autonomy</a:t>
+        <p:spPr>
+          <a:xfrm>
+            <a:off x="838200" y="365125"/>
+            <a:ext cx="5257800" cy="1325563"/>
+          </a:xfrm>
+        </p:spPr>
+        <p:txBody>
+          <a:bodyPr/>
+          <a:lstStyle/>
+          <a:p>
+            <a:r>
+              <a:rPr lang="en-US"/>
+              <a:t>Motion Control</a:t>
             </a:r>
           </a:p>
         </p:txBody>
@@ -4239,7 +4700,7 @@
           <p:cNvPr id="3" name="Content Placeholder 2">
             <a:extLst>
               <a:ext uri="{FF2B5EF4-FFF2-40B4-BE49-F238E27FC236}">
-                <a16:creationId xmlns:a16="http://schemas.microsoft.com/office/drawing/2014/main" id="{CD727FD6-B9A9-4F02-F614-BD1D3E631443}"/>
+                <a16:creationId xmlns:a16="http://schemas.microsoft.com/office/drawing/2014/main" id="{97761588-5CC3-5226-5669-213D212957D0}"/>
               </a:ext>
             </a:extLst>
           </p:cNvPr>
@@ -4253,7 +4714,7 @@
         <p:spPr>
           <a:xfrm>
             <a:off x="838200" y="1825625"/>
-            <a:ext cx="5257800" cy="4351338"/>
+            <a:ext cx="10309412" cy="4351338"/>
           </a:xfrm>
         </p:spPr>
         <p:txBody>
@@ -4262,7 +4723,19 @@
           <a:p>
             <a:r>
               <a:rPr lang="en-US"/>
-              <a:t>algorithm for autonomous robot conduct surveillance independently</a:t>
+              <a:t>Efficiently navigate through time-energy-space constrained domains</a:t>
+            </a:r>
+          </a:p>
+          <a:p>
+            <a:r>
+              <a:rPr lang="en-US"/>
+              <a:t>Shortest time != shortest distance != shortest energy</a:t>
+            </a:r>
+          </a:p>
+          <a:p>
+            <a:r>
+              <a:rPr lang="en-US"/>
+              <a:t>Nonlinear optimization</a:t>
             </a:r>
           </a:p>
         </p:txBody>
@@ -4270,7 +4743,7 @@
     </p:spTree>
     <p:extLst>
       <p:ext uri="{BB962C8B-B14F-4D97-AF65-F5344CB8AC3E}">
-        <p14:creationId xmlns:p14="http://schemas.microsoft.com/office/powerpoint/2010/main" val="3962800616"/>
+        <p14:creationId xmlns:p14="http://schemas.microsoft.com/office/powerpoint/2010/main" val="1985342631"/>
       </p:ext>
     </p:extLst>
   </p:cSld>
@@ -4302,7 +4775,7 @@
           <p:cNvPr id="2" name="Title 1">
             <a:extLst>
               <a:ext uri="{FF2B5EF4-FFF2-40B4-BE49-F238E27FC236}">
-                <a16:creationId xmlns:a16="http://schemas.microsoft.com/office/drawing/2014/main" id="{38ECE26F-9D44-BA4C-01F1-4A633953190B}"/>
+                <a16:creationId xmlns:a16="http://schemas.microsoft.com/office/drawing/2014/main" id="{57A47BED-4EF8-32BE-160E-19A1D62C3A2D}"/>
               </a:ext>
             </a:extLst>
           </p:cNvPr>
@@ -4313,19 +4786,14 @@
             <p:ph type="title"/>
           </p:nvPr>
         </p:nvSpPr>
-        <p:spPr>
-          <a:xfrm>
-            <a:off x="838200" y="365125"/>
-            <a:ext cx="5257800" cy="1325563"/>
-          </a:xfrm>
-        </p:spPr>
-        <p:txBody>
-          <a:bodyPr/>
-          <a:lstStyle/>
-          <a:p>
-            <a:r>
-              <a:rPr lang="en-US"/>
-              <a:t>Motion Control</a:t>
+        <p:spPr/>
+        <p:txBody>
+          <a:bodyPr/>
+          <a:lstStyle/>
+          <a:p>
+            <a:r>
+              <a:rPr lang="en-US"/>
+              <a:t>Autonomy</a:t>
             </a:r>
           </a:p>
         </p:txBody>
@@ -4335,7 +4803,7 @@
           <p:cNvPr id="3" name="Content Placeholder 2">
             <a:extLst>
               <a:ext uri="{FF2B5EF4-FFF2-40B4-BE49-F238E27FC236}">
-                <a16:creationId xmlns:a16="http://schemas.microsoft.com/office/drawing/2014/main" id="{97761588-5CC3-5226-5669-213D212957D0}"/>
+                <a16:creationId xmlns:a16="http://schemas.microsoft.com/office/drawing/2014/main" id="{CD727FD6-B9A9-4F02-F614-BD1D3E631443}"/>
               </a:ext>
             </a:extLst>
           </p:cNvPr>
@@ -4349,7 +4817,7 @@
         <p:spPr>
           <a:xfrm>
             <a:off x="838200" y="1825625"/>
-            <a:ext cx="4968834" cy="4351338"/>
+            <a:ext cx="10515600" cy="4351338"/>
           </a:xfrm>
         </p:spPr>
         <p:txBody>
@@ -4358,24 +4826,21 @@
           <a:p>
             <a:r>
               <a:rPr lang="en-US"/>
-              <a:t>Navigation with acceleration control</a:t>
-            </a:r>
-          </a:p>
-          <a:p>
-            <a:r>
-              <a:rPr lang="en-US"/>
-              <a:t>Bezier curves</a:t>
-            </a:r>
-          </a:p>
-          <a:p>
-            <a:endParaRPr lang="en-US"/>
+              <a:t>Allows robots to conduct surveillance autonomously</a:t>
+            </a:r>
+          </a:p>
+          <a:p>
+            <a:r>
+              <a:rPr lang="en-US"/>
+              <a:t>Latency Graphs</a:t>
+            </a:r>
           </a:p>
         </p:txBody>
       </p:sp>
     </p:spTree>
     <p:extLst>
       <p:ext uri="{BB962C8B-B14F-4D97-AF65-F5344CB8AC3E}">
-        <p14:creationId xmlns:p14="http://schemas.microsoft.com/office/powerpoint/2010/main" val="1985342631"/>
+        <p14:creationId xmlns:p14="http://schemas.microsoft.com/office/powerpoint/2010/main" val="3962800616"/>
       </p:ext>
     </p:extLst>
   </p:cSld>
@@ -4451,7 +4916,10 @@
           <a:bodyPr/>
           <a:lstStyle/>
           <a:p>
-            <a:endParaRPr lang="en-US"/>
+            <a:r>
+              <a:rPr lang="en-US"/>
+              <a:t>allows robots to capture relevant features in their environment</a:t>
+            </a:r>
           </a:p>
         </p:txBody>
       </p:sp>
@@ -4529,12 +4997,20 @@
             <p:ph idx="1"/>
           </p:nvPr>
         </p:nvSpPr>
-        <p:spPr/>
-        <p:txBody>
-          <a:bodyPr/>
-          <a:lstStyle/>
-          <a:p>
-            <a:endParaRPr lang="en-US"/>
+        <p:spPr>
+          <a:xfrm>
+            <a:off x="838199" y="1825625"/>
+            <a:ext cx="10515599" cy="4351338"/>
+          </a:xfrm>
+        </p:spPr>
+        <p:txBody>
+          <a:bodyPr/>
+          <a:lstStyle/>
+          <a:p>
+            <a:r>
+              <a:rPr lang="en-US"/>
+              <a:t>Use convolutional filters to filter feature maps into objects</a:t>
+            </a:r>
           </a:p>
         </p:txBody>
       </p:sp>
@@ -4617,7 +5093,10 @@
           <a:bodyPr/>
           <a:lstStyle/>
           <a:p>
-            <a:endParaRPr lang="en-US"/>
+            <a:r>
+              <a:rPr lang="en-US"/>
+              <a:t>Uses attention for translational context</a:t>
+            </a:r>
           </a:p>
         </p:txBody>
       </p:sp>

</xml_diff>